<commit_message>
Ajustes Ppt e Criaçao arquivo xmind
</commit_message>
<xml_diff>
--- a/Introduction to Cloud Computing/Introduction to Cloud Computing.pptx
+++ b/Introduction to Cloud Computing/Introduction to Cloud Computing.pptx
@@ -5,7 +5,7 @@
     <p:sldMasterId id="2147483659" r:id="rId1"/>
   </p:sldMasterIdLst>
   <p:notesMasterIdLst>
-    <p:notesMasterId r:id="rId15"/>
+    <p:notesMasterId r:id="rId18"/>
   </p:notesMasterIdLst>
   <p:sldIdLst>
     <p:sldId id="256" r:id="rId2"/>
@@ -16,11 +16,14 @@
     <p:sldId id="262" r:id="rId7"/>
     <p:sldId id="261" r:id="rId8"/>
     <p:sldId id="271" r:id="rId9"/>
-    <p:sldId id="265" r:id="rId10"/>
-    <p:sldId id="266" r:id="rId11"/>
-    <p:sldId id="268" r:id="rId12"/>
-    <p:sldId id="270" r:id="rId13"/>
-    <p:sldId id="269" r:id="rId14"/>
+    <p:sldId id="273" r:id="rId10"/>
+    <p:sldId id="272" r:id="rId11"/>
+    <p:sldId id="265" r:id="rId12"/>
+    <p:sldId id="266" r:id="rId13"/>
+    <p:sldId id="268" r:id="rId14"/>
+    <p:sldId id="270" r:id="rId15"/>
+    <p:sldId id="269" r:id="rId16"/>
+    <p:sldId id="274" r:id="rId17"/>
   </p:sldIdLst>
   <p:sldSz cx="12192000" cy="6858000"/>
   <p:notesSz cx="6858000" cy="9144000"/>
@@ -132,11 +135,14 @@
             <p14:sldId id="262"/>
             <p14:sldId id="261"/>
             <p14:sldId id="271"/>
+            <p14:sldId id="273"/>
+            <p14:sldId id="272"/>
             <p14:sldId id="265"/>
             <p14:sldId id="266"/>
             <p14:sldId id="268"/>
             <p14:sldId id="270"/>
             <p14:sldId id="269"/>
+            <p14:sldId id="274"/>
           </p14:sldIdLst>
         </p14:section>
       </p14:sectionLst>
@@ -146,10 +152,6 @@
     </p:ext>
   </p:extLst>
 </p:presentation>
-</file>
-
-<file path=ppt/revisionInfo.xml><?xml version="1.0" encoding="utf-8"?>
-<p1510:revInfo xmlns:a="http://schemas.openxmlformats.org/drawingml/2006/main" xmlns:r="http://schemas.openxmlformats.org/officeDocument/2006/relationships" xmlns:p1510="http://schemas.microsoft.com/office/powerpoint/2015/10/main"/>
 </file>
 
 <file path=ppt/diagrams/colors1.xml><?xml version="1.0" encoding="utf-8"?>
@@ -899,1192 +901,7 @@
 </dgm:colorsDef>
 </file>
 
-<file path=ppt/diagrams/colors2.xml><?xml version="1.0" encoding="utf-8"?>
-<dgm:colorsDef xmlns:dgm="http://schemas.openxmlformats.org/drawingml/2006/diagram" xmlns:a="http://schemas.openxmlformats.org/drawingml/2006/main" uniqueId="urn:microsoft.com/office/officeart/2005/8/colors/accent1_2">
-  <dgm:title val=""/>
-  <dgm:desc val=""/>
-  <dgm:catLst>
-    <dgm:cat type="accent1" pri="11200"/>
-  </dgm:catLst>
-  <dgm:styleLbl name="node0">
-    <dgm:fillClrLst meth="repeat">
-      <a:schemeClr val="accent1"/>
-    </dgm:fillClrLst>
-    <dgm:linClrLst meth="repeat">
-      <a:schemeClr val="lt1"/>
-    </dgm:linClrLst>
-    <dgm:effectClrLst/>
-    <dgm:txLinClrLst/>
-    <dgm:txFillClrLst/>
-    <dgm:txEffectClrLst/>
-  </dgm:styleLbl>
-  <dgm:styleLbl name="alignNode1">
-    <dgm:fillClrLst meth="repeat">
-      <a:schemeClr val="accent1"/>
-    </dgm:fillClrLst>
-    <dgm:linClrLst meth="repeat">
-      <a:schemeClr val="accent1"/>
-    </dgm:linClrLst>
-    <dgm:effectClrLst/>
-    <dgm:txLinClrLst/>
-    <dgm:txFillClrLst/>
-    <dgm:txEffectClrLst/>
-  </dgm:styleLbl>
-  <dgm:styleLbl name="node1">
-    <dgm:fillClrLst meth="repeat">
-      <a:schemeClr val="accent1"/>
-    </dgm:fillClrLst>
-    <dgm:linClrLst meth="repeat">
-      <a:schemeClr val="lt1"/>
-    </dgm:linClrLst>
-    <dgm:effectClrLst/>
-    <dgm:txLinClrLst/>
-    <dgm:txFillClrLst/>
-    <dgm:txEffectClrLst/>
-  </dgm:styleLbl>
-  <dgm:styleLbl name="lnNode1">
-    <dgm:fillClrLst meth="repeat">
-      <a:schemeClr val="accent1"/>
-    </dgm:fillClrLst>
-    <dgm:linClrLst meth="repeat">
-      <a:schemeClr val="lt1"/>
-    </dgm:linClrLst>
-    <dgm:effectClrLst/>
-    <dgm:txLinClrLst/>
-    <dgm:txFillClrLst/>
-    <dgm:txEffectClrLst/>
-  </dgm:styleLbl>
-  <dgm:styleLbl name="vennNode1">
-    <dgm:fillClrLst meth="repeat">
-      <a:schemeClr val="accent1">
-        <a:alpha val="50000"/>
-      </a:schemeClr>
-    </dgm:fillClrLst>
-    <dgm:linClrLst meth="repeat">
-      <a:schemeClr val="lt1"/>
-    </dgm:linClrLst>
-    <dgm:effectClrLst/>
-    <dgm:txLinClrLst/>
-    <dgm:txFillClrLst/>
-    <dgm:txEffectClrLst/>
-  </dgm:styleLbl>
-  <dgm:styleLbl name="node2">
-    <dgm:fillClrLst meth="repeat">
-      <a:schemeClr val="accent1"/>
-    </dgm:fillClrLst>
-    <dgm:linClrLst meth="repeat">
-      <a:schemeClr val="lt1"/>
-    </dgm:linClrLst>
-    <dgm:effectClrLst/>
-    <dgm:txLinClrLst/>
-    <dgm:txFillClrLst/>
-    <dgm:txEffectClrLst/>
-  </dgm:styleLbl>
-  <dgm:styleLbl name="node3">
-    <dgm:fillClrLst meth="repeat">
-      <a:schemeClr val="accent1"/>
-    </dgm:fillClrLst>
-    <dgm:linClrLst meth="repeat">
-      <a:schemeClr val="lt1"/>
-    </dgm:linClrLst>
-    <dgm:effectClrLst/>
-    <dgm:txLinClrLst/>
-    <dgm:txFillClrLst/>
-    <dgm:txEffectClrLst/>
-  </dgm:styleLbl>
-  <dgm:styleLbl name="node4">
-    <dgm:fillClrLst meth="repeat">
-      <a:schemeClr val="accent1"/>
-    </dgm:fillClrLst>
-    <dgm:linClrLst meth="repeat">
-      <a:schemeClr val="lt1"/>
-    </dgm:linClrLst>
-    <dgm:effectClrLst/>
-    <dgm:txLinClrLst/>
-    <dgm:txFillClrLst/>
-    <dgm:txEffectClrLst/>
-  </dgm:styleLbl>
-  <dgm:styleLbl name="fgImgPlace1">
-    <dgm:fillClrLst meth="repeat">
-      <a:schemeClr val="accent1">
-        <a:tint val="50000"/>
-      </a:schemeClr>
-    </dgm:fillClrLst>
-    <dgm:linClrLst meth="repeat">
-      <a:schemeClr val="lt1"/>
-    </dgm:linClrLst>
-    <dgm:effectClrLst/>
-    <dgm:txLinClrLst/>
-    <dgm:txFillClrLst meth="repeat">
-      <a:schemeClr val="lt1"/>
-    </dgm:txFillClrLst>
-    <dgm:txEffectClrLst/>
-  </dgm:styleLbl>
-  <dgm:styleLbl name="alignImgPlace1">
-    <dgm:fillClrLst meth="repeat">
-      <a:schemeClr val="accent1">
-        <a:tint val="50000"/>
-      </a:schemeClr>
-    </dgm:fillClrLst>
-    <dgm:linClrLst meth="repeat">
-      <a:schemeClr val="lt1"/>
-    </dgm:linClrLst>
-    <dgm:effectClrLst/>
-    <dgm:txLinClrLst/>
-    <dgm:txFillClrLst meth="repeat">
-      <a:schemeClr val="lt1"/>
-    </dgm:txFillClrLst>
-    <dgm:txEffectClrLst/>
-  </dgm:styleLbl>
-  <dgm:styleLbl name="bgImgPlace1">
-    <dgm:fillClrLst meth="repeat">
-      <a:schemeClr val="accent1">
-        <a:tint val="50000"/>
-      </a:schemeClr>
-    </dgm:fillClrLst>
-    <dgm:linClrLst meth="repeat">
-      <a:schemeClr val="lt1"/>
-    </dgm:linClrLst>
-    <dgm:effectClrLst/>
-    <dgm:txLinClrLst/>
-    <dgm:txFillClrLst meth="repeat">
-      <a:schemeClr val="lt1"/>
-    </dgm:txFillClrLst>
-    <dgm:txEffectClrLst/>
-  </dgm:styleLbl>
-  <dgm:styleLbl name="sibTrans2D1">
-    <dgm:fillClrLst meth="repeat">
-      <a:schemeClr val="accent1">
-        <a:tint val="60000"/>
-      </a:schemeClr>
-    </dgm:fillClrLst>
-    <dgm:linClrLst meth="repeat">
-      <a:schemeClr val="accent1">
-        <a:tint val="60000"/>
-      </a:schemeClr>
-    </dgm:linClrLst>
-    <dgm:effectClrLst/>
-    <dgm:txLinClrLst/>
-    <dgm:txFillClrLst/>
-    <dgm:txEffectClrLst/>
-  </dgm:styleLbl>
-  <dgm:styleLbl name="fgSibTrans2D1">
-    <dgm:fillClrLst meth="repeat">
-      <a:schemeClr val="accent1">
-        <a:tint val="60000"/>
-      </a:schemeClr>
-    </dgm:fillClrLst>
-    <dgm:linClrLst meth="repeat">
-      <a:schemeClr val="accent1">
-        <a:tint val="60000"/>
-      </a:schemeClr>
-    </dgm:linClrLst>
-    <dgm:effectClrLst/>
-    <dgm:txLinClrLst/>
-    <dgm:txFillClrLst/>
-    <dgm:txEffectClrLst/>
-  </dgm:styleLbl>
-  <dgm:styleLbl name="bgSibTrans2D1">
-    <dgm:fillClrLst meth="repeat">
-      <a:schemeClr val="accent1">
-        <a:tint val="60000"/>
-      </a:schemeClr>
-    </dgm:fillClrLst>
-    <dgm:linClrLst meth="repeat">
-      <a:schemeClr val="accent1">
-        <a:tint val="60000"/>
-      </a:schemeClr>
-    </dgm:linClrLst>
-    <dgm:effectClrLst/>
-    <dgm:txLinClrLst/>
-    <dgm:txFillClrLst/>
-    <dgm:txEffectClrLst/>
-  </dgm:styleLbl>
-  <dgm:styleLbl name="sibTrans1D1">
-    <dgm:fillClrLst meth="repeat">
-      <a:schemeClr val="accent1"/>
-    </dgm:fillClrLst>
-    <dgm:linClrLst meth="repeat">
-      <a:schemeClr val="accent1"/>
-    </dgm:linClrLst>
-    <dgm:effectClrLst/>
-    <dgm:txLinClrLst/>
-    <dgm:txFillClrLst meth="repeat">
-      <a:schemeClr val="tx1"/>
-    </dgm:txFillClrLst>
-    <dgm:txEffectClrLst/>
-  </dgm:styleLbl>
-  <dgm:styleLbl name="callout">
-    <dgm:fillClrLst meth="repeat">
-      <a:schemeClr val="accent1"/>
-    </dgm:fillClrLst>
-    <dgm:linClrLst meth="repeat">
-      <a:schemeClr val="accent1">
-        <a:tint val="50000"/>
-      </a:schemeClr>
-    </dgm:linClrLst>
-    <dgm:effectClrLst/>
-    <dgm:txLinClrLst/>
-    <dgm:txFillClrLst meth="repeat">
-      <a:schemeClr val="tx1"/>
-    </dgm:txFillClrLst>
-    <dgm:txEffectClrLst/>
-  </dgm:styleLbl>
-  <dgm:styleLbl name="asst0">
-    <dgm:fillClrLst meth="repeat">
-      <a:schemeClr val="accent1"/>
-    </dgm:fillClrLst>
-    <dgm:linClrLst meth="repeat">
-      <a:schemeClr val="lt1"/>
-    </dgm:linClrLst>
-    <dgm:effectClrLst/>
-    <dgm:txLinClrLst/>
-    <dgm:txFillClrLst/>
-    <dgm:txEffectClrLst/>
-  </dgm:styleLbl>
-  <dgm:styleLbl name="asst1">
-    <dgm:fillClrLst meth="repeat">
-      <a:schemeClr val="accent1"/>
-    </dgm:fillClrLst>
-    <dgm:linClrLst meth="repeat">
-      <a:schemeClr val="lt1"/>
-    </dgm:linClrLst>
-    <dgm:effectClrLst/>
-    <dgm:txLinClrLst/>
-    <dgm:txFillClrLst/>
-    <dgm:txEffectClrLst/>
-  </dgm:styleLbl>
-  <dgm:styleLbl name="asst2">
-    <dgm:fillClrLst meth="repeat">
-      <a:schemeClr val="accent1"/>
-    </dgm:fillClrLst>
-    <dgm:linClrLst meth="repeat">
-      <a:schemeClr val="lt1"/>
-    </dgm:linClrLst>
-    <dgm:effectClrLst/>
-    <dgm:txLinClrLst/>
-    <dgm:txFillClrLst/>
-    <dgm:txEffectClrLst/>
-  </dgm:styleLbl>
-  <dgm:styleLbl name="asst3">
-    <dgm:fillClrLst meth="repeat">
-      <a:schemeClr val="accent1"/>
-    </dgm:fillClrLst>
-    <dgm:linClrLst meth="repeat">
-      <a:schemeClr val="lt1"/>
-    </dgm:linClrLst>
-    <dgm:effectClrLst/>
-    <dgm:txLinClrLst/>
-    <dgm:txFillClrLst/>
-    <dgm:txEffectClrLst/>
-  </dgm:styleLbl>
-  <dgm:styleLbl name="asst4">
-    <dgm:fillClrLst meth="repeat">
-      <a:schemeClr val="accent1"/>
-    </dgm:fillClrLst>
-    <dgm:linClrLst meth="repeat">
-      <a:schemeClr val="lt1"/>
-    </dgm:linClrLst>
-    <dgm:effectClrLst/>
-    <dgm:txLinClrLst/>
-    <dgm:txFillClrLst/>
-    <dgm:txEffectClrLst/>
-  </dgm:styleLbl>
-  <dgm:styleLbl name="parChTrans2D1">
-    <dgm:fillClrLst meth="repeat">
-      <a:schemeClr val="accent1">
-        <a:tint val="60000"/>
-      </a:schemeClr>
-    </dgm:fillClrLst>
-    <dgm:linClrLst meth="repeat">
-      <a:schemeClr val="accent1">
-        <a:tint val="60000"/>
-      </a:schemeClr>
-    </dgm:linClrLst>
-    <dgm:effectClrLst/>
-    <dgm:txLinClrLst/>
-    <dgm:txFillClrLst meth="repeat">
-      <a:schemeClr val="lt1"/>
-    </dgm:txFillClrLst>
-    <dgm:txEffectClrLst/>
-  </dgm:styleLbl>
-  <dgm:styleLbl name="parChTrans2D2">
-    <dgm:fillClrLst meth="repeat">
-      <a:schemeClr val="accent1"/>
-    </dgm:fillClrLst>
-    <dgm:linClrLst meth="repeat">
-      <a:schemeClr val="accent1"/>
-    </dgm:linClrLst>
-    <dgm:effectClrLst/>
-    <dgm:txLinClrLst/>
-    <dgm:txFillClrLst meth="repeat">
-      <a:schemeClr val="lt1"/>
-    </dgm:txFillClrLst>
-    <dgm:txEffectClrLst/>
-  </dgm:styleLbl>
-  <dgm:styleLbl name="parChTrans2D3">
-    <dgm:fillClrLst meth="repeat">
-      <a:schemeClr val="accent1"/>
-    </dgm:fillClrLst>
-    <dgm:linClrLst meth="repeat">
-      <a:schemeClr val="accent1"/>
-    </dgm:linClrLst>
-    <dgm:effectClrLst/>
-    <dgm:txLinClrLst/>
-    <dgm:txFillClrLst meth="repeat">
-      <a:schemeClr val="lt1"/>
-    </dgm:txFillClrLst>
-    <dgm:txEffectClrLst/>
-  </dgm:styleLbl>
-  <dgm:styleLbl name="parChTrans2D4">
-    <dgm:fillClrLst meth="repeat">
-      <a:schemeClr val="accent1"/>
-    </dgm:fillClrLst>
-    <dgm:linClrLst meth="repeat">
-      <a:schemeClr val="accent1"/>
-    </dgm:linClrLst>
-    <dgm:effectClrLst/>
-    <dgm:txLinClrLst/>
-    <dgm:txFillClrLst meth="repeat">
-      <a:schemeClr val="lt1"/>
-    </dgm:txFillClrLst>
-    <dgm:txEffectClrLst/>
-  </dgm:styleLbl>
-  <dgm:styleLbl name="parChTrans1D1">
-    <dgm:fillClrLst meth="repeat">
-      <a:schemeClr val="accent1"/>
-    </dgm:fillClrLst>
-    <dgm:linClrLst meth="repeat">
-      <a:schemeClr val="accent1">
-        <a:shade val="60000"/>
-      </a:schemeClr>
-    </dgm:linClrLst>
-    <dgm:effectClrLst/>
-    <dgm:txLinClrLst/>
-    <dgm:txFillClrLst meth="repeat">
-      <a:schemeClr val="tx1"/>
-    </dgm:txFillClrLst>
-    <dgm:txEffectClrLst/>
-  </dgm:styleLbl>
-  <dgm:styleLbl name="parChTrans1D2">
-    <dgm:fillClrLst meth="repeat">
-      <a:schemeClr val="accent1"/>
-    </dgm:fillClrLst>
-    <dgm:linClrLst meth="repeat">
-      <a:schemeClr val="accent1">
-        <a:shade val="60000"/>
-      </a:schemeClr>
-    </dgm:linClrLst>
-    <dgm:effectClrLst/>
-    <dgm:txLinClrLst/>
-    <dgm:txFillClrLst meth="repeat">
-      <a:schemeClr val="tx1"/>
-    </dgm:txFillClrLst>
-    <dgm:txEffectClrLst/>
-  </dgm:styleLbl>
-  <dgm:styleLbl name="parChTrans1D3">
-    <dgm:fillClrLst meth="repeat">
-      <a:schemeClr val="accent1"/>
-    </dgm:fillClrLst>
-    <dgm:linClrLst meth="repeat">
-      <a:schemeClr val="accent1">
-        <a:shade val="80000"/>
-      </a:schemeClr>
-    </dgm:linClrLst>
-    <dgm:effectClrLst/>
-    <dgm:txLinClrLst/>
-    <dgm:txFillClrLst meth="repeat">
-      <a:schemeClr val="tx1"/>
-    </dgm:txFillClrLst>
-    <dgm:txEffectClrLst/>
-  </dgm:styleLbl>
-  <dgm:styleLbl name="parChTrans1D4">
-    <dgm:fillClrLst meth="repeat">
-      <a:schemeClr val="accent1"/>
-    </dgm:fillClrLst>
-    <dgm:linClrLst meth="repeat">
-      <a:schemeClr val="accent1">
-        <a:shade val="80000"/>
-      </a:schemeClr>
-    </dgm:linClrLst>
-    <dgm:effectClrLst/>
-    <dgm:txLinClrLst/>
-    <dgm:txFillClrLst meth="repeat">
-      <a:schemeClr val="tx1"/>
-    </dgm:txFillClrLst>
-    <dgm:txEffectClrLst/>
-  </dgm:styleLbl>
-  <dgm:styleLbl name="fgAcc1">
-    <dgm:fillClrLst meth="repeat">
-      <a:schemeClr val="lt1">
-        <a:alpha val="90000"/>
-      </a:schemeClr>
-    </dgm:fillClrLst>
-    <dgm:linClrLst meth="repeat">
-      <a:schemeClr val="accent1"/>
-    </dgm:linClrLst>
-    <dgm:effectClrLst/>
-    <dgm:txLinClrLst/>
-    <dgm:txFillClrLst meth="repeat">
-      <a:schemeClr val="dk1"/>
-    </dgm:txFillClrLst>
-    <dgm:txEffectClrLst/>
-  </dgm:styleLbl>
-  <dgm:styleLbl name="conFgAcc1">
-    <dgm:fillClrLst meth="repeat">
-      <a:schemeClr val="lt1">
-        <a:alpha val="90000"/>
-      </a:schemeClr>
-    </dgm:fillClrLst>
-    <dgm:linClrLst meth="repeat">
-      <a:schemeClr val="accent1"/>
-    </dgm:linClrLst>
-    <dgm:effectClrLst/>
-    <dgm:txLinClrLst/>
-    <dgm:txFillClrLst meth="repeat">
-      <a:schemeClr val="dk1"/>
-    </dgm:txFillClrLst>
-    <dgm:txEffectClrLst/>
-  </dgm:styleLbl>
-  <dgm:styleLbl name="alignAcc1">
-    <dgm:fillClrLst meth="repeat">
-      <a:schemeClr val="lt1">
-        <a:alpha val="90000"/>
-      </a:schemeClr>
-    </dgm:fillClrLst>
-    <dgm:linClrLst meth="repeat">
-      <a:schemeClr val="accent1"/>
-    </dgm:linClrLst>
-    <dgm:effectClrLst/>
-    <dgm:txLinClrLst/>
-    <dgm:txFillClrLst meth="repeat">
-      <a:schemeClr val="dk1"/>
-    </dgm:txFillClrLst>
-    <dgm:txEffectClrLst/>
-  </dgm:styleLbl>
-  <dgm:styleLbl name="trAlignAcc1">
-    <dgm:fillClrLst meth="repeat">
-      <a:schemeClr val="lt1">
-        <a:alpha val="40000"/>
-      </a:schemeClr>
-    </dgm:fillClrLst>
-    <dgm:linClrLst meth="repeat">
-      <a:schemeClr val="accent1"/>
-    </dgm:linClrLst>
-    <dgm:effectClrLst/>
-    <dgm:txLinClrLst/>
-    <dgm:txFillClrLst meth="repeat">
-      <a:schemeClr val="dk1"/>
-    </dgm:txFillClrLst>
-    <dgm:txEffectClrLst/>
-  </dgm:styleLbl>
-  <dgm:styleLbl name="bgAcc1">
-    <dgm:fillClrLst meth="repeat">
-      <a:schemeClr val="lt1">
-        <a:alpha val="90000"/>
-      </a:schemeClr>
-    </dgm:fillClrLst>
-    <dgm:linClrLst meth="repeat">
-      <a:schemeClr val="accent1"/>
-    </dgm:linClrLst>
-    <dgm:effectClrLst/>
-    <dgm:txLinClrLst/>
-    <dgm:txFillClrLst meth="repeat">
-      <a:schemeClr val="dk1"/>
-    </dgm:txFillClrLst>
-    <dgm:txEffectClrLst/>
-  </dgm:styleLbl>
-  <dgm:styleLbl name="solidFgAcc1">
-    <dgm:fillClrLst meth="repeat">
-      <a:schemeClr val="lt1"/>
-    </dgm:fillClrLst>
-    <dgm:linClrLst meth="repeat">
-      <a:schemeClr val="accent1"/>
-    </dgm:linClrLst>
-    <dgm:effectClrLst/>
-    <dgm:txLinClrLst/>
-    <dgm:txFillClrLst meth="repeat">
-      <a:schemeClr val="dk1"/>
-    </dgm:txFillClrLst>
-    <dgm:txEffectClrLst/>
-  </dgm:styleLbl>
-  <dgm:styleLbl name="solidAlignAcc1">
-    <dgm:fillClrLst meth="repeat">
-      <a:schemeClr val="lt1"/>
-    </dgm:fillClrLst>
-    <dgm:linClrLst meth="repeat">
-      <a:schemeClr val="accent1"/>
-    </dgm:linClrLst>
-    <dgm:effectClrLst/>
-    <dgm:txLinClrLst/>
-    <dgm:txFillClrLst meth="repeat">
-      <a:schemeClr val="dk1"/>
-    </dgm:txFillClrLst>
-    <dgm:txEffectClrLst/>
-  </dgm:styleLbl>
-  <dgm:styleLbl name="solidBgAcc1">
-    <dgm:fillClrLst meth="repeat">
-      <a:schemeClr val="lt1"/>
-    </dgm:fillClrLst>
-    <dgm:linClrLst meth="repeat">
-      <a:schemeClr val="accent1"/>
-    </dgm:linClrLst>
-    <dgm:effectClrLst/>
-    <dgm:txLinClrLst/>
-    <dgm:txFillClrLst meth="repeat">
-      <a:schemeClr val="dk1"/>
-    </dgm:txFillClrLst>
-    <dgm:txEffectClrLst/>
-  </dgm:styleLbl>
-  <dgm:styleLbl name="fgAccFollowNode1">
-    <dgm:fillClrLst meth="repeat">
-      <a:schemeClr val="accent1">
-        <a:alpha val="90000"/>
-        <a:tint val="40000"/>
-      </a:schemeClr>
-    </dgm:fillClrLst>
-    <dgm:linClrLst meth="repeat">
-      <a:schemeClr val="accent1">
-        <a:alpha val="90000"/>
-        <a:tint val="40000"/>
-      </a:schemeClr>
-    </dgm:linClrLst>
-    <dgm:effectClrLst/>
-    <dgm:txLinClrLst/>
-    <dgm:txFillClrLst meth="repeat">
-      <a:schemeClr val="dk1"/>
-    </dgm:txFillClrLst>
-    <dgm:txEffectClrLst/>
-  </dgm:styleLbl>
-  <dgm:styleLbl name="alignAccFollowNode1">
-    <dgm:fillClrLst meth="repeat">
-      <a:schemeClr val="accent1">
-        <a:alpha val="90000"/>
-        <a:tint val="40000"/>
-      </a:schemeClr>
-    </dgm:fillClrLst>
-    <dgm:linClrLst meth="repeat">
-      <a:schemeClr val="accent1">
-        <a:alpha val="90000"/>
-        <a:tint val="40000"/>
-      </a:schemeClr>
-    </dgm:linClrLst>
-    <dgm:effectClrLst/>
-    <dgm:txLinClrLst/>
-    <dgm:txFillClrLst meth="repeat">
-      <a:schemeClr val="dk1"/>
-    </dgm:txFillClrLst>
-    <dgm:txEffectClrLst/>
-  </dgm:styleLbl>
-  <dgm:styleLbl name="bgAccFollowNode1">
-    <dgm:fillClrLst meth="repeat">
-      <a:schemeClr val="accent1">
-        <a:alpha val="90000"/>
-        <a:tint val="40000"/>
-      </a:schemeClr>
-    </dgm:fillClrLst>
-    <dgm:linClrLst meth="repeat">
-      <a:schemeClr val="accent1">
-        <a:alpha val="90000"/>
-        <a:tint val="40000"/>
-      </a:schemeClr>
-    </dgm:linClrLst>
-    <dgm:effectClrLst/>
-    <dgm:txLinClrLst/>
-    <dgm:txFillClrLst meth="repeat">
-      <a:schemeClr val="dk1"/>
-    </dgm:txFillClrLst>
-    <dgm:txEffectClrLst/>
-  </dgm:styleLbl>
-  <dgm:styleLbl name="fgAcc0">
-    <dgm:fillClrLst meth="repeat">
-      <a:schemeClr val="lt1">
-        <a:alpha val="90000"/>
-      </a:schemeClr>
-    </dgm:fillClrLst>
-    <dgm:linClrLst meth="repeat">
-      <a:schemeClr val="accent1"/>
-    </dgm:linClrLst>
-    <dgm:effectClrLst/>
-    <dgm:txLinClrLst/>
-    <dgm:txFillClrLst meth="repeat">
-      <a:schemeClr val="dk1"/>
-    </dgm:txFillClrLst>
-    <dgm:txEffectClrLst/>
-  </dgm:styleLbl>
-  <dgm:styleLbl name="fgAcc2">
-    <dgm:fillClrLst meth="repeat">
-      <a:schemeClr val="lt1">
-        <a:alpha val="90000"/>
-      </a:schemeClr>
-    </dgm:fillClrLst>
-    <dgm:linClrLst meth="repeat">
-      <a:schemeClr val="accent1"/>
-    </dgm:linClrLst>
-    <dgm:effectClrLst/>
-    <dgm:txLinClrLst/>
-    <dgm:txFillClrLst meth="repeat">
-      <a:schemeClr val="dk1"/>
-    </dgm:txFillClrLst>
-    <dgm:txEffectClrLst/>
-  </dgm:styleLbl>
-  <dgm:styleLbl name="fgAcc3">
-    <dgm:fillClrLst meth="repeat">
-      <a:schemeClr val="lt1">
-        <a:alpha val="90000"/>
-      </a:schemeClr>
-    </dgm:fillClrLst>
-    <dgm:linClrLst meth="repeat">
-      <a:schemeClr val="accent1"/>
-    </dgm:linClrLst>
-    <dgm:effectClrLst/>
-    <dgm:txLinClrLst/>
-    <dgm:txFillClrLst meth="repeat">
-      <a:schemeClr val="dk1"/>
-    </dgm:txFillClrLst>
-    <dgm:txEffectClrLst/>
-  </dgm:styleLbl>
-  <dgm:styleLbl name="fgAcc4">
-    <dgm:fillClrLst meth="repeat">
-      <a:schemeClr val="lt1">
-        <a:alpha val="90000"/>
-      </a:schemeClr>
-    </dgm:fillClrLst>
-    <dgm:linClrLst meth="repeat">
-      <a:schemeClr val="accent1"/>
-    </dgm:linClrLst>
-    <dgm:effectClrLst/>
-    <dgm:txLinClrLst/>
-    <dgm:txFillClrLst meth="repeat">
-      <a:schemeClr val="dk1"/>
-    </dgm:txFillClrLst>
-    <dgm:txEffectClrLst/>
-  </dgm:styleLbl>
-  <dgm:styleLbl name="bgShp">
-    <dgm:fillClrLst meth="repeat">
-      <a:schemeClr val="accent1">
-        <a:tint val="40000"/>
-      </a:schemeClr>
-    </dgm:fillClrLst>
-    <dgm:linClrLst meth="repeat">
-      <a:schemeClr val="accent1"/>
-    </dgm:linClrLst>
-    <dgm:effectClrLst/>
-    <dgm:txLinClrLst/>
-    <dgm:txFillClrLst meth="repeat">
-      <a:schemeClr val="dk1"/>
-    </dgm:txFillClrLst>
-    <dgm:txEffectClrLst/>
-  </dgm:styleLbl>
-  <dgm:styleLbl name="dkBgShp">
-    <dgm:fillClrLst meth="repeat">
-      <a:schemeClr val="accent1">
-        <a:shade val="80000"/>
-      </a:schemeClr>
-    </dgm:fillClrLst>
-    <dgm:linClrLst meth="repeat">
-      <a:schemeClr val="accent1"/>
-    </dgm:linClrLst>
-    <dgm:effectClrLst/>
-    <dgm:txLinClrLst/>
-    <dgm:txFillClrLst meth="repeat">
-      <a:schemeClr val="lt1"/>
-    </dgm:txFillClrLst>
-    <dgm:txEffectClrLst/>
-  </dgm:styleLbl>
-  <dgm:styleLbl name="trBgShp">
-    <dgm:fillClrLst meth="repeat">
-      <a:schemeClr val="accent1">
-        <a:tint val="50000"/>
-        <a:alpha val="40000"/>
-      </a:schemeClr>
-    </dgm:fillClrLst>
-    <dgm:linClrLst meth="repeat">
-      <a:schemeClr val="accent1"/>
-    </dgm:linClrLst>
-    <dgm:effectClrLst/>
-    <dgm:txLinClrLst/>
-    <dgm:txFillClrLst meth="repeat">
-      <a:schemeClr val="lt1"/>
-    </dgm:txFillClrLst>
-    <dgm:txEffectClrLst/>
-  </dgm:styleLbl>
-  <dgm:styleLbl name="fgShp">
-    <dgm:fillClrLst meth="repeat">
-      <a:schemeClr val="accent1">
-        <a:tint val="60000"/>
-      </a:schemeClr>
-    </dgm:fillClrLst>
-    <dgm:linClrLst meth="repeat">
-      <a:schemeClr val="lt1"/>
-    </dgm:linClrLst>
-    <dgm:effectClrLst/>
-    <dgm:txLinClrLst/>
-    <dgm:txFillClrLst meth="repeat">
-      <a:schemeClr val="dk1"/>
-    </dgm:txFillClrLst>
-    <dgm:txEffectClrLst/>
-  </dgm:styleLbl>
-  <dgm:styleLbl name="revTx">
-    <dgm:fillClrLst meth="repeat">
-      <a:schemeClr val="lt1">
-        <a:alpha val="0"/>
-      </a:schemeClr>
-    </dgm:fillClrLst>
-    <dgm:linClrLst meth="repeat">
-      <a:schemeClr val="dk1">
-        <a:alpha val="0"/>
-      </a:schemeClr>
-    </dgm:linClrLst>
-    <dgm:effectClrLst/>
-    <dgm:txLinClrLst/>
-    <dgm:txFillClrLst meth="repeat">
-      <a:schemeClr val="tx1"/>
-    </dgm:txFillClrLst>
-    <dgm:txEffectClrLst/>
-  </dgm:styleLbl>
-</dgm:colorsDef>
-</file>
-
 <file path=ppt/diagrams/data1.xml><?xml version="1.0" encoding="utf-8"?>
-<dgm:dataModel xmlns:dgm="http://schemas.openxmlformats.org/drawingml/2006/diagram" xmlns:a="http://schemas.openxmlformats.org/drawingml/2006/main">
-  <dgm:ptLst>
-    <dgm:pt modelId="{86A49D73-AE42-472E-BB9E-E5D3C1127B86}" type="doc">
-      <dgm:prSet loTypeId="urn:microsoft.com/office/officeart/2005/8/layout/hList1" loCatId="list" qsTypeId="urn:microsoft.com/office/officeart/2005/8/quickstyle/simple1" qsCatId="simple" csTypeId="urn:microsoft.com/office/officeart/2005/8/colors/accent1_2" csCatId="accent1" phldr="0"/>
-      <dgm:spPr/>
-      <dgm:t>
-        <a:bodyPr/>
-        <a:lstStyle/>
-        <a:p>
-          <a:endParaRPr lang="en-US"/>
-        </a:p>
-      </dgm:t>
-    </dgm:pt>
-    <dgm:pt modelId="{98B80D4A-954D-4AF7-8A36-075295FD3C2F}">
-      <dgm:prSet phldrT="[Text]" phldr="1"/>
-      <dgm:spPr/>
-      <dgm:t>
-        <a:bodyPr/>
-        <a:lstStyle/>
-        <a:p>
-          <a:endParaRPr lang="en-US" dirty="0"/>
-        </a:p>
-      </dgm:t>
-    </dgm:pt>
-    <dgm:pt modelId="{C7543F72-D766-4A32-ACC1-46AB2ABD8BF6}" type="parTrans" cxnId="{C1A27116-1870-4A34-A774-4A8AFD055256}">
-      <dgm:prSet/>
-      <dgm:spPr/>
-      <dgm:t>
-        <a:bodyPr/>
-        <a:lstStyle/>
-        <a:p>
-          <a:endParaRPr lang="en-US"/>
-        </a:p>
-      </dgm:t>
-    </dgm:pt>
-    <dgm:pt modelId="{F154E4B3-F97D-4D64-8C26-27B2FCF8B62A}" type="sibTrans" cxnId="{C1A27116-1870-4A34-A774-4A8AFD055256}">
-      <dgm:prSet/>
-      <dgm:spPr/>
-      <dgm:t>
-        <a:bodyPr/>
-        <a:lstStyle/>
-        <a:p>
-          <a:endParaRPr lang="en-US"/>
-        </a:p>
-      </dgm:t>
-    </dgm:pt>
-    <dgm:pt modelId="{2FF38BBF-0E25-4390-B507-173A933017AD}">
-      <dgm:prSet phldrT="[Text]" phldr="1"/>
-      <dgm:spPr/>
-      <dgm:t>
-        <a:bodyPr/>
-        <a:lstStyle/>
-        <a:p>
-          <a:endParaRPr lang="en-US"/>
-        </a:p>
-      </dgm:t>
-    </dgm:pt>
-    <dgm:pt modelId="{620FA91C-DD6A-42E3-89AC-076B49A08790}" type="parTrans" cxnId="{817F25E3-161A-4566-8A15-D47D7F9D2211}">
-      <dgm:prSet/>
-      <dgm:spPr/>
-      <dgm:t>
-        <a:bodyPr/>
-        <a:lstStyle/>
-        <a:p>
-          <a:endParaRPr lang="en-US"/>
-        </a:p>
-      </dgm:t>
-    </dgm:pt>
-    <dgm:pt modelId="{73A4440D-61FB-4353-B2AF-8BF0C0611A6C}" type="sibTrans" cxnId="{817F25E3-161A-4566-8A15-D47D7F9D2211}">
-      <dgm:prSet/>
-      <dgm:spPr/>
-      <dgm:t>
-        <a:bodyPr/>
-        <a:lstStyle/>
-        <a:p>
-          <a:endParaRPr lang="en-US"/>
-        </a:p>
-      </dgm:t>
-    </dgm:pt>
-    <dgm:pt modelId="{067CD78B-BD38-461B-868B-40F9F114EC9C}">
-      <dgm:prSet phldrT="[Text]" phldr="1"/>
-      <dgm:spPr/>
-      <dgm:t>
-        <a:bodyPr/>
-        <a:lstStyle/>
-        <a:p>
-          <a:endParaRPr lang="en-US"/>
-        </a:p>
-      </dgm:t>
-    </dgm:pt>
-    <dgm:pt modelId="{590219E0-84CE-45F0-B29E-052CC5496AD8}" type="parTrans" cxnId="{3D22B5D0-9543-4F81-8438-FD27AB139956}">
-      <dgm:prSet/>
-      <dgm:spPr/>
-      <dgm:t>
-        <a:bodyPr/>
-        <a:lstStyle/>
-        <a:p>
-          <a:endParaRPr lang="en-US"/>
-        </a:p>
-      </dgm:t>
-    </dgm:pt>
-    <dgm:pt modelId="{3D0C9151-BB03-4ADA-8DA4-C6C9287D739F}" type="sibTrans" cxnId="{3D22B5D0-9543-4F81-8438-FD27AB139956}">
-      <dgm:prSet/>
-      <dgm:spPr/>
-      <dgm:t>
-        <a:bodyPr/>
-        <a:lstStyle/>
-        <a:p>
-          <a:endParaRPr lang="en-US"/>
-        </a:p>
-      </dgm:t>
-    </dgm:pt>
-    <dgm:pt modelId="{991076CC-58AD-4D79-9E32-C7A73A04B68E}">
-      <dgm:prSet phldrT="[Text]" phldr="1"/>
-      <dgm:spPr/>
-      <dgm:t>
-        <a:bodyPr/>
-        <a:lstStyle/>
-        <a:p>
-          <a:endParaRPr lang="en-US"/>
-        </a:p>
-      </dgm:t>
-    </dgm:pt>
-    <dgm:pt modelId="{6FD831E5-EBE8-499A-ADC7-05B5D73519C2}" type="parTrans" cxnId="{FE47ABD8-87A2-4FC8-BE29-3C3B2C8CD78D}">
-      <dgm:prSet/>
-      <dgm:spPr/>
-      <dgm:t>
-        <a:bodyPr/>
-        <a:lstStyle/>
-        <a:p>
-          <a:endParaRPr lang="en-US"/>
-        </a:p>
-      </dgm:t>
-    </dgm:pt>
-    <dgm:pt modelId="{2384DCBC-D5B3-41D0-A56F-B4ECB504CF11}" type="sibTrans" cxnId="{FE47ABD8-87A2-4FC8-BE29-3C3B2C8CD78D}">
-      <dgm:prSet/>
-      <dgm:spPr/>
-      <dgm:t>
-        <a:bodyPr/>
-        <a:lstStyle/>
-        <a:p>
-          <a:endParaRPr lang="en-US"/>
-        </a:p>
-      </dgm:t>
-    </dgm:pt>
-    <dgm:pt modelId="{69B92879-F63D-4FA6-B642-364814476347}">
-      <dgm:prSet phldrT="[Text]" phldr="1"/>
-      <dgm:spPr/>
-      <dgm:t>
-        <a:bodyPr/>
-        <a:lstStyle/>
-        <a:p>
-          <a:endParaRPr lang="en-US"/>
-        </a:p>
-      </dgm:t>
-    </dgm:pt>
-    <dgm:pt modelId="{3EE874AE-5339-4F5B-84C8-BE0DE1258EC7}" type="parTrans" cxnId="{987CE2C3-49C2-45D6-8830-CE2C0332B58E}">
-      <dgm:prSet/>
-      <dgm:spPr/>
-      <dgm:t>
-        <a:bodyPr/>
-        <a:lstStyle/>
-        <a:p>
-          <a:endParaRPr lang="en-US"/>
-        </a:p>
-      </dgm:t>
-    </dgm:pt>
-    <dgm:pt modelId="{423A51C3-46F0-4EB8-B5B2-49DD01DB1303}" type="sibTrans" cxnId="{987CE2C3-49C2-45D6-8830-CE2C0332B58E}">
-      <dgm:prSet/>
-      <dgm:spPr/>
-      <dgm:t>
-        <a:bodyPr/>
-        <a:lstStyle/>
-        <a:p>
-          <a:endParaRPr lang="en-US"/>
-        </a:p>
-      </dgm:t>
-    </dgm:pt>
-    <dgm:pt modelId="{6A91E5DA-E03E-4331-87D8-A4D78B01AE46}">
-      <dgm:prSet phldrT="[Text]" phldr="1"/>
-      <dgm:spPr/>
-      <dgm:t>
-        <a:bodyPr/>
-        <a:lstStyle/>
-        <a:p>
-          <a:endParaRPr lang="en-US"/>
-        </a:p>
-      </dgm:t>
-    </dgm:pt>
-    <dgm:pt modelId="{C1919B15-E64E-44F8-9EE4-0869658C0DF0}" type="parTrans" cxnId="{2BCEBD92-1735-496A-B5A5-2BD3FA4541AE}">
-      <dgm:prSet/>
-      <dgm:spPr/>
-      <dgm:t>
-        <a:bodyPr/>
-        <a:lstStyle/>
-        <a:p>
-          <a:endParaRPr lang="en-US"/>
-        </a:p>
-      </dgm:t>
-    </dgm:pt>
-    <dgm:pt modelId="{21D22762-0EC7-4F34-9B41-628663D82C1D}" type="sibTrans" cxnId="{2BCEBD92-1735-496A-B5A5-2BD3FA4541AE}">
-      <dgm:prSet/>
-      <dgm:spPr/>
-      <dgm:t>
-        <a:bodyPr/>
-        <a:lstStyle/>
-        <a:p>
-          <a:endParaRPr lang="en-US"/>
-        </a:p>
-      </dgm:t>
-    </dgm:pt>
-    <dgm:pt modelId="{6AA52068-4AC3-4CF2-96E6-5A504222835A}">
-      <dgm:prSet phldrT="[Text]" phldr="1"/>
-      <dgm:spPr/>
-      <dgm:t>
-        <a:bodyPr/>
-        <a:lstStyle/>
-        <a:p>
-          <a:endParaRPr lang="en-US"/>
-        </a:p>
-      </dgm:t>
-    </dgm:pt>
-    <dgm:pt modelId="{E9F8B312-B872-472D-9895-CA49F0DA94A1}" type="parTrans" cxnId="{56E05C10-4FEF-4548-84F3-2A5BF2EDE1A5}">
-      <dgm:prSet/>
-      <dgm:spPr/>
-      <dgm:t>
-        <a:bodyPr/>
-        <a:lstStyle/>
-        <a:p>
-          <a:endParaRPr lang="en-US"/>
-        </a:p>
-      </dgm:t>
-    </dgm:pt>
-    <dgm:pt modelId="{00661690-7EE9-404A-9D7D-7167E748626B}" type="sibTrans" cxnId="{56E05C10-4FEF-4548-84F3-2A5BF2EDE1A5}">
-      <dgm:prSet/>
-      <dgm:spPr/>
-      <dgm:t>
-        <a:bodyPr/>
-        <a:lstStyle/>
-        <a:p>
-          <a:endParaRPr lang="en-US"/>
-        </a:p>
-      </dgm:t>
-    </dgm:pt>
-    <dgm:pt modelId="{D5397AA4-4054-408E-A23A-E57D87D9F200}">
-      <dgm:prSet phldrT="[Text]" phldr="1"/>
-      <dgm:spPr/>
-      <dgm:t>
-        <a:bodyPr/>
-        <a:lstStyle/>
-        <a:p>
-          <a:endParaRPr lang="en-US"/>
-        </a:p>
-      </dgm:t>
-    </dgm:pt>
-    <dgm:pt modelId="{0DC70C10-2707-4176-9998-42573FFC9671}" type="parTrans" cxnId="{02DAA0BF-D3E1-40B4-A976-598535E078B2}">
-      <dgm:prSet/>
-      <dgm:spPr/>
-      <dgm:t>
-        <a:bodyPr/>
-        <a:lstStyle/>
-        <a:p>
-          <a:endParaRPr lang="en-US"/>
-        </a:p>
-      </dgm:t>
-    </dgm:pt>
-    <dgm:pt modelId="{8E666C5D-7542-4E83-9FCC-26FABBC19359}" type="sibTrans" cxnId="{02DAA0BF-D3E1-40B4-A976-598535E078B2}">
-      <dgm:prSet/>
-      <dgm:spPr/>
-      <dgm:t>
-        <a:bodyPr/>
-        <a:lstStyle/>
-        <a:p>
-          <a:endParaRPr lang="en-US"/>
-        </a:p>
-      </dgm:t>
-    </dgm:pt>
-    <dgm:pt modelId="{E5EA2B01-F97E-49DA-B195-95881EA8D774}">
-      <dgm:prSet phldrT="[Text]" phldr="1"/>
-      <dgm:spPr/>
-      <dgm:t>
-        <a:bodyPr/>
-        <a:lstStyle/>
-        <a:p>
-          <a:endParaRPr lang="en-US"/>
-        </a:p>
-      </dgm:t>
-    </dgm:pt>
-    <dgm:pt modelId="{C490C9EC-A2EF-4FDB-9CE8-2D0F23980301}" type="parTrans" cxnId="{76F50F15-A58D-469F-A50B-BFBE78BE6112}">
-      <dgm:prSet/>
-      <dgm:spPr/>
-      <dgm:t>
-        <a:bodyPr/>
-        <a:lstStyle/>
-        <a:p>
-          <a:endParaRPr lang="en-US"/>
-        </a:p>
-      </dgm:t>
-    </dgm:pt>
-    <dgm:pt modelId="{AFEDD573-1CAC-400A-9519-E6887D553305}" type="sibTrans" cxnId="{76F50F15-A58D-469F-A50B-BFBE78BE6112}">
-      <dgm:prSet/>
-      <dgm:spPr/>
-      <dgm:t>
-        <a:bodyPr/>
-        <a:lstStyle/>
-        <a:p>
-          <a:endParaRPr lang="en-US"/>
-        </a:p>
-      </dgm:t>
-    </dgm:pt>
-    <dgm:pt modelId="{E35A0407-1D59-43C5-B9EC-976C5836CA4B}" type="pres">
-      <dgm:prSet presAssocID="{86A49D73-AE42-472E-BB9E-E5D3C1127B86}" presName="Name0" presStyleCnt="0">
-        <dgm:presLayoutVars>
-          <dgm:dir/>
-          <dgm:animLvl val="lvl"/>
-          <dgm:resizeHandles val="exact"/>
-        </dgm:presLayoutVars>
-      </dgm:prSet>
-      <dgm:spPr/>
-    </dgm:pt>
-    <dgm:pt modelId="{6E267C0F-0F0A-4B4F-8279-517D130069A2}" type="pres">
-      <dgm:prSet presAssocID="{98B80D4A-954D-4AF7-8A36-075295FD3C2F}" presName="composite" presStyleCnt="0"/>
-      <dgm:spPr/>
-    </dgm:pt>
-    <dgm:pt modelId="{464AF94A-DA69-4A31-B243-9BBD9F6B3ED4}" type="pres">
-      <dgm:prSet presAssocID="{98B80D4A-954D-4AF7-8A36-075295FD3C2F}" presName="parTx" presStyleLbl="alignNode1" presStyleIdx="0" presStyleCnt="3">
-        <dgm:presLayoutVars>
-          <dgm:chMax val="0"/>
-          <dgm:chPref val="0"/>
-          <dgm:bulletEnabled val="1"/>
-        </dgm:presLayoutVars>
-      </dgm:prSet>
-      <dgm:spPr/>
-    </dgm:pt>
-    <dgm:pt modelId="{A063E62B-6CAA-4407-8864-D0EC14E6067A}" type="pres">
-      <dgm:prSet presAssocID="{98B80D4A-954D-4AF7-8A36-075295FD3C2F}" presName="desTx" presStyleLbl="alignAccFollowNode1" presStyleIdx="0" presStyleCnt="3">
-        <dgm:presLayoutVars>
-          <dgm:bulletEnabled val="1"/>
-        </dgm:presLayoutVars>
-      </dgm:prSet>
-      <dgm:spPr/>
-    </dgm:pt>
-    <dgm:pt modelId="{A2D0D185-8EC7-4E47-9CFF-B4FBDF0157CD}" type="pres">
-      <dgm:prSet presAssocID="{F154E4B3-F97D-4D64-8C26-27B2FCF8B62A}" presName="space" presStyleCnt="0"/>
-      <dgm:spPr/>
-    </dgm:pt>
-    <dgm:pt modelId="{41105D39-99A5-442D-AA2A-7A1F0FEAD180}" type="pres">
-      <dgm:prSet presAssocID="{991076CC-58AD-4D79-9E32-C7A73A04B68E}" presName="composite" presStyleCnt="0"/>
-      <dgm:spPr/>
-    </dgm:pt>
-    <dgm:pt modelId="{FFC36807-4763-4ADE-AAD9-478921B0E41F}" type="pres">
-      <dgm:prSet presAssocID="{991076CC-58AD-4D79-9E32-C7A73A04B68E}" presName="parTx" presStyleLbl="alignNode1" presStyleIdx="1" presStyleCnt="3">
-        <dgm:presLayoutVars>
-          <dgm:chMax val="0"/>
-          <dgm:chPref val="0"/>
-          <dgm:bulletEnabled val="1"/>
-        </dgm:presLayoutVars>
-      </dgm:prSet>
-      <dgm:spPr/>
-    </dgm:pt>
-    <dgm:pt modelId="{9769CF7A-2B0F-4507-9158-8DC44E166C61}" type="pres">
-      <dgm:prSet presAssocID="{991076CC-58AD-4D79-9E32-C7A73A04B68E}" presName="desTx" presStyleLbl="alignAccFollowNode1" presStyleIdx="1" presStyleCnt="3">
-        <dgm:presLayoutVars>
-          <dgm:bulletEnabled val="1"/>
-        </dgm:presLayoutVars>
-      </dgm:prSet>
-      <dgm:spPr/>
-    </dgm:pt>
-    <dgm:pt modelId="{2C19D30D-5317-4A10-A76D-3335157736ED}" type="pres">
-      <dgm:prSet presAssocID="{2384DCBC-D5B3-41D0-A56F-B4ECB504CF11}" presName="space" presStyleCnt="0"/>
-      <dgm:spPr/>
-    </dgm:pt>
-    <dgm:pt modelId="{101BCFB4-4227-49BF-A59E-E1A6A3D3D643}" type="pres">
-      <dgm:prSet presAssocID="{6AA52068-4AC3-4CF2-96E6-5A504222835A}" presName="composite" presStyleCnt="0"/>
-      <dgm:spPr/>
-    </dgm:pt>
-    <dgm:pt modelId="{1360325F-F23D-4F1F-AC56-D3562B42928A}" type="pres">
-      <dgm:prSet presAssocID="{6AA52068-4AC3-4CF2-96E6-5A504222835A}" presName="parTx" presStyleLbl="alignNode1" presStyleIdx="2" presStyleCnt="3">
-        <dgm:presLayoutVars>
-          <dgm:chMax val="0"/>
-          <dgm:chPref val="0"/>
-          <dgm:bulletEnabled val="1"/>
-        </dgm:presLayoutVars>
-      </dgm:prSet>
-      <dgm:spPr/>
-    </dgm:pt>
-    <dgm:pt modelId="{09EB9851-37A5-4011-B4E0-FD518C04A158}" type="pres">
-      <dgm:prSet presAssocID="{6AA52068-4AC3-4CF2-96E6-5A504222835A}" presName="desTx" presStyleLbl="alignAccFollowNode1" presStyleIdx="2" presStyleCnt="3">
-        <dgm:presLayoutVars>
-          <dgm:bulletEnabled val="1"/>
-        </dgm:presLayoutVars>
-      </dgm:prSet>
-      <dgm:spPr/>
-    </dgm:pt>
-  </dgm:ptLst>
-  <dgm:cxnLst>
-    <dgm:cxn modelId="{56E05C10-4FEF-4548-84F3-2A5BF2EDE1A5}" srcId="{86A49D73-AE42-472E-BB9E-E5D3C1127B86}" destId="{6AA52068-4AC3-4CF2-96E6-5A504222835A}" srcOrd="2" destOrd="0" parTransId="{E9F8B312-B872-472D-9895-CA49F0DA94A1}" sibTransId="{00661690-7EE9-404A-9D7D-7167E748626B}"/>
-    <dgm:cxn modelId="{76F50F15-A58D-469F-A50B-BFBE78BE6112}" srcId="{6AA52068-4AC3-4CF2-96E6-5A504222835A}" destId="{E5EA2B01-F97E-49DA-B195-95881EA8D774}" srcOrd="1" destOrd="0" parTransId="{C490C9EC-A2EF-4FDB-9CE8-2D0F23980301}" sibTransId="{AFEDD573-1CAC-400A-9519-E6887D553305}"/>
-    <dgm:cxn modelId="{C1A27116-1870-4A34-A774-4A8AFD055256}" srcId="{86A49D73-AE42-472E-BB9E-E5D3C1127B86}" destId="{98B80D4A-954D-4AF7-8A36-075295FD3C2F}" srcOrd="0" destOrd="0" parTransId="{C7543F72-D766-4A32-ACC1-46AB2ABD8BF6}" sibTransId="{F154E4B3-F97D-4D64-8C26-27B2FCF8B62A}"/>
-    <dgm:cxn modelId="{C3840761-1E7B-4454-BE91-4FE2BFF581A7}" type="presOf" srcId="{991076CC-58AD-4D79-9E32-C7A73A04B68E}" destId="{FFC36807-4763-4ADE-AAD9-478921B0E41F}" srcOrd="0" destOrd="0" presId="urn:microsoft.com/office/officeart/2005/8/layout/hList1"/>
-    <dgm:cxn modelId="{8CC0C579-2282-470D-886F-D9D00DC4114D}" type="presOf" srcId="{E5EA2B01-F97E-49DA-B195-95881EA8D774}" destId="{09EB9851-37A5-4011-B4E0-FD518C04A158}" srcOrd="0" destOrd="1" presId="urn:microsoft.com/office/officeart/2005/8/layout/hList1"/>
-    <dgm:cxn modelId="{E39B6D5A-D149-4FEF-8F06-0CB39A640354}" type="presOf" srcId="{D5397AA4-4054-408E-A23A-E57D87D9F200}" destId="{09EB9851-37A5-4011-B4E0-FD518C04A158}" srcOrd="0" destOrd="0" presId="urn:microsoft.com/office/officeart/2005/8/layout/hList1"/>
-    <dgm:cxn modelId="{2BCEBD92-1735-496A-B5A5-2BD3FA4541AE}" srcId="{991076CC-58AD-4D79-9E32-C7A73A04B68E}" destId="{6A91E5DA-E03E-4331-87D8-A4D78B01AE46}" srcOrd="1" destOrd="0" parTransId="{C1919B15-E64E-44F8-9EE4-0869658C0DF0}" sibTransId="{21D22762-0EC7-4F34-9B41-628663D82C1D}"/>
-    <dgm:cxn modelId="{74E75E9B-F53B-4AA8-BAE1-EC570F8354DF}" type="presOf" srcId="{86A49D73-AE42-472E-BB9E-E5D3C1127B86}" destId="{E35A0407-1D59-43C5-B9EC-976C5836CA4B}" srcOrd="0" destOrd="0" presId="urn:microsoft.com/office/officeart/2005/8/layout/hList1"/>
-    <dgm:cxn modelId="{4BED919E-7B90-4C67-8FB5-29F10FD811FC}" type="presOf" srcId="{6AA52068-4AC3-4CF2-96E6-5A504222835A}" destId="{1360325F-F23D-4F1F-AC56-D3562B42928A}" srcOrd="0" destOrd="0" presId="urn:microsoft.com/office/officeart/2005/8/layout/hList1"/>
-    <dgm:cxn modelId="{482889B6-5228-44E3-AB30-4DF1B99BC0A6}" type="presOf" srcId="{067CD78B-BD38-461B-868B-40F9F114EC9C}" destId="{A063E62B-6CAA-4407-8864-D0EC14E6067A}" srcOrd="0" destOrd="1" presId="urn:microsoft.com/office/officeart/2005/8/layout/hList1"/>
-    <dgm:cxn modelId="{02DAA0BF-D3E1-40B4-A976-598535E078B2}" srcId="{6AA52068-4AC3-4CF2-96E6-5A504222835A}" destId="{D5397AA4-4054-408E-A23A-E57D87D9F200}" srcOrd="0" destOrd="0" parTransId="{0DC70C10-2707-4176-9998-42573FFC9671}" sibTransId="{8E666C5D-7542-4E83-9FCC-26FABBC19359}"/>
-    <dgm:cxn modelId="{987CE2C3-49C2-45D6-8830-CE2C0332B58E}" srcId="{991076CC-58AD-4D79-9E32-C7A73A04B68E}" destId="{69B92879-F63D-4FA6-B642-364814476347}" srcOrd="0" destOrd="0" parTransId="{3EE874AE-5339-4F5B-84C8-BE0DE1258EC7}" sibTransId="{423A51C3-46F0-4EB8-B5B2-49DD01DB1303}"/>
-    <dgm:cxn modelId="{3C25EFC3-BDD0-4AF3-AA64-42C06F7D2B79}" type="presOf" srcId="{98B80D4A-954D-4AF7-8A36-075295FD3C2F}" destId="{464AF94A-DA69-4A31-B243-9BBD9F6B3ED4}" srcOrd="0" destOrd="0" presId="urn:microsoft.com/office/officeart/2005/8/layout/hList1"/>
-    <dgm:cxn modelId="{BFE051CE-81AB-4703-AF0F-36D1FC1514A1}" type="presOf" srcId="{6A91E5DA-E03E-4331-87D8-A4D78B01AE46}" destId="{9769CF7A-2B0F-4507-9158-8DC44E166C61}" srcOrd="0" destOrd="1" presId="urn:microsoft.com/office/officeart/2005/8/layout/hList1"/>
-    <dgm:cxn modelId="{3D22B5D0-9543-4F81-8438-FD27AB139956}" srcId="{98B80D4A-954D-4AF7-8A36-075295FD3C2F}" destId="{067CD78B-BD38-461B-868B-40F9F114EC9C}" srcOrd="1" destOrd="0" parTransId="{590219E0-84CE-45F0-B29E-052CC5496AD8}" sibTransId="{3D0C9151-BB03-4ADA-8DA4-C6C9287D739F}"/>
-    <dgm:cxn modelId="{FE47ABD8-87A2-4FC8-BE29-3C3B2C8CD78D}" srcId="{86A49D73-AE42-472E-BB9E-E5D3C1127B86}" destId="{991076CC-58AD-4D79-9E32-C7A73A04B68E}" srcOrd="1" destOrd="0" parTransId="{6FD831E5-EBE8-499A-ADC7-05B5D73519C2}" sibTransId="{2384DCBC-D5B3-41D0-A56F-B4ECB504CF11}"/>
-    <dgm:cxn modelId="{817F25E3-161A-4566-8A15-D47D7F9D2211}" srcId="{98B80D4A-954D-4AF7-8A36-075295FD3C2F}" destId="{2FF38BBF-0E25-4390-B507-173A933017AD}" srcOrd="0" destOrd="0" parTransId="{620FA91C-DD6A-42E3-89AC-076B49A08790}" sibTransId="{73A4440D-61FB-4353-B2AF-8BF0C0611A6C}"/>
-    <dgm:cxn modelId="{24433EEF-2ECF-41F1-8485-F2148905CF74}" type="presOf" srcId="{69B92879-F63D-4FA6-B642-364814476347}" destId="{9769CF7A-2B0F-4507-9158-8DC44E166C61}" srcOrd="0" destOrd="0" presId="urn:microsoft.com/office/officeart/2005/8/layout/hList1"/>
-    <dgm:cxn modelId="{92EC91F4-E54F-40A3-BA55-6DD78009604C}" type="presOf" srcId="{2FF38BBF-0E25-4390-B507-173A933017AD}" destId="{A063E62B-6CAA-4407-8864-D0EC14E6067A}" srcOrd="0" destOrd="0" presId="urn:microsoft.com/office/officeart/2005/8/layout/hList1"/>
-    <dgm:cxn modelId="{8ED7F18B-067A-4A89-9775-0768467684FF}" type="presParOf" srcId="{E35A0407-1D59-43C5-B9EC-976C5836CA4B}" destId="{6E267C0F-0F0A-4B4F-8279-517D130069A2}" srcOrd="0" destOrd="0" presId="urn:microsoft.com/office/officeart/2005/8/layout/hList1"/>
-    <dgm:cxn modelId="{B73ECA6B-676C-44C0-B94B-3589E92F0BBF}" type="presParOf" srcId="{6E267C0F-0F0A-4B4F-8279-517D130069A2}" destId="{464AF94A-DA69-4A31-B243-9BBD9F6B3ED4}" srcOrd="0" destOrd="0" presId="urn:microsoft.com/office/officeart/2005/8/layout/hList1"/>
-    <dgm:cxn modelId="{E5AC264B-9193-418E-92C6-AE7FDEEAA851}" type="presParOf" srcId="{6E267C0F-0F0A-4B4F-8279-517D130069A2}" destId="{A063E62B-6CAA-4407-8864-D0EC14E6067A}" srcOrd="1" destOrd="0" presId="urn:microsoft.com/office/officeart/2005/8/layout/hList1"/>
-    <dgm:cxn modelId="{778C43B1-CD33-40FC-A91A-533DBCAA9AF3}" type="presParOf" srcId="{E35A0407-1D59-43C5-B9EC-976C5836CA4B}" destId="{A2D0D185-8EC7-4E47-9CFF-B4FBDF0157CD}" srcOrd="1" destOrd="0" presId="urn:microsoft.com/office/officeart/2005/8/layout/hList1"/>
-    <dgm:cxn modelId="{A5DCE31D-B70C-42F1-A980-8D870861BF82}" type="presParOf" srcId="{E35A0407-1D59-43C5-B9EC-976C5836CA4B}" destId="{41105D39-99A5-442D-AA2A-7A1F0FEAD180}" srcOrd="2" destOrd="0" presId="urn:microsoft.com/office/officeart/2005/8/layout/hList1"/>
-    <dgm:cxn modelId="{C01181DF-90A9-4C0C-827C-19DFD050EB2F}" type="presParOf" srcId="{41105D39-99A5-442D-AA2A-7A1F0FEAD180}" destId="{FFC36807-4763-4ADE-AAD9-478921B0E41F}" srcOrd="0" destOrd="0" presId="urn:microsoft.com/office/officeart/2005/8/layout/hList1"/>
-    <dgm:cxn modelId="{ACBB1644-BD7F-405A-8C7F-55B520642AC8}" type="presParOf" srcId="{41105D39-99A5-442D-AA2A-7A1F0FEAD180}" destId="{9769CF7A-2B0F-4507-9158-8DC44E166C61}" srcOrd="1" destOrd="0" presId="urn:microsoft.com/office/officeart/2005/8/layout/hList1"/>
-    <dgm:cxn modelId="{A2C98616-F158-41F7-8C31-E7AB6BB1B1F5}" type="presParOf" srcId="{E35A0407-1D59-43C5-B9EC-976C5836CA4B}" destId="{2C19D30D-5317-4A10-A76D-3335157736ED}" srcOrd="3" destOrd="0" presId="urn:microsoft.com/office/officeart/2005/8/layout/hList1"/>
-    <dgm:cxn modelId="{99F553ED-39B2-4A39-B47D-5B3490C55679}" type="presParOf" srcId="{E35A0407-1D59-43C5-B9EC-976C5836CA4B}" destId="{101BCFB4-4227-49BF-A59E-E1A6A3D3D643}" srcOrd="4" destOrd="0" presId="urn:microsoft.com/office/officeart/2005/8/layout/hList1"/>
-    <dgm:cxn modelId="{32A3784A-EC9A-49FB-8C63-5D72A1AF748C}" type="presParOf" srcId="{101BCFB4-4227-49BF-A59E-E1A6A3D3D643}" destId="{1360325F-F23D-4F1F-AC56-D3562B42928A}" srcOrd="0" destOrd="0" presId="urn:microsoft.com/office/officeart/2005/8/layout/hList1"/>
-    <dgm:cxn modelId="{19E9C132-B563-48F5-8B38-4AEC54063AFF}" type="presParOf" srcId="{101BCFB4-4227-49BF-A59E-E1A6A3D3D643}" destId="{09EB9851-37A5-4011-B4E0-FD518C04A158}" srcOrd="1" destOrd="0" presId="urn:microsoft.com/office/officeart/2005/8/layout/hList1"/>
-  </dgm:cxnLst>
-  <dgm:bg/>
-  <dgm:whole/>
-  <dgm:extLst>
-    <a:ext uri="http://schemas.microsoft.com/office/drawing/2008/diagram">
-      <dsp:dataModelExt xmlns:dsp="http://schemas.microsoft.com/office/drawing/2008/diagram" relId="rId6" minVer="http://schemas.openxmlformats.org/drawingml/2006/diagram"/>
-    </a:ext>
-  </dgm:extLst>
-</dgm:dataModel>
-</file>
-
-<file path=ppt/diagrams/data2.xml><?xml version="1.0" encoding="utf-8"?>
 <dgm:dataModel xmlns:dgm="http://schemas.openxmlformats.org/drawingml/2006/diagram" xmlns:a="http://schemas.openxmlformats.org/drawingml/2006/main">
   <dgm:ptLst>
     <dgm:pt modelId="{165D6E01-63D2-45F2-8AEC-DE6853A0C47C}" type="doc">
@@ -2439,513 +1256,6 @@
 </file>
 
 <file path=ppt/diagrams/drawing1.xml><?xml version="1.0" encoding="utf-8"?>
-<dsp:drawing xmlns:dgm="http://schemas.openxmlformats.org/drawingml/2006/diagram" xmlns:dsp="http://schemas.microsoft.com/office/drawing/2008/diagram" xmlns:a="http://schemas.openxmlformats.org/drawingml/2006/main">
-  <dsp:spTree>
-    <dsp:nvGrpSpPr>
-      <dsp:cNvPr id="0" name=""/>
-      <dsp:cNvGrpSpPr/>
-    </dsp:nvGrpSpPr>
-    <dsp:grpSpPr/>
-    <dsp:sp modelId="{464AF94A-DA69-4A31-B243-9BBD9F6B3ED4}">
-      <dsp:nvSpPr>
-        <dsp:cNvPr id="0" name=""/>
-        <dsp:cNvSpPr/>
-      </dsp:nvSpPr>
-      <dsp:spPr>
-        <a:xfrm>
-          <a:off x="3601" y="227981"/>
-          <a:ext cx="3511599" cy="1404639"/>
-        </a:xfrm>
-        <a:prstGeom prst="rect">
-          <a:avLst/>
-        </a:prstGeom>
-        <a:solidFill>
-          <a:schemeClr val="accent1">
-            <a:hueOff val="0"/>
-            <a:satOff val="0"/>
-            <a:lumOff val="0"/>
-            <a:alphaOff val="0"/>
-          </a:schemeClr>
-        </a:solidFill>
-        <a:ln w="25400" cap="flat" cmpd="sng" algn="ctr">
-          <a:solidFill>
-            <a:schemeClr val="accent1">
-              <a:hueOff val="0"/>
-              <a:satOff val="0"/>
-              <a:lumOff val="0"/>
-              <a:alphaOff val="0"/>
-            </a:schemeClr>
-          </a:solidFill>
-          <a:prstDash val="solid"/>
-        </a:ln>
-        <a:effectLst/>
-      </dsp:spPr>
-      <dsp:style>
-        <a:lnRef idx="2">
-          <a:scrgbClr r="0" g="0" b="0"/>
-        </a:lnRef>
-        <a:fillRef idx="1">
-          <a:scrgbClr r="0" g="0" b="0"/>
-        </a:fillRef>
-        <a:effectRef idx="0">
-          <a:scrgbClr r="0" g="0" b="0"/>
-        </a:effectRef>
-        <a:fontRef idx="minor">
-          <a:schemeClr val="lt1"/>
-        </a:fontRef>
-      </dsp:style>
-      <dsp:txBody>
-        <a:bodyPr spcFirstLastPara="0" vert="horz" wrap="square" lIns="448056" tIns="256032" rIns="448056" bIns="256032" numCol="1" spcCol="1270" anchor="ctr" anchorCtr="0">
-          <a:noAutofit/>
-        </a:bodyPr>
-        <a:lstStyle/>
-        <a:p>
-          <a:pPr marL="0" lvl="0" indent="0" algn="ctr" defTabSz="2800350">
-            <a:lnSpc>
-              <a:spcPct val="90000"/>
-            </a:lnSpc>
-            <a:spcBef>
-              <a:spcPct val="0"/>
-            </a:spcBef>
-            <a:spcAft>
-              <a:spcPct val="35000"/>
-            </a:spcAft>
-            <a:buNone/>
-          </a:pPr>
-          <a:endParaRPr lang="en-US" sz="6300" kern="1200" dirty="0"/>
-        </a:p>
-      </dsp:txBody>
-      <dsp:txXfrm>
-        <a:off x="3601" y="227981"/>
-        <a:ext cx="3511599" cy="1404639"/>
-      </dsp:txXfrm>
-    </dsp:sp>
-    <dsp:sp modelId="{A063E62B-6CAA-4407-8864-D0EC14E6067A}">
-      <dsp:nvSpPr>
-        <dsp:cNvPr id="0" name=""/>
-        <dsp:cNvSpPr/>
-      </dsp:nvSpPr>
-      <dsp:spPr>
-        <a:xfrm>
-          <a:off x="3601" y="1632621"/>
-          <a:ext cx="3511599" cy="2766960"/>
-        </a:xfrm>
-        <a:prstGeom prst="rect">
-          <a:avLst/>
-        </a:prstGeom>
-        <a:solidFill>
-          <a:schemeClr val="accent1">
-            <a:alpha val="90000"/>
-            <a:tint val="40000"/>
-            <a:hueOff val="0"/>
-            <a:satOff val="0"/>
-            <a:lumOff val="0"/>
-            <a:alphaOff val="0"/>
-          </a:schemeClr>
-        </a:solidFill>
-        <a:ln w="25400" cap="flat" cmpd="sng" algn="ctr">
-          <a:solidFill>
-            <a:schemeClr val="accent1">
-              <a:alpha val="90000"/>
-              <a:tint val="40000"/>
-              <a:hueOff val="0"/>
-              <a:satOff val="0"/>
-              <a:lumOff val="0"/>
-              <a:alphaOff val="0"/>
-            </a:schemeClr>
-          </a:solidFill>
-          <a:prstDash val="solid"/>
-        </a:ln>
-        <a:effectLst/>
-      </dsp:spPr>
-      <dsp:style>
-        <a:lnRef idx="2">
-          <a:scrgbClr r="0" g="0" b="0"/>
-        </a:lnRef>
-        <a:fillRef idx="1">
-          <a:scrgbClr r="0" g="0" b="0"/>
-        </a:fillRef>
-        <a:effectRef idx="0">
-          <a:scrgbClr r="0" g="0" b="0"/>
-        </a:effectRef>
-        <a:fontRef idx="minor"/>
-      </dsp:style>
-      <dsp:txBody>
-        <a:bodyPr spcFirstLastPara="0" vert="horz" wrap="square" lIns="336042" tIns="336042" rIns="448056" bIns="504063" numCol="1" spcCol="1270" anchor="t" anchorCtr="0">
-          <a:noAutofit/>
-        </a:bodyPr>
-        <a:lstStyle/>
-        <a:p>
-          <a:pPr marL="285750" lvl="1" indent="-285750" algn="l" defTabSz="2800350">
-            <a:lnSpc>
-              <a:spcPct val="90000"/>
-            </a:lnSpc>
-            <a:spcBef>
-              <a:spcPct val="0"/>
-            </a:spcBef>
-            <a:spcAft>
-              <a:spcPct val="15000"/>
-            </a:spcAft>
-            <a:buChar char="•"/>
-          </a:pPr>
-          <a:endParaRPr lang="en-US" sz="6300" kern="1200"/>
-        </a:p>
-        <a:p>
-          <a:pPr marL="285750" lvl="1" indent="-285750" algn="l" defTabSz="2800350">
-            <a:lnSpc>
-              <a:spcPct val="90000"/>
-            </a:lnSpc>
-            <a:spcBef>
-              <a:spcPct val="0"/>
-            </a:spcBef>
-            <a:spcAft>
-              <a:spcPct val="15000"/>
-            </a:spcAft>
-            <a:buChar char="•"/>
-          </a:pPr>
-          <a:endParaRPr lang="en-US" sz="6300" kern="1200"/>
-        </a:p>
-      </dsp:txBody>
-      <dsp:txXfrm>
-        <a:off x="3601" y="1632621"/>
-        <a:ext cx="3511599" cy="2766960"/>
-      </dsp:txXfrm>
-    </dsp:sp>
-    <dsp:sp modelId="{FFC36807-4763-4ADE-AAD9-478921B0E41F}">
-      <dsp:nvSpPr>
-        <dsp:cNvPr id="0" name=""/>
-        <dsp:cNvSpPr/>
-      </dsp:nvSpPr>
-      <dsp:spPr>
-        <a:xfrm>
-          <a:off x="4006825" y="227981"/>
-          <a:ext cx="3511599" cy="1404639"/>
-        </a:xfrm>
-        <a:prstGeom prst="rect">
-          <a:avLst/>
-        </a:prstGeom>
-        <a:solidFill>
-          <a:schemeClr val="accent1">
-            <a:hueOff val="0"/>
-            <a:satOff val="0"/>
-            <a:lumOff val="0"/>
-            <a:alphaOff val="0"/>
-          </a:schemeClr>
-        </a:solidFill>
-        <a:ln w="25400" cap="flat" cmpd="sng" algn="ctr">
-          <a:solidFill>
-            <a:schemeClr val="accent1">
-              <a:hueOff val="0"/>
-              <a:satOff val="0"/>
-              <a:lumOff val="0"/>
-              <a:alphaOff val="0"/>
-            </a:schemeClr>
-          </a:solidFill>
-          <a:prstDash val="solid"/>
-        </a:ln>
-        <a:effectLst/>
-      </dsp:spPr>
-      <dsp:style>
-        <a:lnRef idx="2">
-          <a:scrgbClr r="0" g="0" b="0"/>
-        </a:lnRef>
-        <a:fillRef idx="1">
-          <a:scrgbClr r="0" g="0" b="0"/>
-        </a:fillRef>
-        <a:effectRef idx="0">
-          <a:scrgbClr r="0" g="0" b="0"/>
-        </a:effectRef>
-        <a:fontRef idx="minor">
-          <a:schemeClr val="lt1"/>
-        </a:fontRef>
-      </dsp:style>
-      <dsp:txBody>
-        <a:bodyPr spcFirstLastPara="0" vert="horz" wrap="square" lIns="448056" tIns="256032" rIns="448056" bIns="256032" numCol="1" spcCol="1270" anchor="ctr" anchorCtr="0">
-          <a:noAutofit/>
-        </a:bodyPr>
-        <a:lstStyle/>
-        <a:p>
-          <a:pPr marL="0" lvl="0" indent="0" algn="ctr" defTabSz="2800350">
-            <a:lnSpc>
-              <a:spcPct val="90000"/>
-            </a:lnSpc>
-            <a:spcBef>
-              <a:spcPct val="0"/>
-            </a:spcBef>
-            <a:spcAft>
-              <a:spcPct val="35000"/>
-            </a:spcAft>
-            <a:buNone/>
-          </a:pPr>
-          <a:endParaRPr lang="en-US" sz="6300" kern="1200"/>
-        </a:p>
-      </dsp:txBody>
-      <dsp:txXfrm>
-        <a:off x="4006825" y="227981"/>
-        <a:ext cx="3511599" cy="1404639"/>
-      </dsp:txXfrm>
-    </dsp:sp>
-    <dsp:sp modelId="{9769CF7A-2B0F-4507-9158-8DC44E166C61}">
-      <dsp:nvSpPr>
-        <dsp:cNvPr id="0" name=""/>
-        <dsp:cNvSpPr/>
-      </dsp:nvSpPr>
-      <dsp:spPr>
-        <a:xfrm>
-          <a:off x="4006825" y="1632621"/>
-          <a:ext cx="3511599" cy="2766960"/>
-        </a:xfrm>
-        <a:prstGeom prst="rect">
-          <a:avLst/>
-        </a:prstGeom>
-        <a:solidFill>
-          <a:schemeClr val="accent1">
-            <a:alpha val="90000"/>
-            <a:tint val="40000"/>
-            <a:hueOff val="0"/>
-            <a:satOff val="0"/>
-            <a:lumOff val="0"/>
-            <a:alphaOff val="0"/>
-          </a:schemeClr>
-        </a:solidFill>
-        <a:ln w="25400" cap="flat" cmpd="sng" algn="ctr">
-          <a:solidFill>
-            <a:schemeClr val="accent1">
-              <a:alpha val="90000"/>
-              <a:tint val="40000"/>
-              <a:hueOff val="0"/>
-              <a:satOff val="0"/>
-              <a:lumOff val="0"/>
-              <a:alphaOff val="0"/>
-            </a:schemeClr>
-          </a:solidFill>
-          <a:prstDash val="solid"/>
-        </a:ln>
-        <a:effectLst/>
-      </dsp:spPr>
-      <dsp:style>
-        <a:lnRef idx="2">
-          <a:scrgbClr r="0" g="0" b="0"/>
-        </a:lnRef>
-        <a:fillRef idx="1">
-          <a:scrgbClr r="0" g="0" b="0"/>
-        </a:fillRef>
-        <a:effectRef idx="0">
-          <a:scrgbClr r="0" g="0" b="0"/>
-        </a:effectRef>
-        <a:fontRef idx="minor"/>
-      </dsp:style>
-      <dsp:txBody>
-        <a:bodyPr spcFirstLastPara="0" vert="horz" wrap="square" lIns="336042" tIns="336042" rIns="448056" bIns="504063" numCol="1" spcCol="1270" anchor="t" anchorCtr="0">
-          <a:noAutofit/>
-        </a:bodyPr>
-        <a:lstStyle/>
-        <a:p>
-          <a:pPr marL="285750" lvl="1" indent="-285750" algn="l" defTabSz="2800350">
-            <a:lnSpc>
-              <a:spcPct val="90000"/>
-            </a:lnSpc>
-            <a:spcBef>
-              <a:spcPct val="0"/>
-            </a:spcBef>
-            <a:spcAft>
-              <a:spcPct val="15000"/>
-            </a:spcAft>
-            <a:buChar char="•"/>
-          </a:pPr>
-          <a:endParaRPr lang="en-US" sz="6300" kern="1200"/>
-        </a:p>
-        <a:p>
-          <a:pPr marL="285750" lvl="1" indent="-285750" algn="l" defTabSz="2800350">
-            <a:lnSpc>
-              <a:spcPct val="90000"/>
-            </a:lnSpc>
-            <a:spcBef>
-              <a:spcPct val="0"/>
-            </a:spcBef>
-            <a:spcAft>
-              <a:spcPct val="15000"/>
-            </a:spcAft>
-            <a:buChar char="•"/>
-          </a:pPr>
-          <a:endParaRPr lang="en-US" sz="6300" kern="1200"/>
-        </a:p>
-      </dsp:txBody>
-      <dsp:txXfrm>
-        <a:off x="4006825" y="1632621"/>
-        <a:ext cx="3511599" cy="2766960"/>
-      </dsp:txXfrm>
-    </dsp:sp>
-    <dsp:sp modelId="{1360325F-F23D-4F1F-AC56-D3562B42928A}">
-      <dsp:nvSpPr>
-        <dsp:cNvPr id="0" name=""/>
-        <dsp:cNvSpPr/>
-      </dsp:nvSpPr>
-      <dsp:spPr>
-        <a:xfrm>
-          <a:off x="8010048" y="227981"/>
-          <a:ext cx="3511599" cy="1404639"/>
-        </a:xfrm>
-        <a:prstGeom prst="rect">
-          <a:avLst/>
-        </a:prstGeom>
-        <a:solidFill>
-          <a:schemeClr val="accent1">
-            <a:hueOff val="0"/>
-            <a:satOff val="0"/>
-            <a:lumOff val="0"/>
-            <a:alphaOff val="0"/>
-          </a:schemeClr>
-        </a:solidFill>
-        <a:ln w="25400" cap="flat" cmpd="sng" algn="ctr">
-          <a:solidFill>
-            <a:schemeClr val="accent1">
-              <a:hueOff val="0"/>
-              <a:satOff val="0"/>
-              <a:lumOff val="0"/>
-              <a:alphaOff val="0"/>
-            </a:schemeClr>
-          </a:solidFill>
-          <a:prstDash val="solid"/>
-        </a:ln>
-        <a:effectLst/>
-      </dsp:spPr>
-      <dsp:style>
-        <a:lnRef idx="2">
-          <a:scrgbClr r="0" g="0" b="0"/>
-        </a:lnRef>
-        <a:fillRef idx="1">
-          <a:scrgbClr r="0" g="0" b="0"/>
-        </a:fillRef>
-        <a:effectRef idx="0">
-          <a:scrgbClr r="0" g="0" b="0"/>
-        </a:effectRef>
-        <a:fontRef idx="minor">
-          <a:schemeClr val="lt1"/>
-        </a:fontRef>
-      </dsp:style>
-      <dsp:txBody>
-        <a:bodyPr spcFirstLastPara="0" vert="horz" wrap="square" lIns="448056" tIns="256032" rIns="448056" bIns="256032" numCol="1" spcCol="1270" anchor="ctr" anchorCtr="0">
-          <a:noAutofit/>
-        </a:bodyPr>
-        <a:lstStyle/>
-        <a:p>
-          <a:pPr marL="0" lvl="0" indent="0" algn="ctr" defTabSz="2800350">
-            <a:lnSpc>
-              <a:spcPct val="90000"/>
-            </a:lnSpc>
-            <a:spcBef>
-              <a:spcPct val="0"/>
-            </a:spcBef>
-            <a:spcAft>
-              <a:spcPct val="35000"/>
-            </a:spcAft>
-            <a:buNone/>
-          </a:pPr>
-          <a:endParaRPr lang="en-US" sz="6300" kern="1200"/>
-        </a:p>
-      </dsp:txBody>
-      <dsp:txXfrm>
-        <a:off x="8010048" y="227981"/>
-        <a:ext cx="3511599" cy="1404639"/>
-      </dsp:txXfrm>
-    </dsp:sp>
-    <dsp:sp modelId="{09EB9851-37A5-4011-B4E0-FD518C04A158}">
-      <dsp:nvSpPr>
-        <dsp:cNvPr id="0" name=""/>
-        <dsp:cNvSpPr/>
-      </dsp:nvSpPr>
-      <dsp:spPr>
-        <a:xfrm>
-          <a:off x="8010048" y="1632621"/>
-          <a:ext cx="3511599" cy="2766960"/>
-        </a:xfrm>
-        <a:prstGeom prst="rect">
-          <a:avLst/>
-        </a:prstGeom>
-        <a:solidFill>
-          <a:schemeClr val="accent1">
-            <a:alpha val="90000"/>
-            <a:tint val="40000"/>
-            <a:hueOff val="0"/>
-            <a:satOff val="0"/>
-            <a:lumOff val="0"/>
-            <a:alphaOff val="0"/>
-          </a:schemeClr>
-        </a:solidFill>
-        <a:ln w="25400" cap="flat" cmpd="sng" algn="ctr">
-          <a:solidFill>
-            <a:schemeClr val="accent1">
-              <a:alpha val="90000"/>
-              <a:tint val="40000"/>
-              <a:hueOff val="0"/>
-              <a:satOff val="0"/>
-              <a:lumOff val="0"/>
-              <a:alphaOff val="0"/>
-            </a:schemeClr>
-          </a:solidFill>
-          <a:prstDash val="solid"/>
-        </a:ln>
-        <a:effectLst/>
-      </dsp:spPr>
-      <dsp:style>
-        <a:lnRef idx="2">
-          <a:scrgbClr r="0" g="0" b="0"/>
-        </a:lnRef>
-        <a:fillRef idx="1">
-          <a:scrgbClr r="0" g="0" b="0"/>
-        </a:fillRef>
-        <a:effectRef idx="0">
-          <a:scrgbClr r="0" g="0" b="0"/>
-        </a:effectRef>
-        <a:fontRef idx="minor"/>
-      </dsp:style>
-      <dsp:txBody>
-        <a:bodyPr spcFirstLastPara="0" vert="horz" wrap="square" lIns="336042" tIns="336042" rIns="448056" bIns="504063" numCol="1" spcCol="1270" anchor="t" anchorCtr="0">
-          <a:noAutofit/>
-        </a:bodyPr>
-        <a:lstStyle/>
-        <a:p>
-          <a:pPr marL="285750" lvl="1" indent="-285750" algn="l" defTabSz="2800350">
-            <a:lnSpc>
-              <a:spcPct val="90000"/>
-            </a:lnSpc>
-            <a:spcBef>
-              <a:spcPct val="0"/>
-            </a:spcBef>
-            <a:spcAft>
-              <a:spcPct val="15000"/>
-            </a:spcAft>
-            <a:buChar char="•"/>
-          </a:pPr>
-          <a:endParaRPr lang="en-US" sz="6300" kern="1200"/>
-        </a:p>
-        <a:p>
-          <a:pPr marL="285750" lvl="1" indent="-285750" algn="l" defTabSz="2800350">
-            <a:lnSpc>
-              <a:spcPct val="90000"/>
-            </a:lnSpc>
-            <a:spcBef>
-              <a:spcPct val="0"/>
-            </a:spcBef>
-            <a:spcAft>
-              <a:spcPct val="15000"/>
-            </a:spcAft>
-            <a:buChar char="•"/>
-          </a:pPr>
-          <a:endParaRPr lang="en-US" sz="6300" kern="1200"/>
-        </a:p>
-      </dsp:txBody>
-      <dsp:txXfrm>
-        <a:off x="8010048" y="1632621"/>
-        <a:ext cx="3511599" cy="2766960"/>
-      </dsp:txXfrm>
-    </dsp:sp>
-  </dsp:spTree>
-</dsp:drawing>
-</file>
-
-<file path=ppt/diagrams/drawing2.xml><?xml version="1.0" encoding="utf-8"?>
 <dsp:drawing xmlns:dgm="http://schemas.openxmlformats.org/drawingml/2006/diagram" xmlns:dsp="http://schemas.microsoft.com/office/drawing/2008/diagram" xmlns:a="http://schemas.openxmlformats.org/drawingml/2006/main">
   <dsp:spTree>
     <dsp:nvGrpSpPr>
@@ -3630,223 +1940,6 @@
 </file>
 
 <file path=ppt/diagrams/layout1.xml><?xml version="1.0" encoding="utf-8"?>
-<dgm:layoutDef xmlns:dgm="http://schemas.openxmlformats.org/drawingml/2006/diagram" xmlns:a="http://schemas.openxmlformats.org/drawingml/2006/main" uniqueId="urn:microsoft.com/office/officeart/2005/8/layout/hList1">
-  <dgm:title val=""/>
-  <dgm:desc val=""/>
-  <dgm:catLst>
-    <dgm:cat type="list" pri="5000"/>
-    <dgm:cat type="convert" pri="5000"/>
-  </dgm:catLst>
-  <dgm:sampData>
-    <dgm:dataModel>
-      <dgm:ptLst>
-        <dgm:pt modelId="0" type="doc"/>
-        <dgm:pt modelId="1">
-          <dgm:prSet phldr="1"/>
-        </dgm:pt>
-        <dgm:pt modelId="11">
-          <dgm:prSet phldr="1"/>
-        </dgm:pt>
-        <dgm:pt modelId="12">
-          <dgm:prSet phldr="1"/>
-        </dgm:pt>
-        <dgm:pt modelId="2">
-          <dgm:prSet phldr="1"/>
-        </dgm:pt>
-        <dgm:pt modelId="21">
-          <dgm:prSet phldr="1"/>
-        </dgm:pt>
-        <dgm:pt modelId="22">
-          <dgm:prSet phldr="1"/>
-        </dgm:pt>
-        <dgm:pt modelId="3">
-          <dgm:prSet phldr="1"/>
-        </dgm:pt>
-        <dgm:pt modelId="31">
-          <dgm:prSet phldr="1"/>
-        </dgm:pt>
-        <dgm:pt modelId="32">
-          <dgm:prSet phldr="1"/>
-        </dgm:pt>
-      </dgm:ptLst>
-      <dgm:cxnLst>
-        <dgm:cxn modelId="4" srcId="0" destId="1" srcOrd="0" destOrd="0"/>
-        <dgm:cxn modelId="5" srcId="0" destId="2" srcOrd="1" destOrd="0"/>
-        <dgm:cxn modelId="6" srcId="0" destId="3" srcOrd="2" destOrd="0"/>
-        <dgm:cxn modelId="13" srcId="1" destId="11" srcOrd="0" destOrd="0"/>
-        <dgm:cxn modelId="14" srcId="1" destId="12" srcOrd="1" destOrd="0"/>
-        <dgm:cxn modelId="23" srcId="2" destId="21" srcOrd="0" destOrd="0"/>
-        <dgm:cxn modelId="24" srcId="2" destId="22" srcOrd="1" destOrd="0"/>
-        <dgm:cxn modelId="33" srcId="3" destId="31" srcOrd="0" destOrd="0"/>
-        <dgm:cxn modelId="34" srcId="3" destId="32" srcOrd="1" destOrd="0"/>
-      </dgm:cxnLst>
-      <dgm:bg/>
-      <dgm:whole/>
-    </dgm:dataModel>
-  </dgm:sampData>
-  <dgm:styleData>
-    <dgm:dataModel>
-      <dgm:ptLst>
-        <dgm:pt modelId="0" type="doc"/>
-        <dgm:pt modelId="1">
-          <dgm:prSet phldr="1"/>
-        </dgm:pt>
-        <dgm:pt modelId="2">
-          <dgm:prSet phldr="1"/>
-        </dgm:pt>
-      </dgm:ptLst>
-      <dgm:cxnLst>
-        <dgm:cxn modelId="3" srcId="0" destId="1" srcOrd="0" destOrd="0"/>
-        <dgm:cxn modelId="4" srcId="0" destId="2" srcOrd="1" destOrd="0"/>
-      </dgm:cxnLst>
-      <dgm:bg/>
-      <dgm:whole/>
-    </dgm:dataModel>
-  </dgm:styleData>
-  <dgm:clrData>
-    <dgm:dataModel>
-      <dgm:ptLst>
-        <dgm:pt modelId="0" type="doc"/>
-        <dgm:pt modelId="1">
-          <dgm:prSet phldr="1"/>
-        </dgm:pt>
-        <dgm:pt modelId="2">
-          <dgm:prSet phldr="1"/>
-        </dgm:pt>
-        <dgm:pt modelId="3">
-          <dgm:prSet phldr="1"/>
-        </dgm:pt>
-        <dgm:pt modelId="4">
-          <dgm:prSet phldr="1"/>
-        </dgm:pt>
-      </dgm:ptLst>
-      <dgm:cxnLst>
-        <dgm:cxn modelId="5" srcId="0" destId="1" srcOrd="0" destOrd="0"/>
-        <dgm:cxn modelId="6" srcId="0" destId="2" srcOrd="1" destOrd="0"/>
-        <dgm:cxn modelId="7" srcId="0" destId="3" srcOrd="2" destOrd="0"/>
-        <dgm:cxn modelId="8" srcId="0" destId="4" srcOrd="3" destOrd="0"/>
-      </dgm:cxnLst>
-      <dgm:bg/>
-      <dgm:whole/>
-    </dgm:dataModel>
-  </dgm:clrData>
-  <dgm:layoutNode name="Name0">
-    <dgm:varLst>
-      <dgm:dir/>
-      <dgm:animLvl val="lvl"/>
-      <dgm:resizeHandles val="exact"/>
-    </dgm:varLst>
-    <dgm:choose name="Name1">
-      <dgm:if name="Name2" func="var" arg="dir" op="equ" val="norm">
-        <dgm:alg type="lin"/>
-      </dgm:if>
-      <dgm:else name="Name3">
-        <dgm:alg type="lin">
-          <dgm:param type="linDir" val="fromR"/>
-        </dgm:alg>
-      </dgm:else>
-    </dgm:choose>
-    <dgm:shape xmlns:r="http://schemas.openxmlformats.org/officeDocument/2006/relationships" r:blip="">
-      <dgm:adjLst/>
-    </dgm:shape>
-    <dgm:presOf/>
-    <dgm:constrLst>
-      <dgm:constr type="h" for="ch" forName="composite" refType="h"/>
-      <dgm:constr type="w" for="ch" forName="composite" refType="w"/>
-      <dgm:constr type="w" for="des" forName="parTx"/>
-      <dgm:constr type="h" for="des" forName="parTx" op="equ"/>
-      <dgm:constr type="w" for="des" forName="desTx"/>
-      <dgm:constr type="h" for="des" forName="desTx" op="equ"/>
-      <dgm:constr type="primFontSz" for="des" forName="parTx" val="65"/>
-      <dgm:constr type="secFontSz" for="des" forName="desTx" refType="primFontSz" refFor="des" refForName="parTx" op="equ"/>
-      <dgm:constr type="h" for="des" forName="parTx" refType="primFontSz" refFor="des" refForName="parTx" fact="0.8"/>
-      <dgm:constr type="h" for="des" forName="desTx" refType="primFontSz" refFor="des" refForName="parTx" fact="1.22"/>
-      <dgm:constr type="w" for="ch" forName="space" refType="w" refFor="ch" refForName="composite" op="equ" fact="0.14"/>
-    </dgm:constrLst>
-    <dgm:ruleLst>
-      <dgm:rule type="w" for="ch" forName="composite" val="0" fact="NaN" max="NaN"/>
-      <dgm:rule type="primFontSz" for="des" forName="parTx" val="5" fact="NaN" max="NaN"/>
-    </dgm:ruleLst>
-    <dgm:forEach name="Name4" axis="ch" ptType="node">
-      <dgm:layoutNode name="composite">
-        <dgm:alg type="composite"/>
-        <dgm:shape xmlns:r="http://schemas.openxmlformats.org/officeDocument/2006/relationships" r:blip="">
-          <dgm:adjLst/>
-        </dgm:shape>
-        <dgm:presOf/>
-        <dgm:constrLst>
-          <dgm:constr type="l" for="ch" forName="parTx"/>
-          <dgm:constr type="w" for="ch" forName="parTx" refType="w"/>
-          <dgm:constr type="t" for="ch" forName="parTx"/>
-          <dgm:constr type="l" for="ch" forName="desTx"/>
-          <dgm:constr type="w" for="ch" forName="desTx" refType="w" refFor="ch" refForName="parTx"/>
-          <dgm:constr type="t" for="ch" forName="desTx" refType="h" refFor="ch" refForName="parTx"/>
-        </dgm:constrLst>
-        <dgm:ruleLst>
-          <dgm:rule type="h" val="INF" fact="NaN" max="NaN"/>
-        </dgm:ruleLst>
-        <dgm:layoutNode name="parTx" styleLbl="alignNode1">
-          <dgm:varLst>
-            <dgm:chMax val="0"/>
-            <dgm:chPref val="0"/>
-            <dgm:bulletEnabled val="1"/>
-          </dgm:varLst>
-          <dgm:alg type="tx"/>
-          <dgm:shape xmlns:r="http://schemas.openxmlformats.org/officeDocument/2006/relationships" type="rect" r:blip="">
-            <dgm:adjLst/>
-          </dgm:shape>
-          <dgm:presOf axis="self" ptType="node"/>
-          <dgm:constrLst>
-            <dgm:constr type="h" refType="w" op="lte" fact="0.4"/>
-            <dgm:constr type="h"/>
-            <dgm:constr type="tMarg" refType="primFontSz" fact="0.32"/>
-            <dgm:constr type="bMarg" refType="primFontSz" fact="0.32"/>
-          </dgm:constrLst>
-          <dgm:ruleLst>
-            <dgm:rule type="h" val="INF" fact="NaN" max="NaN"/>
-          </dgm:ruleLst>
-        </dgm:layoutNode>
-        <dgm:layoutNode name="desTx" styleLbl="alignAccFollowNode1">
-          <dgm:varLst>
-            <dgm:bulletEnabled val="1"/>
-          </dgm:varLst>
-          <dgm:alg type="tx">
-            <dgm:param type="stBulletLvl" val="1"/>
-          </dgm:alg>
-          <dgm:shape xmlns:r="http://schemas.openxmlformats.org/officeDocument/2006/relationships" type="rect" r:blip="">
-            <dgm:adjLst/>
-          </dgm:shape>
-          <dgm:presOf axis="des" ptType="node"/>
-          <dgm:constrLst>
-            <dgm:constr type="secFontSz" val="65"/>
-            <dgm:constr type="primFontSz" refType="secFontSz"/>
-            <dgm:constr type="h"/>
-            <dgm:constr type="lMarg" refType="primFontSz" fact="0.42"/>
-            <dgm:constr type="tMarg" refType="primFontSz" fact="0.42"/>
-            <dgm:constr type="bMarg" refType="primFontSz" fact="0.63"/>
-          </dgm:constrLst>
-          <dgm:ruleLst>
-            <dgm:rule type="h" val="INF" fact="NaN" max="NaN"/>
-          </dgm:ruleLst>
-        </dgm:layoutNode>
-      </dgm:layoutNode>
-      <dgm:forEach name="Name5" axis="followSib" ptType="sibTrans" cnt="1">
-        <dgm:layoutNode name="space">
-          <dgm:alg type="sp"/>
-          <dgm:shape xmlns:r="http://schemas.openxmlformats.org/officeDocument/2006/relationships" r:blip="">
-            <dgm:adjLst/>
-          </dgm:shape>
-          <dgm:presOf/>
-          <dgm:constrLst/>
-          <dgm:ruleLst/>
-        </dgm:layoutNode>
-      </dgm:forEach>
-    </dgm:forEach>
-  </dgm:layoutNode>
-</dgm:layoutDef>
-</file>
-
-<file path=ppt/diagrams/layout2.xml><?xml version="1.0" encoding="utf-8"?>
 <dgm:layoutDef xmlns:dgm="http://schemas.openxmlformats.org/drawingml/2006/diagram" xmlns:a="http://schemas.openxmlformats.org/drawingml/2006/main" uniqueId="urn:microsoft.com/office/officeart/2005/8/layout/cycle6">
   <dgm:title val=""/>
   <dgm:desc val=""/>
@@ -5089,1040 +3182,6 @@
 </dgm:styleDef>
 </file>
 
-<file path=ppt/diagrams/quickStyle2.xml><?xml version="1.0" encoding="utf-8"?>
-<dgm:styleDef xmlns:dgm="http://schemas.openxmlformats.org/drawingml/2006/diagram" xmlns:a="http://schemas.openxmlformats.org/drawingml/2006/main" uniqueId="urn:microsoft.com/office/officeart/2005/8/quickstyle/simple1">
-  <dgm:title val=""/>
-  <dgm:desc val=""/>
-  <dgm:catLst>
-    <dgm:cat type="simple" pri="10100"/>
-  </dgm:catLst>
-  <dgm:scene3d>
-    <a:camera prst="orthographicFront"/>
-    <a:lightRig rig="threePt" dir="t"/>
-  </dgm:scene3d>
-  <dgm:styleLbl name="node0">
-    <dgm:scene3d>
-      <a:camera prst="orthographicFront"/>
-      <a:lightRig rig="threePt" dir="t"/>
-    </dgm:scene3d>
-    <dgm:sp3d/>
-    <dgm:txPr/>
-    <dgm:style>
-      <a:lnRef idx="2">
-        <a:scrgbClr r="0" g="0" b="0"/>
-      </a:lnRef>
-      <a:fillRef idx="1">
-        <a:scrgbClr r="0" g="0" b="0"/>
-      </a:fillRef>
-      <a:effectRef idx="0">
-        <a:scrgbClr r="0" g="0" b="0"/>
-      </a:effectRef>
-      <a:fontRef idx="minor">
-        <a:schemeClr val="lt1"/>
-      </a:fontRef>
-    </dgm:style>
-  </dgm:styleLbl>
-  <dgm:styleLbl name="lnNode1">
-    <dgm:scene3d>
-      <a:camera prst="orthographicFront"/>
-      <a:lightRig rig="threePt" dir="t"/>
-    </dgm:scene3d>
-    <dgm:sp3d/>
-    <dgm:txPr/>
-    <dgm:style>
-      <a:lnRef idx="2">
-        <a:scrgbClr r="0" g="0" b="0"/>
-      </a:lnRef>
-      <a:fillRef idx="1">
-        <a:scrgbClr r="0" g="0" b="0"/>
-      </a:fillRef>
-      <a:effectRef idx="0">
-        <a:scrgbClr r="0" g="0" b="0"/>
-      </a:effectRef>
-      <a:fontRef idx="minor">
-        <a:schemeClr val="lt1"/>
-      </a:fontRef>
-    </dgm:style>
-  </dgm:styleLbl>
-  <dgm:styleLbl name="vennNode1">
-    <dgm:scene3d>
-      <a:camera prst="orthographicFront"/>
-      <a:lightRig rig="threePt" dir="t"/>
-    </dgm:scene3d>
-    <dgm:sp3d/>
-    <dgm:txPr/>
-    <dgm:style>
-      <a:lnRef idx="2">
-        <a:scrgbClr r="0" g="0" b="0"/>
-      </a:lnRef>
-      <a:fillRef idx="1">
-        <a:scrgbClr r="0" g="0" b="0"/>
-      </a:fillRef>
-      <a:effectRef idx="0">
-        <a:scrgbClr r="0" g="0" b="0"/>
-      </a:effectRef>
-      <a:fontRef idx="minor">
-        <a:schemeClr val="tx1"/>
-      </a:fontRef>
-    </dgm:style>
-  </dgm:styleLbl>
-  <dgm:styleLbl name="alignNode1">
-    <dgm:scene3d>
-      <a:camera prst="orthographicFront"/>
-      <a:lightRig rig="threePt" dir="t"/>
-    </dgm:scene3d>
-    <dgm:sp3d/>
-    <dgm:txPr/>
-    <dgm:style>
-      <a:lnRef idx="2">
-        <a:scrgbClr r="0" g="0" b="0"/>
-      </a:lnRef>
-      <a:fillRef idx="1">
-        <a:scrgbClr r="0" g="0" b="0"/>
-      </a:fillRef>
-      <a:effectRef idx="0">
-        <a:scrgbClr r="0" g="0" b="0"/>
-      </a:effectRef>
-      <a:fontRef idx="minor">
-        <a:schemeClr val="lt1"/>
-      </a:fontRef>
-    </dgm:style>
-  </dgm:styleLbl>
-  <dgm:styleLbl name="node1">
-    <dgm:scene3d>
-      <a:camera prst="orthographicFront"/>
-      <a:lightRig rig="threePt" dir="t"/>
-    </dgm:scene3d>
-    <dgm:sp3d/>
-    <dgm:txPr/>
-    <dgm:style>
-      <a:lnRef idx="2">
-        <a:scrgbClr r="0" g="0" b="0"/>
-      </a:lnRef>
-      <a:fillRef idx="1">
-        <a:scrgbClr r="0" g="0" b="0"/>
-      </a:fillRef>
-      <a:effectRef idx="0">
-        <a:scrgbClr r="0" g="0" b="0"/>
-      </a:effectRef>
-      <a:fontRef idx="minor">
-        <a:schemeClr val="lt1"/>
-      </a:fontRef>
-    </dgm:style>
-  </dgm:styleLbl>
-  <dgm:styleLbl name="node2">
-    <dgm:scene3d>
-      <a:camera prst="orthographicFront"/>
-      <a:lightRig rig="threePt" dir="t"/>
-    </dgm:scene3d>
-    <dgm:sp3d/>
-    <dgm:txPr/>
-    <dgm:style>
-      <a:lnRef idx="2">
-        <a:scrgbClr r="0" g="0" b="0"/>
-      </a:lnRef>
-      <a:fillRef idx="1">
-        <a:scrgbClr r="0" g="0" b="0"/>
-      </a:fillRef>
-      <a:effectRef idx="0">
-        <a:scrgbClr r="0" g="0" b="0"/>
-      </a:effectRef>
-      <a:fontRef idx="minor">
-        <a:schemeClr val="lt1"/>
-      </a:fontRef>
-    </dgm:style>
-  </dgm:styleLbl>
-  <dgm:styleLbl name="node3">
-    <dgm:scene3d>
-      <a:camera prst="orthographicFront"/>
-      <a:lightRig rig="threePt" dir="t"/>
-    </dgm:scene3d>
-    <dgm:sp3d/>
-    <dgm:txPr/>
-    <dgm:style>
-      <a:lnRef idx="2">
-        <a:scrgbClr r="0" g="0" b="0"/>
-      </a:lnRef>
-      <a:fillRef idx="1">
-        <a:scrgbClr r="0" g="0" b="0"/>
-      </a:fillRef>
-      <a:effectRef idx="0">
-        <a:scrgbClr r="0" g="0" b="0"/>
-      </a:effectRef>
-      <a:fontRef idx="minor">
-        <a:schemeClr val="lt1"/>
-      </a:fontRef>
-    </dgm:style>
-  </dgm:styleLbl>
-  <dgm:styleLbl name="node4">
-    <dgm:scene3d>
-      <a:camera prst="orthographicFront"/>
-      <a:lightRig rig="threePt" dir="t"/>
-    </dgm:scene3d>
-    <dgm:sp3d/>
-    <dgm:txPr/>
-    <dgm:style>
-      <a:lnRef idx="2">
-        <a:scrgbClr r="0" g="0" b="0"/>
-      </a:lnRef>
-      <a:fillRef idx="1">
-        <a:scrgbClr r="0" g="0" b="0"/>
-      </a:fillRef>
-      <a:effectRef idx="0">
-        <a:scrgbClr r="0" g="0" b="0"/>
-      </a:effectRef>
-      <a:fontRef idx="minor">
-        <a:schemeClr val="lt1"/>
-      </a:fontRef>
-    </dgm:style>
-  </dgm:styleLbl>
-  <dgm:styleLbl name="fgImgPlace1">
-    <dgm:scene3d>
-      <a:camera prst="orthographicFront"/>
-      <a:lightRig rig="threePt" dir="t"/>
-    </dgm:scene3d>
-    <dgm:sp3d/>
-    <dgm:txPr/>
-    <dgm:style>
-      <a:lnRef idx="2">
-        <a:scrgbClr r="0" g="0" b="0"/>
-      </a:lnRef>
-      <a:fillRef idx="1">
-        <a:scrgbClr r="0" g="0" b="0"/>
-      </a:fillRef>
-      <a:effectRef idx="0">
-        <a:scrgbClr r="0" g="0" b="0"/>
-      </a:effectRef>
-      <a:fontRef idx="minor"/>
-    </dgm:style>
-  </dgm:styleLbl>
-  <dgm:styleLbl name="alignImgPlace1">
-    <dgm:scene3d>
-      <a:camera prst="orthographicFront"/>
-      <a:lightRig rig="threePt" dir="t"/>
-    </dgm:scene3d>
-    <dgm:sp3d/>
-    <dgm:txPr/>
-    <dgm:style>
-      <a:lnRef idx="2">
-        <a:scrgbClr r="0" g="0" b="0"/>
-      </a:lnRef>
-      <a:fillRef idx="1">
-        <a:scrgbClr r="0" g="0" b="0"/>
-      </a:fillRef>
-      <a:effectRef idx="0">
-        <a:scrgbClr r="0" g="0" b="0"/>
-      </a:effectRef>
-      <a:fontRef idx="minor"/>
-    </dgm:style>
-  </dgm:styleLbl>
-  <dgm:styleLbl name="bgImgPlace1">
-    <dgm:scene3d>
-      <a:camera prst="orthographicFront"/>
-      <a:lightRig rig="threePt" dir="t"/>
-    </dgm:scene3d>
-    <dgm:sp3d/>
-    <dgm:txPr/>
-    <dgm:style>
-      <a:lnRef idx="2">
-        <a:scrgbClr r="0" g="0" b="0"/>
-      </a:lnRef>
-      <a:fillRef idx="1">
-        <a:scrgbClr r="0" g="0" b="0"/>
-      </a:fillRef>
-      <a:effectRef idx="0">
-        <a:scrgbClr r="0" g="0" b="0"/>
-      </a:effectRef>
-      <a:fontRef idx="minor"/>
-    </dgm:style>
-  </dgm:styleLbl>
-  <dgm:styleLbl name="sibTrans2D1">
-    <dgm:scene3d>
-      <a:camera prst="orthographicFront"/>
-      <a:lightRig rig="threePt" dir="t"/>
-    </dgm:scene3d>
-    <dgm:sp3d/>
-    <dgm:txPr/>
-    <dgm:style>
-      <a:lnRef idx="0">
-        <a:scrgbClr r="0" g="0" b="0"/>
-      </a:lnRef>
-      <a:fillRef idx="1">
-        <a:scrgbClr r="0" g="0" b="0"/>
-      </a:fillRef>
-      <a:effectRef idx="0">
-        <a:scrgbClr r="0" g="0" b="0"/>
-      </a:effectRef>
-      <a:fontRef idx="minor">
-        <a:schemeClr val="lt1"/>
-      </a:fontRef>
-    </dgm:style>
-  </dgm:styleLbl>
-  <dgm:styleLbl name="fgSibTrans2D1">
-    <dgm:scene3d>
-      <a:camera prst="orthographicFront"/>
-      <a:lightRig rig="threePt" dir="t"/>
-    </dgm:scene3d>
-    <dgm:sp3d/>
-    <dgm:txPr/>
-    <dgm:style>
-      <a:lnRef idx="0">
-        <a:scrgbClr r="0" g="0" b="0"/>
-      </a:lnRef>
-      <a:fillRef idx="1">
-        <a:scrgbClr r="0" g="0" b="0"/>
-      </a:fillRef>
-      <a:effectRef idx="0">
-        <a:scrgbClr r="0" g="0" b="0"/>
-      </a:effectRef>
-      <a:fontRef idx="minor">
-        <a:schemeClr val="lt1"/>
-      </a:fontRef>
-    </dgm:style>
-  </dgm:styleLbl>
-  <dgm:styleLbl name="bgSibTrans2D1">
-    <dgm:scene3d>
-      <a:camera prst="orthographicFront"/>
-      <a:lightRig rig="threePt" dir="t"/>
-    </dgm:scene3d>
-    <dgm:sp3d/>
-    <dgm:txPr/>
-    <dgm:style>
-      <a:lnRef idx="0">
-        <a:scrgbClr r="0" g="0" b="0"/>
-      </a:lnRef>
-      <a:fillRef idx="1">
-        <a:scrgbClr r="0" g="0" b="0"/>
-      </a:fillRef>
-      <a:effectRef idx="0">
-        <a:scrgbClr r="0" g="0" b="0"/>
-      </a:effectRef>
-      <a:fontRef idx="minor">
-        <a:schemeClr val="lt1"/>
-      </a:fontRef>
-    </dgm:style>
-  </dgm:styleLbl>
-  <dgm:styleLbl name="sibTrans1D1">
-    <dgm:scene3d>
-      <a:camera prst="orthographicFront"/>
-      <a:lightRig rig="threePt" dir="t"/>
-    </dgm:scene3d>
-    <dgm:sp3d/>
-    <dgm:txPr/>
-    <dgm:style>
-      <a:lnRef idx="1">
-        <a:scrgbClr r="0" g="0" b="0"/>
-      </a:lnRef>
-      <a:fillRef idx="0">
-        <a:scrgbClr r="0" g="0" b="0"/>
-      </a:fillRef>
-      <a:effectRef idx="0">
-        <a:scrgbClr r="0" g="0" b="0"/>
-      </a:effectRef>
-      <a:fontRef idx="minor"/>
-    </dgm:style>
-  </dgm:styleLbl>
-  <dgm:styleLbl name="callout">
-    <dgm:scene3d>
-      <a:camera prst="orthographicFront"/>
-      <a:lightRig rig="threePt" dir="t"/>
-    </dgm:scene3d>
-    <dgm:sp3d/>
-    <dgm:txPr/>
-    <dgm:style>
-      <a:lnRef idx="2">
-        <a:scrgbClr r="0" g="0" b="0"/>
-      </a:lnRef>
-      <a:fillRef idx="1">
-        <a:scrgbClr r="0" g="0" b="0"/>
-      </a:fillRef>
-      <a:effectRef idx="0">
-        <a:scrgbClr r="0" g="0" b="0"/>
-      </a:effectRef>
-      <a:fontRef idx="minor"/>
-    </dgm:style>
-  </dgm:styleLbl>
-  <dgm:styleLbl name="asst0">
-    <dgm:scene3d>
-      <a:camera prst="orthographicFront"/>
-      <a:lightRig rig="threePt" dir="t"/>
-    </dgm:scene3d>
-    <dgm:sp3d/>
-    <dgm:txPr/>
-    <dgm:style>
-      <a:lnRef idx="2">
-        <a:scrgbClr r="0" g="0" b="0"/>
-      </a:lnRef>
-      <a:fillRef idx="1">
-        <a:scrgbClr r="0" g="0" b="0"/>
-      </a:fillRef>
-      <a:effectRef idx="0">
-        <a:scrgbClr r="0" g="0" b="0"/>
-      </a:effectRef>
-      <a:fontRef idx="minor">
-        <a:schemeClr val="lt1"/>
-      </a:fontRef>
-    </dgm:style>
-  </dgm:styleLbl>
-  <dgm:styleLbl name="asst1">
-    <dgm:scene3d>
-      <a:camera prst="orthographicFront"/>
-      <a:lightRig rig="threePt" dir="t"/>
-    </dgm:scene3d>
-    <dgm:sp3d/>
-    <dgm:txPr/>
-    <dgm:style>
-      <a:lnRef idx="2">
-        <a:scrgbClr r="0" g="0" b="0"/>
-      </a:lnRef>
-      <a:fillRef idx="1">
-        <a:scrgbClr r="0" g="0" b="0"/>
-      </a:fillRef>
-      <a:effectRef idx="0">
-        <a:scrgbClr r="0" g="0" b="0"/>
-      </a:effectRef>
-      <a:fontRef idx="minor">
-        <a:schemeClr val="lt1"/>
-      </a:fontRef>
-    </dgm:style>
-  </dgm:styleLbl>
-  <dgm:styleLbl name="asst2">
-    <dgm:scene3d>
-      <a:camera prst="orthographicFront"/>
-      <a:lightRig rig="threePt" dir="t"/>
-    </dgm:scene3d>
-    <dgm:sp3d/>
-    <dgm:txPr/>
-    <dgm:style>
-      <a:lnRef idx="2">
-        <a:scrgbClr r="0" g="0" b="0"/>
-      </a:lnRef>
-      <a:fillRef idx="1">
-        <a:scrgbClr r="0" g="0" b="0"/>
-      </a:fillRef>
-      <a:effectRef idx="0">
-        <a:scrgbClr r="0" g="0" b="0"/>
-      </a:effectRef>
-      <a:fontRef idx="minor">
-        <a:schemeClr val="lt1"/>
-      </a:fontRef>
-    </dgm:style>
-  </dgm:styleLbl>
-  <dgm:styleLbl name="asst3">
-    <dgm:scene3d>
-      <a:camera prst="orthographicFront"/>
-      <a:lightRig rig="threePt" dir="t"/>
-    </dgm:scene3d>
-    <dgm:sp3d/>
-    <dgm:txPr/>
-    <dgm:style>
-      <a:lnRef idx="2">
-        <a:scrgbClr r="0" g="0" b="0"/>
-      </a:lnRef>
-      <a:fillRef idx="1">
-        <a:scrgbClr r="0" g="0" b="0"/>
-      </a:fillRef>
-      <a:effectRef idx="0">
-        <a:scrgbClr r="0" g="0" b="0"/>
-      </a:effectRef>
-      <a:fontRef idx="minor">
-        <a:schemeClr val="lt1"/>
-      </a:fontRef>
-    </dgm:style>
-  </dgm:styleLbl>
-  <dgm:styleLbl name="asst4">
-    <dgm:scene3d>
-      <a:camera prst="orthographicFront"/>
-      <a:lightRig rig="threePt" dir="t"/>
-    </dgm:scene3d>
-    <dgm:sp3d/>
-    <dgm:txPr/>
-    <dgm:style>
-      <a:lnRef idx="2">
-        <a:scrgbClr r="0" g="0" b="0"/>
-      </a:lnRef>
-      <a:fillRef idx="1">
-        <a:scrgbClr r="0" g="0" b="0"/>
-      </a:fillRef>
-      <a:effectRef idx="0">
-        <a:scrgbClr r="0" g="0" b="0"/>
-      </a:effectRef>
-      <a:fontRef idx="minor">
-        <a:schemeClr val="lt1"/>
-      </a:fontRef>
-    </dgm:style>
-  </dgm:styleLbl>
-  <dgm:styleLbl name="parChTrans2D1">
-    <dgm:scene3d>
-      <a:camera prst="orthographicFront"/>
-      <a:lightRig rig="threePt" dir="t"/>
-    </dgm:scene3d>
-    <dgm:sp3d/>
-    <dgm:txPr/>
-    <dgm:style>
-      <a:lnRef idx="2">
-        <a:scrgbClr r="0" g="0" b="0"/>
-      </a:lnRef>
-      <a:fillRef idx="1">
-        <a:scrgbClr r="0" g="0" b="0"/>
-      </a:fillRef>
-      <a:effectRef idx="0">
-        <a:scrgbClr r="0" g="0" b="0"/>
-      </a:effectRef>
-      <a:fontRef idx="minor">
-        <a:schemeClr val="lt1"/>
-      </a:fontRef>
-    </dgm:style>
-  </dgm:styleLbl>
-  <dgm:styleLbl name="parChTrans2D2">
-    <dgm:scene3d>
-      <a:camera prst="orthographicFront"/>
-      <a:lightRig rig="threePt" dir="t"/>
-    </dgm:scene3d>
-    <dgm:sp3d/>
-    <dgm:txPr/>
-    <dgm:style>
-      <a:lnRef idx="2">
-        <a:scrgbClr r="0" g="0" b="0"/>
-      </a:lnRef>
-      <a:fillRef idx="1">
-        <a:scrgbClr r="0" g="0" b="0"/>
-      </a:fillRef>
-      <a:effectRef idx="0">
-        <a:scrgbClr r="0" g="0" b="0"/>
-      </a:effectRef>
-      <a:fontRef idx="minor">
-        <a:schemeClr val="lt1"/>
-      </a:fontRef>
-    </dgm:style>
-  </dgm:styleLbl>
-  <dgm:styleLbl name="parChTrans2D3">
-    <dgm:scene3d>
-      <a:camera prst="orthographicFront"/>
-      <a:lightRig rig="threePt" dir="t"/>
-    </dgm:scene3d>
-    <dgm:sp3d/>
-    <dgm:txPr/>
-    <dgm:style>
-      <a:lnRef idx="2">
-        <a:scrgbClr r="0" g="0" b="0"/>
-      </a:lnRef>
-      <a:fillRef idx="1">
-        <a:scrgbClr r="0" g="0" b="0"/>
-      </a:fillRef>
-      <a:effectRef idx="0">
-        <a:scrgbClr r="0" g="0" b="0"/>
-      </a:effectRef>
-      <a:fontRef idx="minor">
-        <a:schemeClr val="lt1"/>
-      </a:fontRef>
-    </dgm:style>
-  </dgm:styleLbl>
-  <dgm:styleLbl name="parChTrans2D4">
-    <dgm:scene3d>
-      <a:camera prst="orthographicFront"/>
-      <a:lightRig rig="threePt" dir="t"/>
-    </dgm:scene3d>
-    <dgm:sp3d/>
-    <dgm:txPr/>
-    <dgm:style>
-      <a:lnRef idx="2">
-        <a:scrgbClr r="0" g="0" b="0"/>
-      </a:lnRef>
-      <a:fillRef idx="1">
-        <a:scrgbClr r="0" g="0" b="0"/>
-      </a:fillRef>
-      <a:effectRef idx="0">
-        <a:scrgbClr r="0" g="0" b="0"/>
-      </a:effectRef>
-      <a:fontRef idx="minor">
-        <a:schemeClr val="lt1"/>
-      </a:fontRef>
-    </dgm:style>
-  </dgm:styleLbl>
-  <dgm:styleLbl name="parChTrans1D1">
-    <dgm:scene3d>
-      <a:camera prst="orthographicFront"/>
-      <a:lightRig rig="threePt" dir="t"/>
-    </dgm:scene3d>
-    <dgm:sp3d/>
-    <dgm:txPr/>
-    <dgm:style>
-      <a:lnRef idx="2">
-        <a:scrgbClr r="0" g="0" b="0"/>
-      </a:lnRef>
-      <a:fillRef idx="0">
-        <a:scrgbClr r="0" g="0" b="0"/>
-      </a:fillRef>
-      <a:effectRef idx="0">
-        <a:scrgbClr r="0" g="0" b="0"/>
-      </a:effectRef>
-      <a:fontRef idx="minor"/>
-    </dgm:style>
-  </dgm:styleLbl>
-  <dgm:styleLbl name="parChTrans1D2">
-    <dgm:scene3d>
-      <a:camera prst="orthographicFront"/>
-      <a:lightRig rig="threePt" dir="t"/>
-    </dgm:scene3d>
-    <dgm:sp3d/>
-    <dgm:txPr/>
-    <dgm:style>
-      <a:lnRef idx="2">
-        <a:scrgbClr r="0" g="0" b="0"/>
-      </a:lnRef>
-      <a:fillRef idx="0">
-        <a:scrgbClr r="0" g="0" b="0"/>
-      </a:fillRef>
-      <a:effectRef idx="0">
-        <a:scrgbClr r="0" g="0" b="0"/>
-      </a:effectRef>
-      <a:fontRef idx="minor"/>
-    </dgm:style>
-  </dgm:styleLbl>
-  <dgm:styleLbl name="parChTrans1D3">
-    <dgm:scene3d>
-      <a:camera prst="orthographicFront"/>
-      <a:lightRig rig="threePt" dir="t"/>
-    </dgm:scene3d>
-    <dgm:sp3d/>
-    <dgm:txPr/>
-    <dgm:style>
-      <a:lnRef idx="2">
-        <a:scrgbClr r="0" g="0" b="0"/>
-      </a:lnRef>
-      <a:fillRef idx="0">
-        <a:scrgbClr r="0" g="0" b="0"/>
-      </a:fillRef>
-      <a:effectRef idx="0">
-        <a:scrgbClr r="0" g="0" b="0"/>
-      </a:effectRef>
-      <a:fontRef idx="minor"/>
-    </dgm:style>
-  </dgm:styleLbl>
-  <dgm:styleLbl name="parChTrans1D4">
-    <dgm:scene3d>
-      <a:camera prst="orthographicFront"/>
-      <a:lightRig rig="threePt" dir="t"/>
-    </dgm:scene3d>
-    <dgm:sp3d/>
-    <dgm:txPr/>
-    <dgm:style>
-      <a:lnRef idx="2">
-        <a:scrgbClr r="0" g="0" b="0"/>
-      </a:lnRef>
-      <a:fillRef idx="0">
-        <a:scrgbClr r="0" g="0" b="0"/>
-      </a:fillRef>
-      <a:effectRef idx="0">
-        <a:scrgbClr r="0" g="0" b="0"/>
-      </a:effectRef>
-      <a:fontRef idx="minor"/>
-    </dgm:style>
-  </dgm:styleLbl>
-  <dgm:styleLbl name="fgAcc1">
-    <dgm:scene3d>
-      <a:camera prst="orthographicFront"/>
-      <a:lightRig rig="threePt" dir="t"/>
-    </dgm:scene3d>
-    <dgm:sp3d/>
-    <dgm:txPr/>
-    <dgm:style>
-      <a:lnRef idx="2">
-        <a:scrgbClr r="0" g="0" b="0"/>
-      </a:lnRef>
-      <a:fillRef idx="1">
-        <a:scrgbClr r="0" g="0" b="0"/>
-      </a:fillRef>
-      <a:effectRef idx="0">
-        <a:scrgbClr r="0" g="0" b="0"/>
-      </a:effectRef>
-      <a:fontRef idx="minor"/>
-    </dgm:style>
-  </dgm:styleLbl>
-  <dgm:styleLbl name="conFgAcc1">
-    <dgm:scene3d>
-      <a:camera prst="orthographicFront"/>
-      <a:lightRig rig="threePt" dir="t"/>
-    </dgm:scene3d>
-    <dgm:sp3d/>
-    <dgm:txPr/>
-    <dgm:style>
-      <a:lnRef idx="2">
-        <a:scrgbClr r="0" g="0" b="0"/>
-      </a:lnRef>
-      <a:fillRef idx="1">
-        <a:scrgbClr r="0" g="0" b="0"/>
-      </a:fillRef>
-      <a:effectRef idx="0">
-        <a:scrgbClr r="0" g="0" b="0"/>
-      </a:effectRef>
-      <a:fontRef idx="minor"/>
-    </dgm:style>
-  </dgm:styleLbl>
-  <dgm:styleLbl name="alignAcc1">
-    <dgm:scene3d>
-      <a:camera prst="orthographicFront"/>
-      <a:lightRig rig="threePt" dir="t"/>
-    </dgm:scene3d>
-    <dgm:sp3d/>
-    <dgm:txPr/>
-    <dgm:style>
-      <a:lnRef idx="2">
-        <a:scrgbClr r="0" g="0" b="0"/>
-      </a:lnRef>
-      <a:fillRef idx="1">
-        <a:scrgbClr r="0" g="0" b="0"/>
-      </a:fillRef>
-      <a:effectRef idx="0">
-        <a:scrgbClr r="0" g="0" b="0"/>
-      </a:effectRef>
-      <a:fontRef idx="minor"/>
-    </dgm:style>
-  </dgm:styleLbl>
-  <dgm:styleLbl name="trAlignAcc1">
-    <dgm:scene3d>
-      <a:camera prst="orthographicFront"/>
-      <a:lightRig rig="threePt" dir="t"/>
-    </dgm:scene3d>
-    <dgm:sp3d/>
-    <dgm:txPr/>
-    <dgm:style>
-      <a:lnRef idx="1">
-        <a:scrgbClr r="0" g="0" b="0"/>
-      </a:lnRef>
-      <a:fillRef idx="1">
-        <a:scrgbClr r="0" g="0" b="0"/>
-      </a:fillRef>
-      <a:effectRef idx="0">
-        <a:scrgbClr r="0" g="0" b="0"/>
-      </a:effectRef>
-      <a:fontRef idx="minor"/>
-    </dgm:style>
-  </dgm:styleLbl>
-  <dgm:styleLbl name="bgAcc1">
-    <dgm:scene3d>
-      <a:camera prst="orthographicFront"/>
-      <a:lightRig rig="threePt" dir="t"/>
-    </dgm:scene3d>
-    <dgm:sp3d/>
-    <dgm:txPr/>
-    <dgm:style>
-      <a:lnRef idx="2">
-        <a:scrgbClr r="0" g="0" b="0"/>
-      </a:lnRef>
-      <a:fillRef idx="1">
-        <a:scrgbClr r="0" g="0" b="0"/>
-      </a:fillRef>
-      <a:effectRef idx="0">
-        <a:scrgbClr r="0" g="0" b="0"/>
-      </a:effectRef>
-      <a:fontRef idx="minor"/>
-    </dgm:style>
-  </dgm:styleLbl>
-  <dgm:styleLbl name="solidFgAcc1">
-    <dgm:scene3d>
-      <a:camera prst="orthographicFront"/>
-      <a:lightRig rig="threePt" dir="t"/>
-    </dgm:scene3d>
-    <dgm:sp3d/>
-    <dgm:txPr/>
-    <dgm:style>
-      <a:lnRef idx="2">
-        <a:scrgbClr r="0" g="0" b="0"/>
-      </a:lnRef>
-      <a:fillRef idx="1">
-        <a:scrgbClr r="0" g="0" b="0"/>
-      </a:fillRef>
-      <a:effectRef idx="0">
-        <a:scrgbClr r="0" g="0" b="0"/>
-      </a:effectRef>
-      <a:fontRef idx="minor"/>
-    </dgm:style>
-  </dgm:styleLbl>
-  <dgm:styleLbl name="solidAlignAcc1">
-    <dgm:scene3d>
-      <a:camera prst="orthographicFront"/>
-      <a:lightRig rig="threePt" dir="t"/>
-    </dgm:scene3d>
-    <dgm:sp3d/>
-    <dgm:txPr/>
-    <dgm:style>
-      <a:lnRef idx="2">
-        <a:scrgbClr r="0" g="0" b="0"/>
-      </a:lnRef>
-      <a:fillRef idx="1">
-        <a:scrgbClr r="0" g="0" b="0"/>
-      </a:fillRef>
-      <a:effectRef idx="0">
-        <a:scrgbClr r="0" g="0" b="0"/>
-      </a:effectRef>
-      <a:fontRef idx="minor"/>
-    </dgm:style>
-  </dgm:styleLbl>
-  <dgm:styleLbl name="solidBgAcc1">
-    <dgm:scene3d>
-      <a:camera prst="orthographicFront"/>
-      <a:lightRig rig="threePt" dir="t"/>
-    </dgm:scene3d>
-    <dgm:sp3d/>
-    <dgm:txPr/>
-    <dgm:style>
-      <a:lnRef idx="2">
-        <a:scrgbClr r="0" g="0" b="0"/>
-      </a:lnRef>
-      <a:fillRef idx="1">
-        <a:scrgbClr r="0" g="0" b="0"/>
-      </a:fillRef>
-      <a:effectRef idx="0">
-        <a:scrgbClr r="0" g="0" b="0"/>
-      </a:effectRef>
-      <a:fontRef idx="minor"/>
-    </dgm:style>
-  </dgm:styleLbl>
-  <dgm:styleLbl name="fgAccFollowNode1">
-    <dgm:scene3d>
-      <a:camera prst="orthographicFront"/>
-      <a:lightRig rig="threePt" dir="t"/>
-    </dgm:scene3d>
-    <dgm:sp3d/>
-    <dgm:txPr/>
-    <dgm:style>
-      <a:lnRef idx="2">
-        <a:scrgbClr r="0" g="0" b="0"/>
-      </a:lnRef>
-      <a:fillRef idx="1">
-        <a:scrgbClr r="0" g="0" b="0"/>
-      </a:fillRef>
-      <a:effectRef idx="0">
-        <a:scrgbClr r="0" g="0" b="0"/>
-      </a:effectRef>
-      <a:fontRef idx="minor"/>
-    </dgm:style>
-  </dgm:styleLbl>
-  <dgm:styleLbl name="alignAccFollowNode1">
-    <dgm:scene3d>
-      <a:camera prst="orthographicFront"/>
-      <a:lightRig rig="threePt" dir="t"/>
-    </dgm:scene3d>
-    <dgm:sp3d/>
-    <dgm:txPr/>
-    <dgm:style>
-      <a:lnRef idx="2">
-        <a:scrgbClr r="0" g="0" b="0"/>
-      </a:lnRef>
-      <a:fillRef idx="1">
-        <a:scrgbClr r="0" g="0" b="0"/>
-      </a:fillRef>
-      <a:effectRef idx="0">
-        <a:scrgbClr r="0" g="0" b="0"/>
-      </a:effectRef>
-      <a:fontRef idx="minor"/>
-    </dgm:style>
-  </dgm:styleLbl>
-  <dgm:styleLbl name="bgAccFollowNode1">
-    <dgm:scene3d>
-      <a:camera prst="orthographicFront"/>
-      <a:lightRig rig="threePt" dir="t"/>
-    </dgm:scene3d>
-    <dgm:sp3d/>
-    <dgm:txPr/>
-    <dgm:style>
-      <a:lnRef idx="2">
-        <a:scrgbClr r="0" g="0" b="0"/>
-      </a:lnRef>
-      <a:fillRef idx="1">
-        <a:scrgbClr r="0" g="0" b="0"/>
-      </a:fillRef>
-      <a:effectRef idx="0">
-        <a:scrgbClr r="0" g="0" b="0"/>
-      </a:effectRef>
-      <a:fontRef idx="minor"/>
-    </dgm:style>
-  </dgm:styleLbl>
-  <dgm:styleLbl name="fgAcc0">
-    <dgm:scene3d>
-      <a:camera prst="orthographicFront"/>
-      <a:lightRig rig="threePt" dir="t"/>
-    </dgm:scene3d>
-    <dgm:sp3d/>
-    <dgm:txPr/>
-    <dgm:style>
-      <a:lnRef idx="2">
-        <a:scrgbClr r="0" g="0" b="0"/>
-      </a:lnRef>
-      <a:fillRef idx="1">
-        <a:scrgbClr r="0" g="0" b="0"/>
-      </a:fillRef>
-      <a:effectRef idx="0">
-        <a:scrgbClr r="0" g="0" b="0"/>
-      </a:effectRef>
-      <a:fontRef idx="minor"/>
-    </dgm:style>
-  </dgm:styleLbl>
-  <dgm:styleLbl name="fgAcc2">
-    <dgm:scene3d>
-      <a:camera prst="orthographicFront"/>
-      <a:lightRig rig="threePt" dir="t"/>
-    </dgm:scene3d>
-    <dgm:sp3d/>
-    <dgm:txPr/>
-    <dgm:style>
-      <a:lnRef idx="2">
-        <a:scrgbClr r="0" g="0" b="0"/>
-      </a:lnRef>
-      <a:fillRef idx="1">
-        <a:scrgbClr r="0" g="0" b="0"/>
-      </a:fillRef>
-      <a:effectRef idx="0">
-        <a:scrgbClr r="0" g="0" b="0"/>
-      </a:effectRef>
-      <a:fontRef idx="minor"/>
-    </dgm:style>
-  </dgm:styleLbl>
-  <dgm:styleLbl name="fgAcc3">
-    <dgm:scene3d>
-      <a:camera prst="orthographicFront"/>
-      <a:lightRig rig="threePt" dir="t"/>
-    </dgm:scene3d>
-    <dgm:sp3d/>
-    <dgm:txPr/>
-    <dgm:style>
-      <a:lnRef idx="2">
-        <a:scrgbClr r="0" g="0" b="0"/>
-      </a:lnRef>
-      <a:fillRef idx="1">
-        <a:scrgbClr r="0" g="0" b="0"/>
-      </a:fillRef>
-      <a:effectRef idx="0">
-        <a:scrgbClr r="0" g="0" b="0"/>
-      </a:effectRef>
-      <a:fontRef idx="minor"/>
-    </dgm:style>
-  </dgm:styleLbl>
-  <dgm:styleLbl name="fgAcc4">
-    <dgm:scene3d>
-      <a:camera prst="orthographicFront"/>
-      <a:lightRig rig="threePt" dir="t"/>
-    </dgm:scene3d>
-    <dgm:sp3d/>
-    <dgm:txPr/>
-    <dgm:style>
-      <a:lnRef idx="2">
-        <a:scrgbClr r="0" g="0" b="0"/>
-      </a:lnRef>
-      <a:fillRef idx="1">
-        <a:scrgbClr r="0" g="0" b="0"/>
-      </a:fillRef>
-      <a:effectRef idx="0">
-        <a:scrgbClr r="0" g="0" b="0"/>
-      </a:effectRef>
-      <a:fontRef idx="minor"/>
-    </dgm:style>
-  </dgm:styleLbl>
-  <dgm:styleLbl name="bgShp">
-    <dgm:scene3d>
-      <a:camera prst="orthographicFront"/>
-      <a:lightRig rig="threePt" dir="t"/>
-    </dgm:scene3d>
-    <dgm:sp3d/>
-    <dgm:txPr/>
-    <dgm:style>
-      <a:lnRef idx="0">
-        <a:scrgbClr r="0" g="0" b="0"/>
-      </a:lnRef>
-      <a:fillRef idx="1">
-        <a:scrgbClr r="0" g="0" b="0"/>
-      </a:fillRef>
-      <a:effectRef idx="0">
-        <a:scrgbClr r="0" g="0" b="0"/>
-      </a:effectRef>
-      <a:fontRef idx="minor"/>
-    </dgm:style>
-  </dgm:styleLbl>
-  <dgm:styleLbl name="dkBgShp">
-    <dgm:scene3d>
-      <a:camera prst="orthographicFront"/>
-      <a:lightRig rig="threePt" dir="t"/>
-    </dgm:scene3d>
-    <dgm:sp3d/>
-    <dgm:txPr/>
-    <dgm:style>
-      <a:lnRef idx="0">
-        <a:scrgbClr r="0" g="0" b="0"/>
-      </a:lnRef>
-      <a:fillRef idx="1">
-        <a:scrgbClr r="0" g="0" b="0"/>
-      </a:fillRef>
-      <a:effectRef idx="0">
-        <a:scrgbClr r="0" g="0" b="0"/>
-      </a:effectRef>
-      <a:fontRef idx="minor"/>
-    </dgm:style>
-  </dgm:styleLbl>
-  <dgm:styleLbl name="trBgShp">
-    <dgm:scene3d>
-      <a:camera prst="orthographicFront"/>
-      <a:lightRig rig="threePt" dir="t"/>
-    </dgm:scene3d>
-    <dgm:sp3d/>
-    <dgm:txPr/>
-    <dgm:style>
-      <a:lnRef idx="0">
-        <a:scrgbClr r="0" g="0" b="0"/>
-      </a:lnRef>
-      <a:fillRef idx="1">
-        <a:scrgbClr r="0" g="0" b="0"/>
-      </a:fillRef>
-      <a:effectRef idx="0">
-        <a:scrgbClr r="0" g="0" b="0"/>
-      </a:effectRef>
-      <a:fontRef idx="minor"/>
-    </dgm:style>
-  </dgm:styleLbl>
-  <dgm:styleLbl name="fgShp">
-    <dgm:scene3d>
-      <a:camera prst="orthographicFront"/>
-      <a:lightRig rig="threePt" dir="t"/>
-    </dgm:scene3d>
-    <dgm:sp3d/>
-    <dgm:txPr/>
-    <dgm:style>
-      <a:lnRef idx="2">
-        <a:scrgbClr r="0" g="0" b="0"/>
-      </a:lnRef>
-      <a:fillRef idx="1">
-        <a:scrgbClr r="0" g="0" b="0"/>
-      </a:fillRef>
-      <a:effectRef idx="0">
-        <a:scrgbClr r="0" g="0" b="0"/>
-      </a:effectRef>
-      <a:fontRef idx="minor"/>
-    </dgm:style>
-  </dgm:styleLbl>
-  <dgm:styleLbl name="revTx">
-    <dgm:scene3d>
-      <a:camera prst="orthographicFront"/>
-      <a:lightRig rig="threePt" dir="t"/>
-    </dgm:scene3d>
-    <dgm:sp3d/>
-    <dgm:txPr/>
-    <dgm:style>
-      <a:lnRef idx="0">
-        <a:scrgbClr r="0" g="0" b="0"/>
-      </a:lnRef>
-      <a:fillRef idx="0">
-        <a:scrgbClr r="0" g="0" b="0"/>
-      </a:fillRef>
-      <a:effectRef idx="0">
-        <a:scrgbClr r="0" g="0" b="0"/>
-      </a:effectRef>
-      <a:fontRef idx="minor"/>
-    </dgm:style>
-  </dgm:styleLbl>
-</dgm:styleDef>
-</file>
-
 <file path=ppt/notesMasters/notesMaster1.xml><?xml version="1.0" encoding="utf-8"?>
 <p:notesMaster xmlns:a="http://schemas.openxmlformats.org/drawingml/2006/main" xmlns:r="http://schemas.openxmlformats.org/officeDocument/2006/relationships" xmlns:p="http://schemas.openxmlformats.org/presentationml/2006/main">
   <p:cSld>
@@ -6205,7 +3264,7 @@
           <a:p>
             <a:fld id="{32AF8DFE-3F9E-4E76-8DEB-FC1A7CECE63A}" type="datetimeFigureOut">
               <a:rPr lang="en-US" smtClean="0"/>
-              <a:t>1/17/2018</a:t>
+              <a:t>2/18/2018</a:t>
             </a:fld>
             <a:endParaRPr lang="en-US"/>
           </a:p>
@@ -6581,7 +3640,7 @@
                 <a:tabLst/>
                 <a:defRPr/>
               </a:pPr>
-              <a:t>12</a:t>
+              <a:t>14</a:t>
             </a:fld>
             <a:endParaRPr kumimoji="0" lang="en-US" sz="1800" b="0" i="0" u="none" strike="noStrike" kern="0" cap="none" spc="0" normalizeH="0" baseline="0" noProof="0" dirty="0">
               <a:ln>
@@ -11072,6 +8131,224 @@
           <p:cNvPr id="4" name="Title 3">
             <a:extLst>
               <a:ext uri="{FF2B5EF4-FFF2-40B4-BE49-F238E27FC236}">
+                <a16:creationId xmlns:a16="http://schemas.microsoft.com/office/drawing/2014/main" id="{8E3FEC22-483E-474D-B11B-331B7FBA5D77}"/>
+              </a:ext>
+            </a:extLst>
+          </p:cNvPr>
+          <p:cNvSpPr>
+            <a:spLocks noGrp="1"/>
+          </p:cNvSpPr>
+          <p:nvPr>
+            <p:ph type="title"/>
+          </p:nvPr>
+        </p:nvSpPr>
+        <p:spPr/>
+        <p:txBody>
+          <a:bodyPr/>
+          <a:lstStyle/>
+          <a:p>
+            <a:r>
+              <a:rPr lang="en-US" dirty="0"/>
+              <a:t>O que é </a:t>
+            </a:r>
+            <a:r>
+              <a:rPr lang="en-US" dirty="0" err="1"/>
+              <a:t>Computação</a:t>
+            </a:r>
+            <a:r>
+              <a:rPr lang="en-US" dirty="0"/>
+              <a:t> </a:t>
+            </a:r>
+            <a:r>
+              <a:rPr lang="en-US" dirty="0" err="1"/>
+              <a:t>em</a:t>
+            </a:r>
+            <a:r>
+              <a:rPr lang="en-US" dirty="0"/>
+              <a:t> </a:t>
+            </a:r>
+            <a:r>
+              <a:rPr lang="en-US" dirty="0" err="1"/>
+              <a:t>Nuvem</a:t>
+            </a:r>
+            <a:endParaRPr lang="en-US" dirty="0"/>
+          </a:p>
+        </p:txBody>
+      </p:sp>
+      <p:sp>
+        <p:nvSpPr>
+          <p:cNvPr id="5" name="Content Placeholder 4">
+            <a:extLst>
+              <a:ext uri="{FF2B5EF4-FFF2-40B4-BE49-F238E27FC236}">
+                <a16:creationId xmlns:a16="http://schemas.microsoft.com/office/drawing/2014/main" id="{FC12F862-2325-47C0-9036-110452A579F6}"/>
+              </a:ext>
+            </a:extLst>
+          </p:cNvPr>
+          <p:cNvSpPr>
+            <a:spLocks noGrp="1"/>
+          </p:cNvSpPr>
+          <p:nvPr>
+            <p:ph sz="quarter" idx="10"/>
+          </p:nvPr>
+        </p:nvSpPr>
+        <p:spPr/>
+        <p:txBody>
+          <a:bodyPr/>
+          <a:lstStyle/>
+          <a:p>
+            <a:r>
+              <a:rPr lang="en-US" dirty="0"/>
+              <a:t>NIST</a:t>
+            </a:r>
+          </a:p>
+        </p:txBody>
+      </p:sp>
+    </p:spTree>
+    <p:extLst>
+      <p:ext uri="{BB962C8B-B14F-4D97-AF65-F5344CB8AC3E}">
+        <p14:creationId xmlns:p14="http://schemas.microsoft.com/office/powerpoint/2010/main" val="4284891684"/>
+      </p:ext>
+    </p:extLst>
+  </p:cSld>
+  <p:clrMapOvr>
+    <a:masterClrMapping/>
+  </p:clrMapOvr>
+</p:sld>
+</file>
+
+<file path=ppt/slides/slide11.xml><?xml version="1.0" encoding="utf-8"?>
+<p:sld xmlns:a="http://schemas.openxmlformats.org/drawingml/2006/main" xmlns:r="http://schemas.openxmlformats.org/officeDocument/2006/relationships" xmlns:p="http://schemas.openxmlformats.org/presentationml/2006/main">
+  <p:cSld>
+    <p:spTree>
+      <p:nvGrpSpPr>
+        <p:cNvPr id="1" name=""/>
+        <p:cNvGrpSpPr/>
+        <p:nvPr/>
+      </p:nvGrpSpPr>
+      <p:grpSpPr>
+        <a:xfrm>
+          <a:off x="0" y="0"/>
+          <a:ext cx="0" cy="0"/>
+          <a:chOff x="0" y="0"/>
+          <a:chExt cx="0" cy="0"/>
+        </a:xfrm>
+      </p:grpSpPr>
+      <p:sp>
+        <p:nvSpPr>
+          <p:cNvPr id="5" name="Text Placeholder 4"/>
+          <p:cNvSpPr>
+            <a:spLocks noGrp="1"/>
+          </p:cNvSpPr>
+          <p:nvPr>
+            <p:ph type="body" sz="quarter" idx="10"/>
+          </p:nvPr>
+        </p:nvSpPr>
+        <p:spPr/>
+        <p:txBody>
+          <a:bodyPr/>
+          <a:lstStyle/>
+          <a:p>
+            <a:r>
+              <a:rPr lang="en-US" dirty="0" err="1"/>
+              <a:t>Características</a:t>
+            </a:r>
+            <a:r>
+              <a:rPr lang="en-US" dirty="0"/>
+              <a:t> </a:t>
+            </a:r>
+            <a:r>
+              <a:rPr lang="en-US" dirty="0" err="1"/>
+              <a:t>Essenciais</a:t>
+            </a:r>
+            <a:endParaRPr lang="en-US" dirty="0"/>
+          </a:p>
+        </p:txBody>
+      </p:sp>
+      <p:sp>
+        <p:nvSpPr>
+          <p:cNvPr id="4" name="Subtitle 3"/>
+          <p:cNvSpPr>
+            <a:spLocks noGrp="1"/>
+          </p:cNvSpPr>
+          <p:nvPr>
+            <p:ph type="subTitle" idx="1"/>
+          </p:nvPr>
+        </p:nvSpPr>
+        <p:spPr/>
+        <p:txBody>
+          <a:bodyPr/>
+          <a:lstStyle/>
+          <a:p>
+            <a:endParaRPr lang="en-US"/>
+          </a:p>
+        </p:txBody>
+      </p:sp>
+      <p:pic>
+        <p:nvPicPr>
+          <p:cNvPr id="6" name="Picture 5"/>
+          <p:cNvPicPr>
+            <a:picLocks noChangeAspect="1"/>
+          </p:cNvPicPr>
+          <p:nvPr/>
+        </p:nvPicPr>
+        <p:blipFill>
+          <a:blip r:embed="rId2">
+            <a:biLevel thresh="25000"/>
+            <a:extLst>
+              <a:ext uri="{28A0092B-C50C-407E-A947-70E740481C1C}">
+                <a14:useLocalDpi xmlns:a14="http://schemas.microsoft.com/office/drawing/2010/main" val="0"/>
+              </a:ext>
+            </a:extLst>
+          </a:blip>
+          <a:stretch>
+            <a:fillRect/>
+          </a:stretch>
+        </p:blipFill>
+        <p:spPr>
+          <a:xfrm>
+            <a:off x="9241646" y="2970413"/>
+            <a:ext cx="2477512" cy="2477512"/>
+          </a:xfrm>
+          <a:prstGeom prst="rect">
+            <a:avLst/>
+          </a:prstGeom>
+        </p:spPr>
+      </p:pic>
+    </p:spTree>
+    <p:extLst>
+      <p:ext uri="{BB962C8B-B14F-4D97-AF65-F5344CB8AC3E}">
+        <p14:creationId xmlns:p14="http://schemas.microsoft.com/office/powerpoint/2010/main" val="847135696"/>
+      </p:ext>
+    </p:extLst>
+  </p:cSld>
+  <p:clrMapOvr>
+    <a:masterClrMapping/>
+  </p:clrMapOvr>
+</p:sld>
+</file>
+
+<file path=ppt/slides/slide12.xml><?xml version="1.0" encoding="utf-8"?>
+<p:sld xmlns:a="http://schemas.openxmlformats.org/drawingml/2006/main" xmlns:r="http://schemas.openxmlformats.org/officeDocument/2006/relationships" xmlns:p="http://schemas.openxmlformats.org/presentationml/2006/main">
+  <p:cSld>
+    <p:spTree>
+      <p:nvGrpSpPr>
+        <p:cNvPr id="1" name=""/>
+        <p:cNvGrpSpPr/>
+        <p:nvPr/>
+      </p:nvGrpSpPr>
+      <p:grpSpPr>
+        <a:xfrm>
+          <a:off x="0" y="0"/>
+          <a:ext cx="0" cy="0"/>
+          <a:chOff x="0" y="0"/>
+          <a:chExt cx="0" cy="0"/>
+        </a:xfrm>
+      </p:grpSpPr>
+      <p:sp>
+        <p:nvSpPr>
+          <p:cNvPr id="4" name="Title 3">
+            <a:extLst>
+              <a:ext uri="{FF2B5EF4-FFF2-40B4-BE49-F238E27FC236}">
                 <a16:creationId xmlns:a16="http://schemas.microsoft.com/office/drawing/2014/main" id="{15839320-C563-4499-B123-07179297562E}"/>
               </a:ext>
             </a:extLst>
@@ -11148,7 +8425,7 @@
 </p:sld>
 </file>
 
-<file path=ppt/slides/slide11.xml><?xml version="1.0" encoding="utf-8"?>
+<file path=ppt/slides/slide13.xml><?xml version="1.0" encoding="utf-8"?>
 <p:sld xmlns:a="http://schemas.openxmlformats.org/drawingml/2006/main" xmlns:r="http://schemas.openxmlformats.org/officeDocument/2006/relationships" xmlns:p="http://schemas.openxmlformats.org/presentationml/2006/main">
   <p:cSld>
     <p:spTree>
@@ -11254,7 +8531,7 @@
 </p:sld>
 </file>
 
-<file path=ppt/slides/slide12.xml><?xml version="1.0" encoding="utf-8"?>
+<file path=ppt/slides/slide14.xml><?xml version="1.0" encoding="utf-8"?>
 <p:sld xmlns:a="http://schemas.openxmlformats.org/drawingml/2006/main" xmlns:r="http://schemas.openxmlformats.org/officeDocument/2006/relationships" xmlns:p="http://schemas.openxmlformats.org/presentationml/2006/main">
   <p:cSld>
     <p:spTree>
@@ -16250,7 +13527,7 @@
 </p:sld>
 </file>
 
-<file path=ppt/slides/slide13.xml><?xml version="1.0" encoding="utf-8"?>
+<file path=ppt/slides/slide15.xml><?xml version="1.0" encoding="utf-8"?>
 <p:sld xmlns:a="http://schemas.openxmlformats.org/drawingml/2006/main" xmlns:r="http://schemas.openxmlformats.org/officeDocument/2006/relationships" xmlns:p="http://schemas.openxmlformats.org/presentationml/2006/main">
   <p:cSld>
     <p:spTree>
@@ -16347,6 +13624,164 @@
     <p:extLst>
       <p:ext uri="{BB962C8B-B14F-4D97-AF65-F5344CB8AC3E}">
         <p14:creationId xmlns:p14="http://schemas.microsoft.com/office/powerpoint/2010/main" val="3413487278"/>
+      </p:ext>
+    </p:extLst>
+  </p:cSld>
+  <p:clrMapOvr>
+    <a:masterClrMapping/>
+  </p:clrMapOvr>
+</p:sld>
+</file>
+
+<file path=ppt/slides/slide16.xml><?xml version="1.0" encoding="utf-8"?>
+<p:sld xmlns:a="http://schemas.openxmlformats.org/drawingml/2006/main" xmlns:r="http://schemas.openxmlformats.org/officeDocument/2006/relationships" xmlns:p="http://schemas.openxmlformats.org/presentationml/2006/main">
+  <p:cSld>
+    <p:spTree>
+      <p:nvGrpSpPr>
+        <p:cNvPr id="1" name=""/>
+        <p:cNvGrpSpPr/>
+        <p:nvPr/>
+      </p:nvGrpSpPr>
+      <p:grpSpPr>
+        <a:xfrm>
+          <a:off x="0" y="0"/>
+          <a:ext cx="0" cy="0"/>
+          <a:chOff x="0" y="0"/>
+          <a:chExt cx="0" cy="0"/>
+        </a:xfrm>
+      </p:grpSpPr>
+      <p:sp>
+        <p:nvSpPr>
+          <p:cNvPr id="4" name="Title 3">
+            <a:extLst>
+              <a:ext uri="{FF2B5EF4-FFF2-40B4-BE49-F238E27FC236}">
+                <a16:creationId xmlns:a16="http://schemas.microsoft.com/office/drawing/2014/main" id="{A1ADFBB3-0212-4788-807D-EDCC970C6028}"/>
+              </a:ext>
+            </a:extLst>
+          </p:cNvPr>
+          <p:cNvSpPr>
+            <a:spLocks noGrp="1"/>
+          </p:cNvSpPr>
+          <p:nvPr>
+            <p:ph type="title"/>
+          </p:nvPr>
+        </p:nvSpPr>
+        <p:spPr/>
+        <p:txBody>
+          <a:bodyPr/>
+          <a:lstStyle/>
+          <a:p>
+            <a:r>
+              <a:rPr lang="en-US" dirty="0" err="1"/>
+              <a:t>Modelos</a:t>
+            </a:r>
+            <a:r>
+              <a:rPr lang="en-US" dirty="0"/>
+              <a:t> de Deployment</a:t>
+            </a:r>
+          </a:p>
+        </p:txBody>
+      </p:sp>
+      <p:sp>
+        <p:nvSpPr>
+          <p:cNvPr id="5" name="Content Placeholder 4">
+            <a:extLst>
+              <a:ext uri="{FF2B5EF4-FFF2-40B4-BE49-F238E27FC236}">
+                <a16:creationId xmlns:a16="http://schemas.microsoft.com/office/drawing/2014/main" id="{13C57017-2DBD-4AD6-96BA-87C931924C1B}"/>
+              </a:ext>
+            </a:extLst>
+          </p:cNvPr>
+          <p:cNvSpPr>
+            <a:spLocks noGrp="1"/>
+          </p:cNvSpPr>
+          <p:nvPr>
+            <p:ph sz="quarter" idx="10"/>
+          </p:nvPr>
+        </p:nvSpPr>
+        <p:spPr/>
+        <p:txBody>
+          <a:bodyPr/>
+          <a:lstStyle/>
+          <a:p>
+            <a:r>
+              <a:rPr lang="en-US" dirty="0" err="1"/>
+              <a:t>Computação</a:t>
+            </a:r>
+            <a:r>
+              <a:rPr lang="en-US" dirty="0"/>
+              <a:t> </a:t>
+            </a:r>
+            <a:r>
+              <a:rPr lang="en-US" dirty="0" err="1"/>
+              <a:t>em</a:t>
+            </a:r>
+            <a:r>
+              <a:rPr lang="en-US" dirty="0"/>
+              <a:t> </a:t>
+            </a:r>
+            <a:r>
+              <a:rPr lang="en-US" dirty="0" err="1"/>
+              <a:t>nuvem</a:t>
+            </a:r>
+            <a:r>
+              <a:rPr lang="en-US" dirty="0"/>
+              <a:t> </a:t>
+            </a:r>
+            <a:r>
+              <a:rPr lang="en-US" dirty="0" err="1"/>
+              <a:t>não</a:t>
+            </a:r>
+            <a:r>
+              <a:rPr lang="en-US" dirty="0"/>
+              <a:t> é ONDE </a:t>
+            </a:r>
+            <a:r>
+              <a:rPr lang="en-US" dirty="0" err="1"/>
+              <a:t>está</a:t>
+            </a:r>
+            <a:r>
+              <a:rPr lang="en-US" dirty="0"/>
+              <a:t> </a:t>
+            </a:r>
+            <a:r>
+              <a:rPr lang="en-US" dirty="0" err="1"/>
+              <a:t>rodando</a:t>
+            </a:r>
+            <a:r>
+              <a:rPr lang="en-US" dirty="0"/>
+              <a:t> e sim COMO </a:t>
+            </a:r>
+            <a:r>
+              <a:rPr lang="en-US" dirty="0" err="1"/>
+              <a:t>você</a:t>
+            </a:r>
+            <a:r>
+              <a:rPr lang="en-US" dirty="0"/>
+              <a:t> </a:t>
+            </a:r>
+            <a:r>
+              <a:rPr lang="en-US" dirty="0" err="1"/>
+              <a:t>roda</a:t>
+            </a:r>
+            <a:r>
+              <a:rPr lang="en-US" dirty="0"/>
+              <a:t> </a:t>
+            </a:r>
+            <a:r>
+              <a:rPr lang="en-US" dirty="0" err="1"/>
+              <a:t>seu</a:t>
+            </a:r>
+            <a:r>
+              <a:rPr lang="en-US" dirty="0"/>
+              <a:t> datacenter.</a:t>
+            </a:r>
+          </a:p>
+        </p:txBody>
+      </p:sp>
+    </p:spTree>
+    <p:extLst>
+      <p:ext uri="{BB962C8B-B14F-4D97-AF65-F5344CB8AC3E}">
+        <p14:creationId xmlns:p14="http://schemas.microsoft.com/office/powerpoint/2010/main" val="3213916118"/>
       </p:ext>
     </p:extLst>
   </p:cSld>
@@ -16678,12 +14113,54 @@
         </p:nvSpPr>
         <p:spPr/>
         <p:txBody>
-          <a:bodyPr/>
+          <a:bodyPr>
+            <a:normAutofit fontScale="90000"/>
+          </a:bodyPr>
           <a:lstStyle/>
           <a:p>
             <a:r>
               <a:rPr lang="en-US" dirty="0" err="1"/>
-              <a:t>Introdução</a:t>
+              <a:t>Constantes</a:t>
+            </a:r>
+            <a:r>
+              <a:rPr lang="en-US" dirty="0"/>
+              <a:t> </a:t>
+            </a:r>
+            <a:r>
+              <a:rPr lang="en-US" dirty="0" err="1"/>
+              <a:t>independente</a:t>
+            </a:r>
+            <a:r>
+              <a:rPr lang="en-US" dirty="0"/>
+              <a:t> das </a:t>
+            </a:r>
+            <a:r>
+              <a:rPr lang="en-US" dirty="0" err="1"/>
+              <a:t>Tendências</a:t>
+            </a:r>
+            <a:r>
+              <a:rPr lang="en-US" dirty="0"/>
+              <a:t> </a:t>
+            </a:r>
+            <a:r>
+              <a:rPr lang="en-US" dirty="0" err="1"/>
+              <a:t>Tecnológicas</a:t>
+            </a:r>
+            <a:r>
+              <a:rPr lang="en-US" dirty="0"/>
+              <a:t> dos </a:t>
+            </a:r>
+            <a:r>
+              <a:rPr lang="en-US" dirty="0" err="1"/>
+              <a:t>últimos</a:t>
+            </a:r>
+            <a:r>
+              <a:rPr lang="en-US" dirty="0"/>
+              <a:t> </a:t>
+            </a:r>
+            <a:r>
+              <a:rPr lang="en-US" dirty="0" err="1"/>
+              <a:t>anos</a:t>
             </a:r>
             <a:endParaRPr lang="en-US" dirty="0"/>
           </a:p>
@@ -16704,7 +14181,25 @@
           <a:bodyPr/>
           <a:lstStyle/>
           <a:p>
-            <a:endParaRPr lang="en-US"/>
+            <a:r>
+              <a:rPr lang="en-US" dirty="0"/>
+              <a:t>Software</a:t>
+            </a:r>
+          </a:p>
+          <a:p>
+            <a:pPr lvl="1"/>
+            <a:endParaRPr lang="en-US" dirty="0"/>
+          </a:p>
+          <a:p>
+            <a:r>
+              <a:rPr lang="en-US" dirty="0" err="1"/>
+              <a:t>Infraestrutura</a:t>
+            </a:r>
+            <a:endParaRPr lang="en-US" dirty="0"/>
+          </a:p>
+          <a:p>
+            <a:pPr lvl="1"/>
+            <a:endParaRPr lang="en-US" dirty="0"/>
           </a:p>
         </p:txBody>
       </p:sp>
@@ -17057,7 +14552,7 @@
           <p:cNvPr id="4" name="Title 3">
             <a:extLst>
               <a:ext uri="{FF2B5EF4-FFF2-40B4-BE49-F238E27FC236}">
-                <a16:creationId xmlns:a16="http://schemas.microsoft.com/office/drawing/2014/main" id="{EFE097F2-A407-43EE-BEBC-82CC04759BD7}"/>
+                <a16:creationId xmlns:a16="http://schemas.microsoft.com/office/drawing/2014/main" id="{8E3FEC22-483E-474D-B11B-331B7FBA5D77}"/>
               </a:ext>
             </a:extLst>
           </p:cNvPr>
@@ -17074,12 +14569,8 @@
           <a:lstStyle/>
           <a:p>
             <a:r>
-              <a:rPr lang="en-US" dirty="0"/>
-              <a:t>O que é </a:t>
-            </a:r>
-            <a:r>
-              <a:rPr lang="en-US" dirty="0" err="1"/>
-              <a:t>Computação</a:t>
+              <a:rPr lang="en-US" dirty="0" err="1"/>
+              <a:t>Maior</a:t>
             </a:r>
             <a:r>
               <a:rPr lang="en-US" dirty="0"/>
@@ -17087,7 +14578,7 @@
             </a:r>
             <a:r>
               <a:rPr lang="en-US" dirty="0" err="1"/>
-              <a:t>em</a:t>
+              <a:t>evolução</a:t>
             </a:r>
             <a:r>
               <a:rPr lang="en-US" dirty="0"/>
@@ -17095,47 +14586,837 @@
             </a:r>
             <a:r>
               <a:rPr lang="en-US" dirty="0" err="1"/>
-              <a:t>Nuvem</a:t>
+              <a:t>na</a:t>
+            </a:r>
+            <a:r>
+              <a:rPr lang="en-US" dirty="0"/>
+              <a:t> </a:t>
+            </a:r>
+            <a:r>
+              <a:rPr lang="en-US" dirty="0" err="1"/>
+              <a:t>computação</a:t>
             </a:r>
             <a:endParaRPr lang="en-US" dirty="0"/>
           </a:p>
         </p:txBody>
       </p:sp>
-      <p:graphicFrame>
-        <p:nvGraphicFramePr>
-          <p:cNvPr id="6" name="Content Placeholder 5">
+      <p:sp>
+        <p:nvSpPr>
+          <p:cNvPr id="5" name="Content Placeholder 4">
             <a:extLst>
               <a:ext uri="{FF2B5EF4-FFF2-40B4-BE49-F238E27FC236}">
-                <a16:creationId xmlns:a16="http://schemas.microsoft.com/office/drawing/2014/main" id="{15A079DF-0226-482B-ADB1-E50D5FD7E4EC}"/>
+                <a16:creationId xmlns:a16="http://schemas.microsoft.com/office/drawing/2014/main" id="{FC12F862-2325-47C0-9036-110452A579F6}"/>
               </a:ext>
             </a:extLst>
           </p:cNvPr>
-          <p:cNvGraphicFramePr>
-            <a:graphicFrameLocks noGrp="1"/>
-          </p:cNvGraphicFramePr>
+          <p:cNvSpPr>
+            <a:spLocks noGrp="1"/>
+          </p:cNvSpPr>
           <p:nvPr>
             <p:ph sz="quarter" idx="10"/>
-            <p:extLst>
-              <p:ext uri="{D42A27DB-BD31-4B8C-83A1-F6EECF244321}">
-                <p14:modId xmlns:p14="http://schemas.microsoft.com/office/powerpoint/2010/main" val="1780139047"/>
-              </p:ext>
-            </p:extLst>
           </p:nvPr>
-        </p:nvGraphicFramePr>
-        <p:xfrm>
-          <a:off x="379413" y="1387475"/>
-          <a:ext cx="11525250" cy="4627563"/>
-        </p:xfrm>
-        <a:graphic>
-          <a:graphicData uri="http://schemas.openxmlformats.org/drawingml/2006/diagram">
-            <dgm:relIds xmlns:dgm="http://schemas.openxmlformats.org/drawingml/2006/diagram" xmlns:r="http://schemas.openxmlformats.org/officeDocument/2006/relationships" r:dm="rId2" r:lo="rId3" r:qs="rId4" r:cs="rId5"/>
-          </a:graphicData>
-        </a:graphic>
-      </p:graphicFrame>
+        </p:nvSpPr>
+        <p:spPr/>
+        <p:txBody>
+          <a:bodyPr/>
+          <a:lstStyle/>
+          <a:p>
+            <a:r>
+              <a:rPr lang="en-US" dirty="0" err="1"/>
+              <a:t>Maior</a:t>
+            </a:r>
+            <a:r>
+              <a:rPr lang="en-US" dirty="0"/>
+              <a:t> </a:t>
+            </a:r>
+            <a:r>
+              <a:rPr lang="en-US" dirty="0" err="1"/>
+              <a:t>evolução</a:t>
+            </a:r>
+            <a:r>
+              <a:rPr lang="en-US" dirty="0"/>
+              <a:t> </a:t>
+            </a:r>
+            <a:r>
+              <a:rPr lang="en-US" dirty="0" err="1"/>
+              <a:t>em</a:t>
+            </a:r>
+            <a:r>
+              <a:rPr lang="en-US" dirty="0"/>
+              <a:t> </a:t>
+            </a:r>
+            <a:r>
+              <a:rPr lang="en-US" dirty="0" err="1"/>
+              <a:t>computação</a:t>
+            </a:r>
+            <a:r>
+              <a:rPr lang="en-US" dirty="0"/>
+              <a:t>;</a:t>
+            </a:r>
+          </a:p>
+          <a:p>
+            <a:pPr lvl="1"/>
+            <a:r>
+              <a:rPr lang="en-US" dirty="0" err="1"/>
+              <a:t>Objetivo</a:t>
+            </a:r>
+            <a:r>
+              <a:rPr lang="en-US" dirty="0"/>
+              <a:t> </a:t>
+            </a:r>
+            <a:r>
+              <a:rPr lang="en-US" dirty="0" err="1"/>
+              <a:t>comum</a:t>
+            </a:r>
+            <a:r>
+              <a:rPr lang="en-US" dirty="0"/>
+              <a:t> de </a:t>
+            </a:r>
+            <a:r>
+              <a:rPr lang="en-US" dirty="0" err="1"/>
+              <a:t>todos</a:t>
+            </a:r>
+            <a:r>
+              <a:rPr lang="en-US" dirty="0"/>
+              <a:t> </a:t>
+            </a:r>
+            <a:r>
+              <a:rPr lang="en-US" dirty="0" err="1"/>
+              <a:t>os</a:t>
+            </a:r>
+            <a:r>
+              <a:rPr lang="en-US" dirty="0"/>
+              <a:t> </a:t>
+            </a:r>
+            <a:r>
+              <a:rPr lang="en-US" dirty="0" err="1"/>
+              <a:t>modelos</a:t>
+            </a:r>
+            <a:r>
+              <a:rPr lang="en-US" dirty="0"/>
+              <a:t> </a:t>
+            </a:r>
+            <a:r>
+              <a:rPr lang="en-US" dirty="0" err="1"/>
+              <a:t>computacionais</a:t>
+            </a:r>
+            <a:r>
+              <a:rPr lang="en-US" dirty="0"/>
+              <a:t> </a:t>
+            </a:r>
+            <a:r>
+              <a:rPr lang="en-US" dirty="0" err="1"/>
+              <a:t>anteriores</a:t>
+            </a:r>
+            <a:endParaRPr lang="en-US" dirty="0"/>
+          </a:p>
+          <a:p>
+            <a:pPr lvl="1"/>
+            <a:r>
+              <a:rPr lang="en-US" dirty="0" err="1"/>
+              <a:t>Contextualizar</a:t>
+            </a:r>
+            <a:r>
+              <a:rPr lang="en-US" dirty="0"/>
+              <a:t> o </a:t>
+            </a:r>
+            <a:r>
+              <a:rPr lang="en-US" dirty="0" err="1"/>
+              <a:t>crescimento</a:t>
+            </a:r>
+            <a:r>
+              <a:rPr lang="en-US" dirty="0"/>
+              <a:t> antes do </a:t>
+            </a:r>
+            <a:r>
+              <a:rPr lang="en-US" dirty="0" err="1"/>
+              <a:t>problema</a:t>
+            </a:r>
+            <a:endParaRPr lang="en-US" dirty="0"/>
+          </a:p>
+          <a:p>
+            <a:pPr lvl="1"/>
+            <a:r>
+              <a:rPr lang="en-US" dirty="0" err="1"/>
+              <a:t>Complexidade</a:t>
+            </a:r>
+            <a:r>
+              <a:rPr lang="en-US" dirty="0"/>
+              <a:t> dos Datacenters</a:t>
+            </a:r>
+          </a:p>
+          <a:p>
+            <a:pPr lvl="2"/>
+            <a:r>
+              <a:rPr lang="en-US" dirty="0"/>
+              <a:t>Com </a:t>
+            </a:r>
+            <a:r>
+              <a:rPr lang="en-US" dirty="0" err="1"/>
+              <a:t>cada</a:t>
+            </a:r>
+            <a:r>
+              <a:rPr lang="en-US" dirty="0"/>
+              <a:t> </a:t>
+            </a:r>
+            <a:r>
+              <a:rPr lang="en-US" dirty="0" err="1"/>
+              <a:t>uma</a:t>
+            </a:r>
+            <a:r>
+              <a:rPr lang="en-US" dirty="0"/>
+              <a:t> das </a:t>
+            </a:r>
+            <a:r>
+              <a:rPr lang="en-US" dirty="0" err="1"/>
+              <a:t>transições</a:t>
+            </a:r>
+            <a:r>
+              <a:rPr lang="en-US" dirty="0"/>
+              <a:t> de </a:t>
+            </a:r>
+            <a:r>
+              <a:rPr lang="en-US" dirty="0" err="1"/>
+              <a:t>estilos</a:t>
+            </a:r>
+            <a:r>
+              <a:rPr lang="en-US" dirty="0"/>
+              <a:t> </a:t>
+            </a:r>
+            <a:r>
+              <a:rPr lang="en-US" dirty="0" err="1"/>
+              <a:t>computacionais</a:t>
+            </a:r>
+            <a:r>
+              <a:rPr lang="en-US" dirty="0"/>
+              <a:t> </a:t>
+            </a:r>
+            <a:r>
+              <a:rPr lang="en-US" dirty="0" err="1"/>
+              <a:t>mencionadas</a:t>
+            </a:r>
+            <a:r>
+              <a:rPr lang="en-US" dirty="0"/>
+              <a:t>, </a:t>
+            </a:r>
+            <a:r>
+              <a:rPr lang="en-US" dirty="0" err="1"/>
+              <a:t>vieram</a:t>
+            </a:r>
+            <a:r>
+              <a:rPr lang="en-US" dirty="0"/>
+              <a:t> </a:t>
+            </a:r>
+            <a:r>
+              <a:rPr lang="en-US" dirty="0" err="1"/>
+              <a:t>também</a:t>
+            </a:r>
+            <a:r>
+              <a:rPr lang="en-US" dirty="0"/>
+              <a:t> </a:t>
+            </a:r>
+            <a:r>
+              <a:rPr lang="en-US" dirty="0" err="1"/>
+              <a:t>suas</a:t>
+            </a:r>
+            <a:r>
+              <a:rPr lang="en-US" dirty="0"/>
+              <a:t> </a:t>
+            </a:r>
+            <a:r>
+              <a:rPr lang="en-US" dirty="0" err="1"/>
+              <a:t>complexidades</a:t>
+            </a:r>
+            <a:r>
+              <a:rPr lang="en-US" dirty="0"/>
+              <a:t> </a:t>
+            </a:r>
+            <a:r>
+              <a:rPr lang="en-US" dirty="0" err="1"/>
+              <a:t>inerentes</a:t>
+            </a:r>
+            <a:r>
+              <a:rPr lang="en-US" dirty="0"/>
+              <a:t>;</a:t>
+            </a:r>
+          </a:p>
+          <a:p>
+            <a:pPr lvl="2"/>
+            <a:r>
+              <a:rPr lang="en-US" dirty="0" err="1"/>
+              <a:t>Esse</a:t>
+            </a:r>
+            <a:r>
+              <a:rPr lang="en-US" dirty="0"/>
+              <a:t> </a:t>
+            </a:r>
+            <a:r>
+              <a:rPr lang="en-US" dirty="0" err="1"/>
+              <a:t>crescimento</a:t>
+            </a:r>
+            <a:r>
+              <a:rPr lang="en-US" dirty="0"/>
+              <a:t> </a:t>
+            </a:r>
+            <a:r>
+              <a:rPr lang="en-US" dirty="0" err="1"/>
+              <a:t>computacional</a:t>
+            </a:r>
+            <a:r>
+              <a:rPr lang="en-US" dirty="0"/>
+              <a:t> é o que </a:t>
+            </a:r>
+            <a:r>
+              <a:rPr lang="en-US" dirty="0" err="1"/>
+              <a:t>permitiu</a:t>
+            </a:r>
+            <a:r>
+              <a:rPr lang="en-US" dirty="0"/>
+              <a:t> o </a:t>
+            </a:r>
+            <a:r>
+              <a:rPr lang="en-US" dirty="0" err="1"/>
+              <a:t>grande</a:t>
+            </a:r>
+            <a:r>
+              <a:rPr lang="en-US" dirty="0"/>
+              <a:t> volume de </a:t>
+            </a:r>
+            <a:r>
+              <a:rPr lang="en-US" dirty="0" err="1"/>
+              <a:t>acesso</a:t>
+            </a:r>
+            <a:r>
+              <a:rPr lang="en-US" dirty="0"/>
+              <a:t> as </a:t>
+            </a:r>
+            <a:r>
+              <a:rPr lang="en-US" dirty="0" err="1"/>
+              <a:t>soluções</a:t>
+            </a:r>
+            <a:r>
+              <a:rPr lang="en-US" dirty="0"/>
+              <a:t> que </a:t>
+            </a:r>
+            <a:r>
+              <a:rPr lang="en-US" dirty="0" err="1"/>
+              <a:t>temos</a:t>
+            </a:r>
+            <a:r>
+              <a:rPr lang="en-US" dirty="0"/>
+              <a:t> </a:t>
+            </a:r>
+            <a:r>
+              <a:rPr lang="en-US" dirty="0" err="1"/>
+              <a:t>hoje</a:t>
+            </a:r>
+            <a:r>
+              <a:rPr lang="en-US" dirty="0"/>
+              <a:t>. Mas </a:t>
+            </a:r>
+            <a:r>
+              <a:rPr lang="en-US" dirty="0" err="1"/>
+              <a:t>esse</a:t>
+            </a:r>
+            <a:r>
+              <a:rPr lang="en-US" dirty="0"/>
+              <a:t> </a:t>
+            </a:r>
+            <a:r>
+              <a:rPr lang="en-US" dirty="0" err="1"/>
+              <a:t>crescimento</a:t>
+            </a:r>
+            <a:r>
+              <a:rPr lang="en-US" dirty="0"/>
+              <a:t> </a:t>
+            </a:r>
+            <a:r>
+              <a:rPr lang="en-US" dirty="0" err="1"/>
+              <a:t>teve</a:t>
+            </a:r>
+            <a:r>
+              <a:rPr lang="en-US" dirty="0"/>
+              <a:t> um </a:t>
+            </a:r>
+            <a:r>
+              <a:rPr lang="en-US" dirty="0" err="1"/>
+              <a:t>custo</a:t>
+            </a:r>
+            <a:r>
+              <a:rPr lang="en-US" dirty="0"/>
+              <a:t>.</a:t>
+            </a:r>
+          </a:p>
+          <a:p>
+            <a:pPr lvl="3"/>
+            <a:r>
+              <a:rPr lang="en-US" dirty="0" err="1"/>
+              <a:t>Computação</a:t>
+            </a:r>
+            <a:r>
+              <a:rPr lang="en-US" dirty="0"/>
+              <a:t> </a:t>
+            </a:r>
+            <a:r>
+              <a:rPr lang="en-US" dirty="0" err="1"/>
+              <a:t>em</a:t>
+            </a:r>
+            <a:r>
+              <a:rPr lang="en-US" dirty="0"/>
+              <a:t> </a:t>
+            </a:r>
+            <a:r>
+              <a:rPr lang="en-US" dirty="0" err="1"/>
+              <a:t>Nuvem</a:t>
+            </a:r>
+            <a:r>
+              <a:rPr lang="en-US" dirty="0"/>
+              <a:t> </a:t>
+            </a:r>
+            <a:r>
+              <a:rPr lang="en-US" dirty="0" err="1"/>
+              <a:t>Não</a:t>
+            </a:r>
+            <a:r>
+              <a:rPr lang="en-US" dirty="0"/>
+              <a:t> </a:t>
+            </a:r>
+            <a:r>
+              <a:rPr lang="en-US" dirty="0" err="1"/>
+              <a:t>veio</a:t>
+            </a:r>
+            <a:r>
+              <a:rPr lang="en-US" dirty="0"/>
+              <a:t> </a:t>
+            </a:r>
+            <a:r>
+              <a:rPr lang="en-US" dirty="0" err="1"/>
+              <a:t>Sozinha</a:t>
+            </a:r>
+            <a:r>
+              <a:rPr lang="en-US" dirty="0"/>
+              <a:t> </a:t>
+            </a:r>
+          </a:p>
+          <a:p>
+            <a:pPr lvl="4"/>
+            <a:r>
+              <a:rPr lang="en-US" dirty="0" err="1"/>
+              <a:t>Evoluções</a:t>
+            </a:r>
+            <a:r>
+              <a:rPr lang="en-US" dirty="0"/>
+              <a:t> </a:t>
+            </a:r>
+            <a:r>
+              <a:rPr lang="en-US" dirty="0" err="1"/>
+              <a:t>em</a:t>
+            </a:r>
+            <a:r>
+              <a:rPr lang="en-US" dirty="0"/>
+              <a:t> </a:t>
+            </a:r>
+            <a:r>
+              <a:rPr lang="en-US" dirty="0" err="1"/>
+              <a:t>todos</a:t>
+            </a:r>
+            <a:r>
+              <a:rPr lang="en-US" dirty="0"/>
+              <a:t> </a:t>
+            </a:r>
+            <a:r>
+              <a:rPr lang="en-US" dirty="0" err="1"/>
+              <a:t>os</a:t>
+            </a:r>
+            <a:r>
+              <a:rPr lang="en-US" dirty="0"/>
+              <a:t> </a:t>
+            </a:r>
+            <a:r>
+              <a:rPr lang="en-US" dirty="0" err="1"/>
+              <a:t>aspectos</a:t>
+            </a:r>
+            <a:r>
+              <a:rPr lang="en-US" dirty="0"/>
+              <a:t> </a:t>
+            </a:r>
+            <a:r>
+              <a:rPr lang="en-US" dirty="0" err="1"/>
+              <a:t>computacionais</a:t>
+            </a:r>
+            <a:r>
+              <a:rPr lang="en-US" dirty="0"/>
+              <a:t> e stacks que </a:t>
+            </a:r>
+            <a:r>
+              <a:rPr lang="en-US" dirty="0" err="1"/>
+              <a:t>compõem</a:t>
+            </a:r>
+            <a:r>
+              <a:rPr lang="en-US" dirty="0"/>
+              <a:t> um </a:t>
+            </a:r>
+            <a:r>
+              <a:rPr lang="en-US" dirty="0" err="1"/>
+              <a:t>computador</a:t>
+            </a:r>
+            <a:r>
+              <a:rPr lang="en-US" dirty="0"/>
+              <a:t>, </a:t>
+            </a:r>
+            <a:r>
+              <a:rPr lang="en-US" dirty="0" err="1"/>
+              <a:t>servidor</a:t>
+            </a:r>
+            <a:r>
+              <a:rPr lang="en-US" dirty="0"/>
+              <a:t> </a:t>
+            </a:r>
+            <a:r>
+              <a:rPr lang="en-US" dirty="0" err="1"/>
+              <a:t>ou</a:t>
+            </a:r>
+            <a:r>
+              <a:rPr lang="en-US" dirty="0"/>
+              <a:t> </a:t>
+            </a:r>
+            <a:r>
+              <a:rPr lang="en-US" dirty="0" err="1"/>
+              <a:t>mesmo</a:t>
+            </a:r>
+            <a:r>
+              <a:rPr lang="en-US" dirty="0"/>
+              <a:t> um datacenter </a:t>
+            </a:r>
+            <a:r>
+              <a:rPr lang="en-US" dirty="0" err="1"/>
+              <a:t>inteiro</a:t>
+            </a:r>
+            <a:r>
+              <a:rPr lang="en-US" dirty="0"/>
+              <a:t> </a:t>
+            </a:r>
+            <a:r>
+              <a:rPr lang="en-US" dirty="0" err="1"/>
+              <a:t>como</a:t>
+            </a:r>
+            <a:r>
+              <a:rPr lang="en-US" dirty="0"/>
+              <a:t>: </a:t>
+            </a:r>
+            <a:r>
+              <a:rPr lang="en-US" b="1" dirty="0" err="1"/>
+              <a:t>Computação</a:t>
+            </a:r>
+            <a:r>
+              <a:rPr lang="en-US" b="1" dirty="0"/>
+              <a:t> (</a:t>
+            </a:r>
+            <a:r>
+              <a:rPr lang="en-US" b="1" dirty="0" err="1"/>
+              <a:t>processadores</a:t>
+            </a:r>
+            <a:r>
+              <a:rPr lang="en-US" b="1" dirty="0"/>
+              <a:t>),</a:t>
+            </a:r>
+            <a:r>
+              <a:rPr lang="en-US" dirty="0"/>
+              <a:t> </a:t>
+            </a:r>
+            <a:r>
+              <a:rPr lang="en-US" b="1" dirty="0"/>
+              <a:t>Rede, Storage, </a:t>
+            </a:r>
+            <a:r>
+              <a:rPr lang="en-US" b="1" dirty="0" err="1"/>
+              <a:t>Servidores</a:t>
+            </a:r>
+            <a:r>
+              <a:rPr lang="en-US" b="1" dirty="0"/>
+              <a:t>, </a:t>
+            </a:r>
+            <a:r>
+              <a:rPr lang="en-US" b="1" dirty="0" err="1"/>
+              <a:t>Virtualização</a:t>
+            </a:r>
+            <a:r>
+              <a:rPr lang="en-US" b="1" dirty="0"/>
+              <a:t>, SO (</a:t>
+            </a:r>
+            <a:r>
+              <a:rPr lang="en-US" b="1" dirty="0" err="1"/>
+              <a:t>Escala</a:t>
+            </a:r>
+            <a:r>
+              <a:rPr lang="en-US" b="1" dirty="0"/>
+              <a:t> de DC-Hardware), </a:t>
+            </a:r>
+            <a:r>
+              <a:rPr lang="en-US" b="1" dirty="0" err="1"/>
+              <a:t>Gestão</a:t>
+            </a:r>
+            <a:r>
+              <a:rPr lang="en-US" b="1" dirty="0"/>
+              <a:t> (</a:t>
+            </a:r>
+            <a:r>
+              <a:rPr lang="en-US" b="1" dirty="0" err="1"/>
+              <a:t>Controlado</a:t>
+            </a:r>
+            <a:r>
+              <a:rPr lang="en-US" b="1" dirty="0"/>
+              <a:t> </a:t>
+            </a:r>
+            <a:r>
+              <a:rPr lang="en-US" b="1" dirty="0" err="1"/>
+              <a:t>por</a:t>
+            </a:r>
+            <a:r>
+              <a:rPr lang="en-US" b="1" dirty="0"/>
+              <a:t> software) etc</a:t>
+            </a:r>
+            <a:r>
+              <a:rPr lang="en-US" dirty="0"/>
+              <a:t>.</a:t>
+            </a:r>
+          </a:p>
+          <a:p>
+            <a:pPr lvl="2"/>
+            <a:r>
+              <a:rPr lang="en-US" dirty="0" err="1"/>
+              <a:t>Os</a:t>
+            </a:r>
+            <a:r>
+              <a:rPr lang="en-US" dirty="0"/>
+              <a:t> datacenters das </a:t>
+            </a:r>
+            <a:r>
+              <a:rPr lang="en-US" dirty="0" err="1"/>
+              <a:t>empresas</a:t>
+            </a:r>
+            <a:r>
+              <a:rPr lang="en-US" dirty="0"/>
+              <a:t> </a:t>
+            </a:r>
+            <a:r>
+              <a:rPr lang="en-US" dirty="0" err="1"/>
+              <a:t>atingiram</a:t>
+            </a:r>
+            <a:r>
+              <a:rPr lang="en-US" dirty="0"/>
+              <a:t> </a:t>
+            </a:r>
+            <a:r>
+              <a:rPr lang="en-US" dirty="0" err="1"/>
+              <a:t>seu</a:t>
+            </a:r>
+            <a:r>
+              <a:rPr lang="en-US" dirty="0"/>
+              <a:t> </a:t>
+            </a:r>
+            <a:r>
+              <a:rPr lang="en-US" dirty="0" err="1"/>
+              <a:t>potencial</a:t>
+            </a:r>
+            <a:r>
+              <a:rPr lang="en-US" dirty="0"/>
+              <a:t> </a:t>
+            </a:r>
+            <a:r>
+              <a:rPr lang="en-US" dirty="0" err="1"/>
+              <a:t>máximo</a:t>
+            </a:r>
+            <a:r>
+              <a:rPr lang="en-US" dirty="0"/>
+              <a:t> e </a:t>
+            </a:r>
+            <a:r>
+              <a:rPr lang="en-US" dirty="0" err="1"/>
+              <a:t>crescer</a:t>
+            </a:r>
+            <a:r>
+              <a:rPr lang="en-US" dirty="0"/>
+              <a:t> </a:t>
+            </a:r>
+            <a:r>
+              <a:rPr lang="en-US" dirty="0" err="1"/>
+              <a:t>além</a:t>
+            </a:r>
+            <a:r>
+              <a:rPr lang="en-US" dirty="0"/>
+              <a:t> </a:t>
+            </a:r>
+            <a:r>
+              <a:rPr lang="en-US" dirty="0" err="1"/>
+              <a:t>disso</a:t>
+            </a:r>
+            <a:r>
+              <a:rPr lang="en-US" dirty="0"/>
+              <a:t>, </a:t>
+            </a:r>
+            <a:r>
+              <a:rPr lang="en-US" dirty="0" err="1"/>
+              <a:t>atendendo</a:t>
+            </a:r>
+            <a:r>
+              <a:rPr lang="en-US" dirty="0"/>
+              <a:t> as </a:t>
+            </a:r>
+            <a:r>
+              <a:rPr lang="en-US" dirty="0" err="1"/>
+              <a:t>demandas</a:t>
+            </a:r>
+            <a:r>
+              <a:rPr lang="en-US" dirty="0"/>
+              <a:t> de </a:t>
+            </a:r>
+            <a:r>
+              <a:rPr lang="en-US" dirty="0" err="1"/>
+              <a:t>negócios</a:t>
+            </a:r>
+            <a:r>
+              <a:rPr lang="en-US" dirty="0"/>
+              <a:t> </a:t>
+            </a:r>
+            <a:r>
+              <a:rPr lang="en-US" dirty="0" err="1"/>
+              <a:t>na</a:t>
+            </a:r>
+            <a:r>
+              <a:rPr lang="en-US" dirty="0"/>
+              <a:t> era da Internet, </a:t>
+            </a:r>
+            <a:r>
+              <a:rPr lang="en-US" dirty="0" err="1"/>
+              <a:t>requer</a:t>
+            </a:r>
+            <a:r>
+              <a:rPr lang="en-US" dirty="0"/>
+              <a:t> </a:t>
+            </a:r>
+            <a:r>
+              <a:rPr lang="en-US" dirty="0" err="1"/>
+              <a:t>uma</a:t>
+            </a:r>
+            <a:r>
+              <a:rPr lang="en-US" dirty="0"/>
+              <a:t> </a:t>
+            </a:r>
+            <a:r>
+              <a:rPr lang="en-US" dirty="0" err="1"/>
+              <a:t>ruptura</a:t>
+            </a:r>
+            <a:r>
+              <a:rPr lang="en-US" dirty="0"/>
+              <a:t> no </a:t>
+            </a:r>
+            <a:r>
+              <a:rPr lang="en-US" dirty="0" err="1"/>
+              <a:t>modelo</a:t>
+            </a:r>
+            <a:r>
+              <a:rPr lang="en-US" dirty="0"/>
+              <a:t> </a:t>
+            </a:r>
+            <a:r>
+              <a:rPr lang="en-US" dirty="0" err="1"/>
+              <a:t>atual</a:t>
+            </a:r>
+            <a:r>
+              <a:rPr lang="en-US" dirty="0"/>
+              <a:t> de </a:t>
+            </a:r>
+            <a:r>
+              <a:rPr lang="en-US" dirty="0" err="1"/>
+              <a:t>computação</a:t>
+            </a:r>
+            <a:r>
+              <a:rPr lang="en-US" dirty="0"/>
+              <a:t>. </a:t>
+            </a:r>
+            <a:r>
+              <a:rPr lang="en-US" dirty="0" err="1"/>
+              <a:t>Ruptura</a:t>
+            </a:r>
+            <a:r>
+              <a:rPr lang="en-US" dirty="0"/>
+              <a:t> </a:t>
+            </a:r>
+            <a:r>
+              <a:rPr lang="en-US" dirty="0" err="1"/>
+              <a:t>essa</a:t>
+            </a:r>
+            <a:r>
+              <a:rPr lang="en-US" dirty="0"/>
+              <a:t>, </a:t>
+            </a:r>
+            <a:r>
+              <a:rPr lang="en-US" dirty="0" err="1"/>
+              <a:t>chamada</a:t>
+            </a:r>
+            <a:r>
+              <a:rPr lang="en-US" dirty="0"/>
+              <a:t> </a:t>
+            </a:r>
+            <a:r>
+              <a:rPr lang="en-US" dirty="0" err="1"/>
+              <a:t>pelo</a:t>
+            </a:r>
+            <a:r>
+              <a:rPr lang="en-US" dirty="0"/>
+              <a:t> Mercado de </a:t>
+            </a:r>
+            <a:r>
+              <a:rPr lang="en-US" dirty="0" err="1"/>
+              <a:t>Computação</a:t>
+            </a:r>
+            <a:r>
+              <a:rPr lang="en-US" dirty="0"/>
+              <a:t> </a:t>
+            </a:r>
+            <a:r>
+              <a:rPr lang="en-US" dirty="0" err="1"/>
+              <a:t>em</a:t>
+            </a:r>
+            <a:r>
+              <a:rPr lang="en-US" dirty="0"/>
+              <a:t> </a:t>
+            </a:r>
+            <a:r>
+              <a:rPr lang="en-US" dirty="0" err="1"/>
+              <a:t>Nuvem</a:t>
+            </a:r>
+            <a:r>
+              <a:rPr lang="en-US" dirty="0"/>
+              <a:t>.</a:t>
+            </a:r>
+          </a:p>
+          <a:p>
+            <a:pPr lvl="1"/>
+            <a:r>
+              <a:rPr lang="en-US" dirty="0"/>
+              <a:t>Estrada para a </a:t>
+            </a:r>
+            <a:r>
+              <a:rPr lang="en-US" dirty="0" err="1"/>
+              <a:t>Transformação</a:t>
+            </a:r>
+            <a:r>
+              <a:rPr lang="en-US" dirty="0"/>
+              <a:t> Digital</a:t>
+            </a:r>
+          </a:p>
+          <a:p>
+            <a:pPr lvl="2"/>
+            <a:endParaRPr lang="en-US" dirty="0"/>
+          </a:p>
+        </p:txBody>
+      </p:sp>
     </p:spTree>
     <p:extLst>
       <p:ext uri="{BB962C8B-B14F-4D97-AF65-F5344CB8AC3E}">
-        <p14:creationId xmlns:p14="http://schemas.microsoft.com/office/powerpoint/2010/main" val="3201110050"/>
+        <p14:creationId xmlns:p14="http://schemas.microsoft.com/office/powerpoint/2010/main" val="2717185107"/>
       </p:ext>
     </p:extLst>
   </p:cSld>
@@ -17164,12 +15445,18 @@
       </p:grpSpPr>
       <p:sp>
         <p:nvSpPr>
-          <p:cNvPr id="5" name="Text Placeholder 4"/>
+          <p:cNvPr id="4" name="Title 3">
+            <a:extLst>
+              <a:ext uri="{FF2B5EF4-FFF2-40B4-BE49-F238E27FC236}">
+                <a16:creationId xmlns:a16="http://schemas.microsoft.com/office/drawing/2014/main" id="{8E3FEC22-483E-474D-B11B-331B7FBA5D77}"/>
+              </a:ext>
+            </a:extLst>
+          </p:cNvPr>
           <p:cNvSpPr>
             <a:spLocks noGrp="1"/>
           </p:cNvSpPr>
           <p:nvPr>
-            <p:ph type="body" sz="quarter" idx="10"/>
+            <p:ph type="title"/>
           </p:nvPr>
         </p:nvSpPr>
         <p:spPr/>
@@ -17178,8 +15465,12 @@
           <a:lstStyle/>
           <a:p>
             <a:r>
-              <a:rPr lang="en-US" dirty="0" err="1"/>
-              <a:t>Características</a:t>
+              <a:rPr lang="en-US" dirty="0"/>
+              <a:t>O que é </a:t>
+            </a:r>
+            <a:r>
+              <a:rPr lang="en-US" dirty="0" err="1"/>
+              <a:t>Computação</a:t>
             </a:r>
             <a:r>
               <a:rPr lang="en-US" dirty="0"/>
@@ -17187,7 +15478,15 @@
             </a:r>
             <a:r>
               <a:rPr lang="en-US" dirty="0" err="1"/>
-              <a:t>Essenciais</a:t>
+              <a:t>em</a:t>
+            </a:r>
+            <a:r>
+              <a:rPr lang="en-US" dirty="0"/>
+              <a:t> </a:t>
+            </a:r>
+            <a:r>
+              <a:rPr lang="en-US" dirty="0" err="1"/>
+              <a:t>Nuvem</a:t>
             </a:r>
             <a:endParaRPr lang="en-US" dirty="0"/>
           </a:p>
@@ -17195,12 +15494,18 @@
       </p:sp>
       <p:sp>
         <p:nvSpPr>
-          <p:cNvPr id="4" name="Subtitle 3"/>
+          <p:cNvPr id="5" name="Content Placeholder 4">
+            <a:extLst>
+              <a:ext uri="{FF2B5EF4-FFF2-40B4-BE49-F238E27FC236}">
+                <a16:creationId xmlns:a16="http://schemas.microsoft.com/office/drawing/2014/main" id="{FC12F862-2325-47C0-9036-110452A579F6}"/>
+              </a:ext>
+            </a:extLst>
+          </p:cNvPr>
           <p:cNvSpPr>
             <a:spLocks noGrp="1"/>
           </p:cNvSpPr>
           <p:nvPr>
-            <p:ph type="subTitle" idx="1"/>
+            <p:ph sz="quarter" idx="10"/>
           </p:nvPr>
         </p:nvSpPr>
         <p:spPr/>
@@ -17208,45 +15513,208 @@
           <a:bodyPr/>
           <a:lstStyle/>
           <a:p>
-            <a:endParaRPr lang="en-US"/>
+            <a:r>
+              <a:rPr lang="en-US" dirty="0"/>
+              <a:t>Novo </a:t>
+            </a:r>
+            <a:r>
+              <a:rPr lang="en-US" dirty="0" err="1"/>
+              <a:t>Paradigma</a:t>
+            </a:r>
+            <a:r>
+              <a:rPr lang="en-US" dirty="0"/>
+              <a:t> </a:t>
+            </a:r>
+            <a:r>
+              <a:rPr lang="en-US" dirty="0" err="1"/>
+              <a:t>Computacional</a:t>
+            </a:r>
+            <a:endParaRPr lang="en-US" dirty="0"/>
+          </a:p>
+          <a:p>
+            <a:pPr lvl="2"/>
+            <a:r>
+              <a:rPr lang="en-US" dirty="0" err="1"/>
+              <a:t>Características</a:t>
+            </a:r>
+            <a:r>
+              <a:rPr lang="en-US" dirty="0"/>
+              <a:t>;</a:t>
+            </a:r>
+          </a:p>
+          <a:p>
+            <a:pPr lvl="2"/>
+            <a:r>
+              <a:rPr lang="en-US" dirty="0" err="1"/>
+              <a:t>Principios</a:t>
+            </a:r>
+            <a:r>
+              <a:rPr lang="en-US" dirty="0"/>
+              <a:t>;</a:t>
+            </a:r>
+          </a:p>
+          <a:p>
+            <a:pPr lvl="2"/>
+            <a:r>
+              <a:rPr lang="en-US" dirty="0" err="1"/>
+              <a:t>Paradigmas</a:t>
+            </a:r>
+            <a:r>
+              <a:rPr lang="en-US" dirty="0"/>
+              <a:t>;</a:t>
+            </a:r>
+          </a:p>
+          <a:p>
+            <a:pPr lvl="2"/>
+            <a:r>
+              <a:rPr lang="en-US" dirty="0" err="1"/>
+              <a:t>Modelos</a:t>
+            </a:r>
+            <a:r>
+              <a:rPr lang="en-US" dirty="0"/>
+              <a:t>;</a:t>
+            </a:r>
+          </a:p>
+          <a:p>
+            <a:r>
+              <a:rPr lang="en-US" dirty="0"/>
+              <a:t>Thomas </a:t>
+            </a:r>
+            <a:r>
+              <a:rPr lang="en-US" dirty="0" err="1"/>
+              <a:t>Erl</a:t>
+            </a:r>
+            <a:endParaRPr lang="en-US" dirty="0"/>
+          </a:p>
+          <a:p>
+            <a:pPr lvl="1"/>
+            <a:r>
+              <a:rPr lang="en-US" dirty="0"/>
+              <a:t>“Cloud Computing é um paradigm de design que </a:t>
+            </a:r>
+            <a:r>
+              <a:rPr lang="en-US" dirty="0" err="1"/>
+              <a:t>abrange</a:t>
+            </a:r>
+            <a:r>
+              <a:rPr lang="en-US" dirty="0"/>
+              <a:t> um conjunto </a:t>
+            </a:r>
+            <a:r>
+              <a:rPr lang="en-US" dirty="0" err="1"/>
+              <a:t>especifico</a:t>
+            </a:r>
+            <a:r>
+              <a:rPr lang="en-US" dirty="0"/>
+              <a:t> de </a:t>
+            </a:r>
+            <a:r>
+              <a:rPr lang="en-US" dirty="0" err="1"/>
+              <a:t>princípios</a:t>
+            </a:r>
+            <a:r>
+              <a:rPr lang="en-US" dirty="0"/>
+              <a:t> de design. A </a:t>
+            </a:r>
+            <a:r>
+              <a:rPr lang="en-US" dirty="0" err="1"/>
+              <a:t>aplicação</a:t>
+            </a:r>
+            <a:r>
+              <a:rPr lang="en-US" dirty="0"/>
+              <a:t> </a:t>
+            </a:r>
+            <a:r>
+              <a:rPr lang="en-US" dirty="0" err="1"/>
+              <a:t>desses</a:t>
+            </a:r>
+            <a:r>
+              <a:rPr lang="en-US" dirty="0"/>
+              <a:t> </a:t>
+            </a:r>
+            <a:r>
+              <a:rPr lang="en-US" dirty="0" err="1"/>
+              <a:t>princípios</a:t>
+            </a:r>
+            <a:r>
+              <a:rPr lang="en-US" dirty="0"/>
+              <a:t> </a:t>
+            </a:r>
+            <a:r>
+              <a:rPr lang="en-US" dirty="0" err="1"/>
+              <a:t>ao</a:t>
+            </a:r>
+            <a:r>
+              <a:rPr lang="en-US" dirty="0"/>
+              <a:t> design da </a:t>
+            </a:r>
+            <a:r>
+              <a:rPr lang="en-US" dirty="0" err="1"/>
+              <a:t>lógica</a:t>
+            </a:r>
+            <a:r>
+              <a:rPr lang="en-US" dirty="0"/>
+              <a:t> </a:t>
+            </a:r>
+            <a:r>
+              <a:rPr lang="en-US" dirty="0" err="1"/>
+              <a:t>resulta</a:t>
+            </a:r>
+            <a:r>
+              <a:rPr lang="en-US" dirty="0"/>
+              <a:t> </a:t>
+            </a:r>
+            <a:r>
+              <a:rPr lang="en-US" dirty="0" err="1"/>
+              <a:t>em</a:t>
+            </a:r>
+            <a:r>
+              <a:rPr lang="en-US" dirty="0"/>
+              <a:t> </a:t>
+            </a:r>
+            <a:r>
+              <a:rPr lang="en-US" dirty="0" err="1"/>
+              <a:t>uma</a:t>
+            </a:r>
+            <a:r>
+              <a:rPr lang="en-US" dirty="0"/>
+              <a:t> </a:t>
+            </a:r>
+            <a:r>
+              <a:rPr lang="en-US" dirty="0" err="1"/>
+              <a:t>lógica</a:t>
+            </a:r>
+            <a:r>
+              <a:rPr lang="en-US" dirty="0"/>
+              <a:t> </a:t>
+            </a:r>
+            <a:r>
+              <a:rPr lang="en-US" dirty="0" err="1"/>
+              <a:t>orientada</a:t>
+            </a:r>
+            <a:r>
+              <a:rPr lang="en-US" dirty="0"/>
+              <a:t> a </a:t>
+            </a:r>
+            <a:r>
+              <a:rPr lang="en-US" dirty="0" err="1"/>
+              <a:t>serviços</a:t>
+            </a:r>
+            <a:r>
+              <a:rPr lang="en-US" dirty="0"/>
+              <a:t>. “</a:t>
+            </a:r>
+          </a:p>
+          <a:p>
+            <a:pPr lvl="2"/>
+            <a:endParaRPr lang="en-US" dirty="0"/>
           </a:p>
         </p:txBody>
       </p:sp>
-      <p:pic>
-        <p:nvPicPr>
-          <p:cNvPr id="6" name="Picture 5"/>
-          <p:cNvPicPr>
-            <a:picLocks noChangeAspect="1"/>
-          </p:cNvPicPr>
-          <p:nvPr/>
-        </p:nvPicPr>
-        <p:blipFill>
-          <a:blip r:embed="rId2">
-            <a:biLevel thresh="25000"/>
-            <a:extLst>
-              <a:ext uri="{28A0092B-C50C-407E-A947-70E740481C1C}">
-                <a14:useLocalDpi xmlns:a14="http://schemas.microsoft.com/office/drawing/2010/main" val="0"/>
-              </a:ext>
-            </a:extLst>
-          </a:blip>
-          <a:stretch>
-            <a:fillRect/>
-          </a:stretch>
-        </p:blipFill>
-        <p:spPr>
-          <a:xfrm>
-            <a:off x="9241646" y="2970413"/>
-            <a:ext cx="2477512" cy="2477512"/>
-          </a:xfrm>
-          <a:prstGeom prst="rect">
-            <a:avLst/>
-          </a:prstGeom>
-        </p:spPr>
-      </p:pic>
     </p:spTree>
     <p:extLst>
       <p:ext uri="{BB962C8B-B14F-4D97-AF65-F5344CB8AC3E}">
-        <p14:creationId xmlns:p14="http://schemas.microsoft.com/office/powerpoint/2010/main" val="847135696"/>
+        <p14:creationId xmlns:p14="http://schemas.microsoft.com/office/powerpoint/2010/main" val="3486515999"/>
       </p:ext>
     </p:extLst>
   </p:cSld>

</xml_diff>

<commit_message>
Add Service Models Slides
</commit_message>
<xml_diff>
--- a/Introduction to Cloud Computing/Introduction to Cloud Computing.pptx
+++ b/Introduction to Cloud Computing/Introduction to Cloud Computing.pptx
@@ -5,25 +5,31 @@
     <p:sldMasterId id="2147483659" r:id="rId1"/>
   </p:sldMasterIdLst>
   <p:notesMasterIdLst>
-    <p:notesMasterId r:id="rId18"/>
+    <p:notesMasterId r:id="rId24"/>
   </p:notesMasterIdLst>
   <p:sldIdLst>
     <p:sldId id="256" r:id="rId2"/>
     <p:sldId id="257" r:id="rId3"/>
     <p:sldId id="258" r:id="rId4"/>
-    <p:sldId id="264" r:id="rId5"/>
-    <p:sldId id="263" r:id="rId6"/>
-    <p:sldId id="262" r:id="rId7"/>
-    <p:sldId id="261" r:id="rId8"/>
-    <p:sldId id="271" r:id="rId9"/>
-    <p:sldId id="273" r:id="rId10"/>
-    <p:sldId id="272" r:id="rId11"/>
-    <p:sldId id="265" r:id="rId12"/>
-    <p:sldId id="266" r:id="rId13"/>
-    <p:sldId id="268" r:id="rId14"/>
-    <p:sldId id="270" r:id="rId15"/>
-    <p:sldId id="269" r:id="rId16"/>
-    <p:sldId id="274" r:id="rId17"/>
+    <p:sldId id="262" r:id="rId5"/>
+    <p:sldId id="264" r:id="rId6"/>
+    <p:sldId id="261" r:id="rId7"/>
+    <p:sldId id="271" r:id="rId8"/>
+    <p:sldId id="273" r:id="rId9"/>
+    <p:sldId id="272" r:id="rId10"/>
+    <p:sldId id="265" r:id="rId11"/>
+    <p:sldId id="266" r:id="rId12"/>
+    <p:sldId id="275" r:id="rId13"/>
+    <p:sldId id="276" r:id="rId14"/>
+    <p:sldId id="277" r:id="rId15"/>
+    <p:sldId id="278" r:id="rId16"/>
+    <p:sldId id="279" r:id="rId17"/>
+    <p:sldId id="268" r:id="rId18"/>
+    <p:sldId id="270" r:id="rId19"/>
+    <p:sldId id="269" r:id="rId20"/>
+    <p:sldId id="274" r:id="rId21"/>
+    <p:sldId id="280" r:id="rId22"/>
+    <p:sldId id="281" r:id="rId23"/>
   </p:sldIdLst>
   <p:sldSz cx="12192000" cy="6858000"/>
   <p:notesSz cx="6858000" cy="9144000"/>
@@ -130,19 +136,25 @@
             <p14:sldId id="256"/>
             <p14:sldId id="257"/>
             <p14:sldId id="258"/>
+            <p14:sldId id="262"/>
             <p14:sldId id="264"/>
-            <p14:sldId id="263"/>
-            <p14:sldId id="262"/>
             <p14:sldId id="261"/>
             <p14:sldId id="271"/>
             <p14:sldId id="273"/>
             <p14:sldId id="272"/>
             <p14:sldId id="265"/>
             <p14:sldId id="266"/>
+            <p14:sldId id="275"/>
+            <p14:sldId id="276"/>
+            <p14:sldId id="277"/>
+            <p14:sldId id="278"/>
+            <p14:sldId id="279"/>
             <p14:sldId id="268"/>
             <p14:sldId id="270"/>
             <p14:sldId id="269"/>
             <p14:sldId id="274"/>
+            <p14:sldId id="280"/>
+            <p14:sldId id="281"/>
           </p14:sldIdLst>
         </p14:section>
       </p14:sectionLst>
@@ -6782,7 +6794,7 @@
           <a:p>
             <a:fld id="{32AF8DFE-3F9E-4E76-8DEB-FC1A7CECE63A}" type="datetimeFigureOut">
               <a:rPr lang="en-US" smtClean="0"/>
-              <a:t>4/5/2018</a:t>
+              <a:t>4/6/2018</a:t>
             </a:fld>
             <a:endParaRPr lang="en-US"/>
           </a:p>
@@ -7093,334 +7105,7 @@
           <a:bodyPr/>
           <a:lstStyle/>
           <a:p>
-            <a:pPr marL="171450" indent="-171450">
-              <a:buFont typeface="Arial" panose="020B0604020202020204" pitchFamily="34" charset="0"/>
-              <a:buChar char="•"/>
-            </a:pPr>
-            <a:r>
-              <a:rPr lang="pt-BR" dirty="0"/>
-              <a:t>Você está no centro de uma transformação</a:t>
-            </a:r>
-          </a:p>
-          <a:p>
-            <a:pPr marL="628650" lvl="1" indent="-171450">
-              <a:buFont typeface="Arial" panose="020B0604020202020204" pitchFamily="34" charset="0"/>
-              <a:buChar char="•"/>
-            </a:pPr>
-            <a:r>
-              <a:rPr lang="pt-BR" dirty="0"/>
-              <a:t>Mainframe </a:t>
-            </a:r>
-          </a:p>
-          <a:p>
-            <a:pPr marL="628650" lvl="1" indent="-171450">
-              <a:buFont typeface="Arial" panose="020B0604020202020204" pitchFamily="34" charset="0"/>
-              <a:buChar char="•"/>
-            </a:pPr>
-            <a:r>
-              <a:rPr lang="pt-BR" dirty="0"/>
-              <a:t>Client Server</a:t>
-            </a:r>
-          </a:p>
-          <a:p>
-            <a:pPr marL="628650" lvl="1" indent="-171450">
-              <a:buFont typeface="Arial" panose="020B0604020202020204" pitchFamily="34" charset="0"/>
-              <a:buChar char="•"/>
-            </a:pPr>
-            <a:r>
-              <a:rPr lang="pt-BR" dirty="0"/>
-              <a:t>SOA</a:t>
-            </a:r>
-          </a:p>
-          <a:p>
-            <a:pPr marL="628650" lvl="1" indent="-171450">
-              <a:buFont typeface="Arial" panose="020B0604020202020204" pitchFamily="34" charset="0"/>
-              <a:buChar char="•"/>
-            </a:pPr>
-            <a:r>
-              <a:rPr lang="pt-BR" dirty="0"/>
-              <a:t>Internet</a:t>
-            </a:r>
-            <a:endParaRPr lang="en-US" dirty="0"/>
-          </a:p>
-          <a:p>
-            <a:pPr marL="171450" indent="-171450">
-              <a:buFont typeface="Arial" panose="020B0604020202020204" pitchFamily="34" charset="0"/>
-              <a:buChar char="•"/>
-            </a:pPr>
-            <a:r>
-              <a:rPr lang="en-US" dirty="0"/>
-              <a:t>Software</a:t>
-            </a:r>
-          </a:p>
-          <a:p>
-            <a:pPr marL="171450" indent="-171450">
-              <a:buFont typeface="Arial" panose="020B0604020202020204" pitchFamily="34" charset="0"/>
-              <a:buChar char="•"/>
-            </a:pPr>
-            <a:r>
-              <a:rPr lang="en-US" dirty="0" err="1"/>
-              <a:t>Infraestrutura</a:t>
-            </a:r>
-            <a:endParaRPr lang="en-US" dirty="0"/>
-          </a:p>
-          <a:p>
-            <a:endParaRPr lang="pt-BR" dirty="0"/>
-          </a:p>
-          <a:p>
-            <a:pPr>
-              <a:lnSpc>
-                <a:spcPct val="115000"/>
-              </a:lnSpc>
-              <a:spcAft>
-                <a:spcPts val="1000"/>
-              </a:spcAft>
-            </a:pPr>
-            <a:r>
-              <a:rPr lang="en-US" b="1" dirty="0">
-                <a:solidFill>
-                  <a:srgbClr val="595959"/>
-                </a:solidFill>
-                <a:latin typeface="Segoe UI" panose="020B0502040204020203" pitchFamily="34" charset="0"/>
-                <a:ea typeface="Calibri" panose="020F0502020204030204" pitchFamily="34" charset="0"/>
-                <a:cs typeface="Times New Roman" panose="02020603050405020304" pitchFamily="18" charset="0"/>
-              </a:rPr>
-              <a:t>Objective:</a:t>
-            </a:r>
-            <a:r>
-              <a:rPr lang="en-US" dirty="0">
-                <a:solidFill>
-                  <a:srgbClr val="595959"/>
-                </a:solidFill>
-                <a:latin typeface="Segoe UI" panose="020B0502040204020203" pitchFamily="34" charset="0"/>
-                <a:ea typeface="Calibri" panose="020F0502020204030204" pitchFamily="34" charset="0"/>
-                <a:cs typeface="Times New Roman" panose="02020603050405020304" pitchFamily="18" charset="0"/>
-              </a:rPr>
-              <a:t> Use this to start telling your opening story about trends… </a:t>
-            </a:r>
-          </a:p>
-          <a:p>
-            <a:pPr marL="342900" marR="0" lvl="0" indent="-342900">
-              <a:lnSpc>
-                <a:spcPct val="115000"/>
-              </a:lnSpc>
-              <a:spcBef>
-                <a:spcPts val="0"/>
-              </a:spcBef>
-              <a:spcAft>
-                <a:spcPts val="0"/>
-              </a:spcAft>
-              <a:buFont typeface="Symbol" panose="05050102010706020507" pitchFamily="18" charset="2"/>
-              <a:buChar char=""/>
-            </a:pPr>
-            <a:r>
-              <a:rPr lang="en-US" sz="1200" dirty="0">
-                <a:solidFill>
-                  <a:srgbClr val="595959"/>
-                </a:solidFill>
-                <a:latin typeface="Segoe UI" panose="020B0502040204020203" pitchFamily="34" charset="0"/>
-                <a:ea typeface="Calibri" panose="020F0502020204030204" pitchFamily="34" charset="0"/>
-                <a:cs typeface="Times New Roman" panose="02020603050405020304" pitchFamily="18" charset="0"/>
-              </a:rPr>
-              <a:t>You are in the center of one of the largest IT transformations this </a:t>
-            </a:r>
-            <a:br>
-              <a:rPr lang="en-US" sz="1200" dirty="0">
-                <a:solidFill>
-                  <a:srgbClr val="595959"/>
-                </a:solidFill>
-                <a:latin typeface="Segoe UI" panose="020B0502040204020203" pitchFamily="34" charset="0"/>
-                <a:ea typeface="Calibri" panose="020F0502020204030204" pitchFamily="34" charset="0"/>
-                <a:cs typeface="Times New Roman" panose="02020603050405020304" pitchFamily="18" charset="0"/>
-              </a:rPr>
-            </a:br>
-            <a:r>
-              <a:rPr lang="en-US" sz="1200" dirty="0">
-                <a:solidFill>
-                  <a:srgbClr val="595959"/>
-                </a:solidFill>
-                <a:latin typeface="Segoe UI" panose="020B0502040204020203" pitchFamily="34" charset="0"/>
-                <a:ea typeface="Calibri" panose="020F0502020204030204" pitchFamily="34" charset="0"/>
-                <a:cs typeface="Times New Roman" panose="02020603050405020304" pitchFamily="18" charset="0"/>
-              </a:rPr>
-              <a:t>industry has ever seen. There have been other transformations, such as the move from mainframe to client-server, the move to the Internet, and so forth.  However, this is one of the most significant transformations that our industry has ever been through.  </a:t>
-            </a:r>
-            <a:endParaRPr lang="en-US" sz="1800" dirty="0">
-              <a:latin typeface="Calibri" panose="020F0502020204030204" pitchFamily="34" charset="0"/>
-              <a:ea typeface="Calibri" panose="020F0502020204030204" pitchFamily="34" charset="0"/>
-              <a:cs typeface="Times New Roman" panose="02020603050405020304" pitchFamily="18" charset="0"/>
-            </a:endParaRPr>
-          </a:p>
-          <a:p>
-            <a:pPr marL="342900" marR="0" lvl="0" indent="-342900">
-              <a:lnSpc>
-                <a:spcPct val="115000"/>
-              </a:lnSpc>
-              <a:spcBef>
-                <a:spcPts val="0"/>
-              </a:spcBef>
-              <a:spcAft>
-                <a:spcPts val="0"/>
-              </a:spcAft>
-              <a:buFont typeface="Symbol" panose="05050102010706020507" pitchFamily="18" charset="2"/>
-              <a:buChar char=""/>
-            </a:pPr>
-            <a:r>
-              <a:rPr lang="en-US" sz="1200" dirty="0">
-                <a:solidFill>
-                  <a:srgbClr val="595959"/>
-                </a:solidFill>
-                <a:latin typeface="Segoe UI" panose="020B0502040204020203" pitchFamily="34" charset="0"/>
-                <a:ea typeface="Calibri" panose="020F0502020204030204" pitchFamily="34" charset="0"/>
-                <a:cs typeface="Times New Roman" panose="02020603050405020304" pitchFamily="18" charset="0"/>
-              </a:rPr>
-              <a:t>And like many transformations, it can be disruptive to business models, it can be disruptive to organizations, the way that the status quo has been delivered.  We’re going to talk about how this transformation can help set our customers apart in this world of devices and continuous cloud services.</a:t>
-            </a:r>
-            <a:endParaRPr lang="en-US" sz="1800" dirty="0">
-              <a:latin typeface="Calibri" panose="020F0502020204030204" pitchFamily="34" charset="0"/>
-              <a:ea typeface="Calibri" panose="020F0502020204030204" pitchFamily="34" charset="0"/>
-              <a:cs typeface="Times New Roman" panose="02020603050405020304" pitchFamily="18" charset="0"/>
-            </a:endParaRPr>
-          </a:p>
-          <a:p>
-            <a:pPr marL="342900" indent="-342900">
-              <a:lnSpc>
-                <a:spcPct val="115000"/>
-              </a:lnSpc>
-              <a:spcAft>
-                <a:spcPts val="1000"/>
-              </a:spcAft>
-              <a:buFont typeface="Symbol" panose="05050102010706020507" pitchFamily="18" charset="2"/>
-              <a:buChar char=""/>
-            </a:pPr>
-            <a:r>
-              <a:rPr lang="en-US" sz="1200" dirty="0">
-                <a:solidFill>
-                  <a:srgbClr val="595959"/>
-                </a:solidFill>
-                <a:latin typeface="Segoe UI" panose="020B0502040204020203" pitchFamily="34" charset="0"/>
-                <a:ea typeface="Calibri" panose="020F0502020204030204" pitchFamily="34" charset="0"/>
-                <a:cs typeface="Times New Roman" panose="02020603050405020304" pitchFamily="18" charset="0"/>
-              </a:rPr>
-              <a:t>We find that organizations who embrace transformations in the industry are better differentiated once we come out the other side.  That's also true for IT professionals, developers and decision-makers. </a:t>
-            </a:r>
-          </a:p>
-          <a:p>
-            <a:pPr marL="342900" indent="-342900">
-              <a:lnSpc>
-                <a:spcPct val="115000"/>
-              </a:lnSpc>
-              <a:buFont typeface="Symbol" panose="05050102010706020507" pitchFamily="18" charset="2"/>
-              <a:buChar char=""/>
-            </a:pPr>
-            <a:r>
-              <a:rPr lang="en-US" sz="1200" dirty="0">
-                <a:solidFill>
-                  <a:srgbClr val="595959"/>
-                </a:solidFill>
-                <a:latin typeface="Segoe UI" panose="020B0502040204020203" pitchFamily="34" charset="0"/>
-                <a:ea typeface="Calibri" panose="020F0502020204030204" pitchFamily="34" charset="0"/>
-                <a:cs typeface="Times New Roman" panose="02020603050405020304" pitchFamily="18" charset="0"/>
-              </a:rPr>
-              <a:t>Those people who invest time in helping their organizations change more rapidly through these significant changes are more apt to come out the other side with better skills and be more marketable, not just within their own organizations, but throughout the industry.  So this transformation really is putting people at the center, and is what our strategy is all about.</a:t>
-            </a:r>
-          </a:p>
-          <a:p>
-            <a:pPr marL="342900" indent="-342900">
-              <a:lnSpc>
-                <a:spcPct val="115000"/>
-              </a:lnSpc>
-              <a:buFont typeface="Symbol" panose="05050102010706020507" pitchFamily="18" charset="2"/>
-              <a:buChar char=""/>
-            </a:pPr>
-            <a:endParaRPr lang="pt-BR" sz="1200" dirty="0">
-              <a:solidFill>
-                <a:srgbClr val="595959"/>
-              </a:solidFill>
-              <a:latin typeface="Segoe UI" panose="020B0502040204020203" pitchFamily="34" charset="0"/>
-              <a:ea typeface="Calibri" panose="020F0502020204030204" pitchFamily="34" charset="0"/>
-              <a:cs typeface="Times New Roman" panose="02020603050405020304" pitchFamily="18" charset="0"/>
-            </a:endParaRPr>
-          </a:p>
-          <a:p>
-            <a:pPr>
-              <a:spcBef>
-                <a:spcPts val="1200"/>
-              </a:spcBef>
-            </a:pPr>
-            <a:r>
-              <a:rPr lang="en-US" sz="1200" dirty="0">
-                <a:solidFill>
-                  <a:schemeClr val="tx1"/>
-                </a:solidFill>
-              </a:rPr>
-              <a:t>You are in the center of one of the largest IT transformations that this </a:t>
-            </a:r>
-            <a:br>
-              <a:rPr lang="en-US" sz="1200" dirty="0">
-                <a:solidFill>
-                  <a:schemeClr val="tx1"/>
-                </a:solidFill>
-              </a:rPr>
-            </a:br>
-            <a:r>
-              <a:rPr lang="en-US" sz="1200" dirty="0">
-                <a:solidFill>
-                  <a:schemeClr val="tx1"/>
-                </a:solidFill>
-              </a:rPr>
-              <a:t>industry has ever seen. There have been other transformations, such as the move from mainframe to client-server, the move to the Internet, &amp; so forth.  However, this is one of the most significant transformations that our industry has ever been through.  And like many transformations, it can be disruptive to business models, it can be disruptive to organizations, the way that the status quo has been delivered.  And so we want to talk about how this transformation can help set our customers apart in this world of devices &amp; continuous cloud services.</a:t>
-            </a:r>
-          </a:p>
-          <a:p>
-            <a:pPr>
-              <a:spcBef>
-                <a:spcPts val="1200"/>
-              </a:spcBef>
-            </a:pPr>
-            <a:r>
-              <a:rPr lang="en-US" sz="1200" dirty="0">
-                <a:solidFill>
-                  <a:schemeClr val="tx1"/>
-                </a:solidFill>
-              </a:rPr>
-              <a:t>We find that organizations who embrace industry transformations are better differentiated once we come out the other side.  That's also true for IT professionals, developers &amp; decision-makers. </a:t>
-            </a:r>
-          </a:p>
-          <a:p>
-            <a:pPr>
-              <a:spcBef>
-                <a:spcPts val="1200"/>
-              </a:spcBef>
-            </a:pPr>
-            <a:r>
-              <a:rPr lang="en-US" sz="1200" dirty="0">
-                <a:solidFill>
-                  <a:schemeClr val="tx1"/>
-                </a:solidFill>
-              </a:rPr>
-              <a:t>Those people who invest time in helping their organizations change more rapidly through these significant changes are more apt to come out the other side with better skills &amp; be more marketable, not just within their own organizations, but throughout the industry.  So this transformation really is putting people at the center, and is what our strategy is all about.</a:t>
-            </a:r>
-          </a:p>
-          <a:p>
-            <a:pPr marL="342900" indent="-342900">
-              <a:lnSpc>
-                <a:spcPct val="115000"/>
-              </a:lnSpc>
-              <a:buFont typeface="Symbol" panose="05050102010706020507" pitchFamily="18" charset="2"/>
-              <a:buChar char=""/>
-            </a:pPr>
-            <a:endParaRPr lang="en-US" sz="1200" dirty="0">
-              <a:solidFill>
-                <a:srgbClr val="595959"/>
-              </a:solidFill>
-              <a:latin typeface="Segoe UI" panose="020B0502040204020203" pitchFamily="34" charset="0"/>
-              <a:ea typeface="Calibri" panose="020F0502020204030204" pitchFamily="34" charset="0"/>
-              <a:cs typeface="Times New Roman" panose="02020603050405020304" pitchFamily="18" charset="0"/>
-            </a:endParaRPr>
-          </a:p>
-          <a:p>
-            <a:endParaRPr lang="en-US" dirty="0"/>
+            <a:endParaRPr lang="en-US"/>
           </a:p>
         </p:txBody>
       </p:sp>
@@ -7441,7 +7126,7 @@
           <a:p>
             <a:fld id="{4756E05C-73BB-43D9-896B-48213213129E}" type="slidenum">
               <a:rPr lang="en-US" smtClean="0"/>
-              <a:t>4</a:t>
+              <a:t>1</a:t>
             </a:fld>
             <a:endParaRPr lang="en-US"/>
           </a:p>
@@ -7450,7 +7135,7 @@
     </p:spTree>
     <p:extLst>
       <p:ext uri="{BB962C8B-B14F-4D97-AF65-F5344CB8AC3E}">
-        <p14:creationId xmlns:p14="http://schemas.microsoft.com/office/powerpoint/2010/main" val="589606738"/>
+        <p14:creationId xmlns:p14="http://schemas.microsoft.com/office/powerpoint/2010/main" val="3631664340"/>
       </p:ext>
     </p:extLst>
   </p:cSld>
@@ -7525,7 +7210,7 @@
           <a:p>
             <a:fld id="{4756E05C-73BB-43D9-896B-48213213129E}" type="slidenum">
               <a:rPr lang="en-US" smtClean="0"/>
-              <a:t>6</a:t>
+              <a:t>4</a:t>
             </a:fld>
             <a:endParaRPr lang="en-US"/>
           </a:p>
@@ -7588,6 +7273,417 @@
           <a:bodyPr/>
           <a:lstStyle/>
           <a:p>
+            <a:pPr marL="171450" indent="-171450">
+              <a:buFont typeface="Arial" panose="020B0604020202020204" pitchFamily="34" charset="0"/>
+              <a:buChar char="•"/>
+            </a:pPr>
+            <a:r>
+              <a:rPr lang="pt-BR" dirty="0"/>
+              <a:t>Você está no centro de uma transformação</a:t>
+            </a:r>
+          </a:p>
+          <a:p>
+            <a:pPr marL="628650" lvl="1" indent="-171450">
+              <a:buFont typeface="Arial" panose="020B0604020202020204" pitchFamily="34" charset="0"/>
+              <a:buChar char="•"/>
+            </a:pPr>
+            <a:r>
+              <a:rPr lang="pt-BR" dirty="0"/>
+              <a:t>Mainframe </a:t>
+            </a:r>
+          </a:p>
+          <a:p>
+            <a:pPr marL="628650" lvl="1" indent="-171450">
+              <a:buFont typeface="Arial" panose="020B0604020202020204" pitchFamily="34" charset="0"/>
+              <a:buChar char="•"/>
+            </a:pPr>
+            <a:r>
+              <a:rPr lang="pt-BR" dirty="0"/>
+              <a:t>Client Server</a:t>
+            </a:r>
+          </a:p>
+          <a:p>
+            <a:pPr marL="628650" lvl="1" indent="-171450">
+              <a:buFont typeface="Arial" panose="020B0604020202020204" pitchFamily="34" charset="0"/>
+              <a:buChar char="•"/>
+            </a:pPr>
+            <a:r>
+              <a:rPr lang="pt-BR" dirty="0"/>
+              <a:t>SOA</a:t>
+            </a:r>
+          </a:p>
+          <a:p>
+            <a:pPr marL="628650" lvl="1" indent="-171450">
+              <a:buFont typeface="Arial" panose="020B0604020202020204" pitchFamily="34" charset="0"/>
+              <a:buChar char="•"/>
+            </a:pPr>
+            <a:r>
+              <a:rPr lang="pt-BR" dirty="0"/>
+              <a:t>Internet</a:t>
+            </a:r>
+            <a:endParaRPr lang="en-US" dirty="0"/>
+          </a:p>
+          <a:p>
+            <a:pPr marL="171450" indent="-171450">
+              <a:buFont typeface="Arial" panose="020B0604020202020204" pitchFamily="34" charset="0"/>
+              <a:buChar char="•"/>
+            </a:pPr>
+            <a:r>
+              <a:rPr lang="en-US" dirty="0"/>
+              <a:t>Software</a:t>
+            </a:r>
+          </a:p>
+          <a:p>
+            <a:pPr marL="171450" indent="-171450">
+              <a:buFont typeface="Arial" panose="020B0604020202020204" pitchFamily="34" charset="0"/>
+              <a:buChar char="•"/>
+            </a:pPr>
+            <a:r>
+              <a:rPr lang="en-US" dirty="0" err="1"/>
+              <a:t>Infraestrutura</a:t>
+            </a:r>
+            <a:endParaRPr lang="en-US" dirty="0"/>
+          </a:p>
+          <a:p>
+            <a:endParaRPr lang="pt-BR" dirty="0"/>
+          </a:p>
+          <a:p>
+            <a:pPr>
+              <a:lnSpc>
+                <a:spcPct val="115000"/>
+              </a:lnSpc>
+              <a:spcAft>
+                <a:spcPts val="1000"/>
+              </a:spcAft>
+            </a:pPr>
+            <a:r>
+              <a:rPr lang="en-US" b="1" dirty="0">
+                <a:solidFill>
+                  <a:srgbClr val="595959"/>
+                </a:solidFill>
+                <a:latin typeface="Segoe UI" panose="020B0502040204020203" pitchFamily="34" charset="0"/>
+                <a:ea typeface="Calibri" panose="020F0502020204030204" pitchFamily="34" charset="0"/>
+                <a:cs typeface="Times New Roman" panose="02020603050405020304" pitchFamily="18" charset="0"/>
+              </a:rPr>
+              <a:t>Objective:</a:t>
+            </a:r>
+            <a:r>
+              <a:rPr lang="en-US" dirty="0">
+                <a:solidFill>
+                  <a:srgbClr val="595959"/>
+                </a:solidFill>
+                <a:latin typeface="Segoe UI" panose="020B0502040204020203" pitchFamily="34" charset="0"/>
+                <a:ea typeface="Calibri" panose="020F0502020204030204" pitchFamily="34" charset="0"/>
+                <a:cs typeface="Times New Roman" panose="02020603050405020304" pitchFamily="18" charset="0"/>
+              </a:rPr>
+              <a:t> Use this to start telling your opening story about trends… </a:t>
+            </a:r>
+          </a:p>
+          <a:p>
+            <a:pPr marL="342900" marR="0" lvl="0" indent="-342900">
+              <a:lnSpc>
+                <a:spcPct val="115000"/>
+              </a:lnSpc>
+              <a:spcBef>
+                <a:spcPts val="0"/>
+              </a:spcBef>
+              <a:spcAft>
+                <a:spcPts val="0"/>
+              </a:spcAft>
+              <a:buFont typeface="Symbol" panose="05050102010706020507" pitchFamily="18" charset="2"/>
+              <a:buChar char=""/>
+            </a:pPr>
+            <a:r>
+              <a:rPr lang="en-US" sz="1200" dirty="0">
+                <a:solidFill>
+                  <a:srgbClr val="595959"/>
+                </a:solidFill>
+                <a:latin typeface="Segoe UI" panose="020B0502040204020203" pitchFamily="34" charset="0"/>
+                <a:ea typeface="Calibri" panose="020F0502020204030204" pitchFamily="34" charset="0"/>
+                <a:cs typeface="Times New Roman" panose="02020603050405020304" pitchFamily="18" charset="0"/>
+              </a:rPr>
+              <a:t>You are in the center of one of the largest IT transformations this </a:t>
+            </a:r>
+            <a:br>
+              <a:rPr lang="en-US" sz="1200" dirty="0">
+                <a:solidFill>
+                  <a:srgbClr val="595959"/>
+                </a:solidFill>
+                <a:latin typeface="Segoe UI" panose="020B0502040204020203" pitchFamily="34" charset="0"/>
+                <a:ea typeface="Calibri" panose="020F0502020204030204" pitchFamily="34" charset="0"/>
+                <a:cs typeface="Times New Roman" panose="02020603050405020304" pitchFamily="18" charset="0"/>
+              </a:rPr>
+            </a:br>
+            <a:r>
+              <a:rPr lang="en-US" sz="1200" dirty="0">
+                <a:solidFill>
+                  <a:srgbClr val="595959"/>
+                </a:solidFill>
+                <a:latin typeface="Segoe UI" panose="020B0502040204020203" pitchFamily="34" charset="0"/>
+                <a:ea typeface="Calibri" panose="020F0502020204030204" pitchFamily="34" charset="0"/>
+                <a:cs typeface="Times New Roman" panose="02020603050405020304" pitchFamily="18" charset="0"/>
+              </a:rPr>
+              <a:t>industry has ever seen. There have been other transformations, such as the move from mainframe to client-server, the move to the Internet, and so forth.  However, this is one of the most significant transformations that our industry has ever been through.  </a:t>
+            </a:r>
+            <a:endParaRPr lang="en-US" sz="1800" dirty="0">
+              <a:latin typeface="Calibri" panose="020F0502020204030204" pitchFamily="34" charset="0"/>
+              <a:ea typeface="Calibri" panose="020F0502020204030204" pitchFamily="34" charset="0"/>
+              <a:cs typeface="Times New Roman" panose="02020603050405020304" pitchFamily="18" charset="0"/>
+            </a:endParaRPr>
+          </a:p>
+          <a:p>
+            <a:pPr marL="342900" marR="0" lvl="0" indent="-342900">
+              <a:lnSpc>
+                <a:spcPct val="115000"/>
+              </a:lnSpc>
+              <a:spcBef>
+                <a:spcPts val="0"/>
+              </a:spcBef>
+              <a:spcAft>
+                <a:spcPts val="0"/>
+              </a:spcAft>
+              <a:buFont typeface="Symbol" panose="05050102010706020507" pitchFamily="18" charset="2"/>
+              <a:buChar char=""/>
+            </a:pPr>
+            <a:r>
+              <a:rPr lang="en-US" sz="1200" dirty="0">
+                <a:solidFill>
+                  <a:srgbClr val="595959"/>
+                </a:solidFill>
+                <a:latin typeface="Segoe UI" panose="020B0502040204020203" pitchFamily="34" charset="0"/>
+                <a:ea typeface="Calibri" panose="020F0502020204030204" pitchFamily="34" charset="0"/>
+                <a:cs typeface="Times New Roman" panose="02020603050405020304" pitchFamily="18" charset="0"/>
+              </a:rPr>
+              <a:t>And like many transformations, it can be disruptive to business models, it can be disruptive to organizations, the way that the status quo has been delivered.  We’re going to talk about how this transformation can help set our customers apart in this world of devices and continuous cloud services.</a:t>
+            </a:r>
+            <a:endParaRPr lang="en-US" sz="1800" dirty="0">
+              <a:latin typeface="Calibri" panose="020F0502020204030204" pitchFamily="34" charset="0"/>
+              <a:ea typeface="Calibri" panose="020F0502020204030204" pitchFamily="34" charset="0"/>
+              <a:cs typeface="Times New Roman" panose="02020603050405020304" pitchFamily="18" charset="0"/>
+            </a:endParaRPr>
+          </a:p>
+          <a:p>
+            <a:pPr marL="342900" indent="-342900">
+              <a:lnSpc>
+                <a:spcPct val="115000"/>
+              </a:lnSpc>
+              <a:spcAft>
+                <a:spcPts val="1000"/>
+              </a:spcAft>
+              <a:buFont typeface="Symbol" panose="05050102010706020507" pitchFamily="18" charset="2"/>
+              <a:buChar char=""/>
+            </a:pPr>
+            <a:r>
+              <a:rPr lang="en-US" sz="1200" dirty="0">
+                <a:solidFill>
+                  <a:srgbClr val="595959"/>
+                </a:solidFill>
+                <a:latin typeface="Segoe UI" panose="020B0502040204020203" pitchFamily="34" charset="0"/>
+                <a:ea typeface="Calibri" panose="020F0502020204030204" pitchFamily="34" charset="0"/>
+                <a:cs typeface="Times New Roman" panose="02020603050405020304" pitchFamily="18" charset="0"/>
+              </a:rPr>
+              <a:t>We find that organizations who embrace transformations in the industry are better differentiated once we come out the other side.  That's also true for IT professionals, developers and decision-makers. </a:t>
+            </a:r>
+          </a:p>
+          <a:p>
+            <a:pPr marL="342900" indent="-342900">
+              <a:lnSpc>
+                <a:spcPct val="115000"/>
+              </a:lnSpc>
+              <a:buFont typeface="Symbol" panose="05050102010706020507" pitchFamily="18" charset="2"/>
+              <a:buChar char=""/>
+            </a:pPr>
+            <a:r>
+              <a:rPr lang="en-US" sz="1200" dirty="0">
+                <a:solidFill>
+                  <a:srgbClr val="595959"/>
+                </a:solidFill>
+                <a:latin typeface="Segoe UI" panose="020B0502040204020203" pitchFamily="34" charset="0"/>
+                <a:ea typeface="Calibri" panose="020F0502020204030204" pitchFamily="34" charset="0"/>
+                <a:cs typeface="Times New Roman" panose="02020603050405020304" pitchFamily="18" charset="0"/>
+              </a:rPr>
+              <a:t>Those people who invest time in helping their organizations change more rapidly through these significant changes are more apt to come out the other side with better skills and be more marketable, not just within their own organizations, but throughout the industry.  So this transformation really is putting people at the center, and is what our strategy is all about.</a:t>
+            </a:r>
+          </a:p>
+          <a:p>
+            <a:pPr marL="342900" indent="-342900">
+              <a:lnSpc>
+                <a:spcPct val="115000"/>
+              </a:lnSpc>
+              <a:buFont typeface="Symbol" panose="05050102010706020507" pitchFamily="18" charset="2"/>
+              <a:buChar char=""/>
+            </a:pPr>
+            <a:endParaRPr lang="pt-BR" sz="1200" dirty="0">
+              <a:solidFill>
+                <a:srgbClr val="595959"/>
+              </a:solidFill>
+              <a:latin typeface="Segoe UI" panose="020B0502040204020203" pitchFamily="34" charset="0"/>
+              <a:ea typeface="Calibri" panose="020F0502020204030204" pitchFamily="34" charset="0"/>
+              <a:cs typeface="Times New Roman" panose="02020603050405020304" pitchFamily="18" charset="0"/>
+            </a:endParaRPr>
+          </a:p>
+          <a:p>
+            <a:pPr>
+              <a:spcBef>
+                <a:spcPts val="1200"/>
+              </a:spcBef>
+            </a:pPr>
+            <a:r>
+              <a:rPr lang="en-US" sz="1200" dirty="0">
+                <a:solidFill>
+                  <a:schemeClr val="tx1"/>
+                </a:solidFill>
+              </a:rPr>
+              <a:t>You are in the center of one of the largest IT transformations that this </a:t>
+            </a:r>
+            <a:br>
+              <a:rPr lang="en-US" sz="1200" dirty="0">
+                <a:solidFill>
+                  <a:schemeClr val="tx1"/>
+                </a:solidFill>
+              </a:rPr>
+            </a:br>
+            <a:r>
+              <a:rPr lang="en-US" sz="1200" dirty="0">
+                <a:solidFill>
+                  <a:schemeClr val="tx1"/>
+                </a:solidFill>
+              </a:rPr>
+              <a:t>industry has ever seen. There have been other transformations, such as the move from mainframe to client-server, the move to the Internet, &amp; so forth.  However, this is one of the most significant transformations that our industry has ever been through.  And like many transformations, it can be disruptive to business models, it can be disruptive to organizations, the way that the status quo has been delivered.  And so we want to talk about how this transformation can help set our customers apart in this world of devices &amp; continuous cloud services.</a:t>
+            </a:r>
+          </a:p>
+          <a:p>
+            <a:pPr>
+              <a:spcBef>
+                <a:spcPts val="1200"/>
+              </a:spcBef>
+            </a:pPr>
+            <a:r>
+              <a:rPr lang="en-US" sz="1200" dirty="0">
+                <a:solidFill>
+                  <a:schemeClr val="tx1"/>
+                </a:solidFill>
+              </a:rPr>
+              <a:t>We find that organizations who embrace industry transformations are better differentiated once we come out the other side.  That's also true for IT professionals, developers &amp; decision-makers. </a:t>
+            </a:r>
+          </a:p>
+          <a:p>
+            <a:pPr>
+              <a:spcBef>
+                <a:spcPts val="1200"/>
+              </a:spcBef>
+            </a:pPr>
+            <a:r>
+              <a:rPr lang="en-US" sz="1200" dirty="0">
+                <a:solidFill>
+                  <a:schemeClr val="tx1"/>
+                </a:solidFill>
+              </a:rPr>
+              <a:t>Those people who invest time in helping their organizations change more rapidly through these significant changes are more apt to come out the other side with better skills &amp; be more marketable, not just within their own organizations, but throughout the industry.  So this transformation really is putting people at the center, and is what our strategy is all about.</a:t>
+            </a:r>
+          </a:p>
+          <a:p>
+            <a:pPr marL="342900" indent="-342900">
+              <a:lnSpc>
+                <a:spcPct val="115000"/>
+              </a:lnSpc>
+              <a:buFont typeface="Symbol" panose="05050102010706020507" pitchFamily="18" charset="2"/>
+              <a:buChar char=""/>
+            </a:pPr>
+            <a:endParaRPr lang="en-US" sz="1200" dirty="0">
+              <a:solidFill>
+                <a:srgbClr val="595959"/>
+              </a:solidFill>
+              <a:latin typeface="Segoe UI" panose="020B0502040204020203" pitchFamily="34" charset="0"/>
+              <a:ea typeface="Calibri" panose="020F0502020204030204" pitchFamily="34" charset="0"/>
+              <a:cs typeface="Times New Roman" panose="02020603050405020304" pitchFamily="18" charset="0"/>
+            </a:endParaRPr>
+          </a:p>
+          <a:p>
+            <a:endParaRPr lang="en-US" dirty="0"/>
+          </a:p>
+        </p:txBody>
+      </p:sp>
+      <p:sp>
+        <p:nvSpPr>
+          <p:cNvPr id="4" name="Slide Number Placeholder 3"/>
+          <p:cNvSpPr>
+            <a:spLocks noGrp="1"/>
+          </p:cNvSpPr>
+          <p:nvPr>
+            <p:ph type="sldNum" sz="quarter" idx="10"/>
+          </p:nvPr>
+        </p:nvSpPr>
+        <p:spPr/>
+        <p:txBody>
+          <a:bodyPr/>
+          <a:lstStyle/>
+          <a:p>
+            <a:fld id="{4756E05C-73BB-43D9-896B-48213213129E}" type="slidenum">
+              <a:rPr lang="en-US" smtClean="0"/>
+              <a:t>5</a:t>
+            </a:fld>
+            <a:endParaRPr lang="en-US"/>
+          </a:p>
+        </p:txBody>
+      </p:sp>
+    </p:spTree>
+    <p:extLst>
+      <p:ext uri="{BB962C8B-B14F-4D97-AF65-F5344CB8AC3E}">
+        <p14:creationId xmlns:p14="http://schemas.microsoft.com/office/powerpoint/2010/main" val="589606738"/>
+      </p:ext>
+    </p:extLst>
+  </p:cSld>
+  <p:clrMapOvr>
+    <a:masterClrMapping/>
+  </p:clrMapOvr>
+</p:notes>
+</file>
+
+<file path=ppt/notesSlides/notesSlide4.xml><?xml version="1.0" encoding="utf-8"?>
+<p:notes xmlns:a="http://schemas.openxmlformats.org/drawingml/2006/main" xmlns:r="http://schemas.openxmlformats.org/officeDocument/2006/relationships" xmlns:p="http://schemas.openxmlformats.org/presentationml/2006/main">
+  <p:cSld>
+    <p:spTree>
+      <p:nvGrpSpPr>
+        <p:cNvPr id="1" name=""/>
+        <p:cNvGrpSpPr/>
+        <p:nvPr/>
+      </p:nvGrpSpPr>
+      <p:grpSpPr>
+        <a:xfrm>
+          <a:off x="0" y="0"/>
+          <a:ext cx="0" cy="0"/>
+          <a:chOff x="0" y="0"/>
+          <a:chExt cx="0" cy="0"/>
+        </a:xfrm>
+      </p:grpSpPr>
+      <p:sp>
+        <p:nvSpPr>
+          <p:cNvPr id="2" name="Slide Image Placeholder 1"/>
+          <p:cNvSpPr>
+            <a:spLocks noGrp="1" noRot="1" noChangeAspect="1"/>
+          </p:cNvSpPr>
+          <p:nvPr>
+            <p:ph type="sldImg"/>
+          </p:nvPr>
+        </p:nvSpPr>
+        <p:spPr/>
+      </p:sp>
+      <p:sp>
+        <p:nvSpPr>
+          <p:cNvPr id="3" name="Notes Placeholder 2"/>
+          <p:cNvSpPr>
+            <a:spLocks noGrp="1"/>
+          </p:cNvSpPr>
+          <p:nvPr>
+            <p:ph type="body" idx="1"/>
+          </p:nvPr>
+        </p:nvSpPr>
+        <p:spPr/>
+        <p:txBody>
+          <a:bodyPr/>
+          <a:lstStyle/>
+          <a:p>
             <a:endParaRPr lang="en-US" dirty="0"/>
           </a:p>
         </p:txBody>
@@ -7653,7 +7749,7 @@
                 <a:tabLst/>
                 <a:defRPr/>
               </a:pPr>
-              <a:t>14</a:t>
+              <a:t>18</a:t>
             </a:fld>
             <a:endParaRPr kumimoji="0" lang="en-US" sz="1800" b="0" i="0" u="none" strike="noStrike" kern="0" cap="none" spc="0" normalizeH="0" baseline="0" noProof="0" dirty="0">
               <a:ln>
@@ -11617,41 +11713,41 @@
           <a:lstStyle/>
           <a:p>
             <a:r>
-              <a:rPr lang="pt-BR" dirty="0"/>
+              <a:rPr lang="pt-BR" b="1" dirty="0"/>
               <a:t>Evilázaro Alves</a:t>
             </a:r>
           </a:p>
           <a:p>
             <a:r>
-              <a:rPr lang="pt-BR" dirty="0"/>
+              <a:rPr lang="pt-BR" b="1" dirty="0"/>
               <a:t>Cloud Solution Architect | Microsoft Regional Director | Microsoft Azure MVP</a:t>
             </a:r>
           </a:p>
           <a:p>
             <a:r>
-              <a:rPr lang="pt-BR" dirty="0">
-                <a:hlinkClick r:id="rId2"/>
+              <a:rPr lang="pt-BR" b="1" dirty="0">
+                <a:hlinkClick r:id="rId3"/>
               </a:rPr>
               <a:t>www.evilazaro.com.br</a:t>
             </a:r>
-            <a:endParaRPr lang="pt-BR" dirty="0"/>
-          </a:p>
-          <a:p>
-            <a:r>
-              <a:rPr lang="pt-BR" dirty="0"/>
+            <a:endParaRPr lang="pt-BR" b="1" dirty="0"/>
+          </a:p>
+          <a:p>
+            <a:r>
+              <a:rPr lang="pt-BR" b="1" dirty="0"/>
               <a:t>evilazaro@gmail.com</a:t>
             </a:r>
           </a:p>
           <a:p>
             <a:r>
-              <a:rPr lang="pt-BR" dirty="0"/>
+              <a:rPr lang="pt-BR" b="1" dirty="0"/>
               <a:t>@</a:t>
             </a:r>
             <a:r>
-              <a:rPr lang="pt-BR" dirty="0" err="1"/>
+              <a:rPr lang="pt-BR" b="1" dirty="0" err="1"/>
               <a:t>evilazaro</a:t>
             </a:r>
-            <a:endParaRPr lang="en-US" dirty="0"/>
+            <a:endParaRPr lang="en-US" b="1" dirty="0"/>
           </a:p>
         </p:txBody>
       </p:sp>
@@ -11711,7 +11807,7 @@
           <p:nvPr/>
         </p:nvPicPr>
         <p:blipFill>
-          <a:blip r:embed="rId3">
+          <a:blip r:embed="rId4">
             <a:biLevel thresh="25000"/>
             <a:extLst>
               <a:ext uri="{28A0092B-C50C-407E-A947-70E740481C1C}">
@@ -11765,113 +11861,6 @@
       </p:grpSpPr>
       <p:sp>
         <p:nvSpPr>
-          <p:cNvPr id="4" name="Title 3">
-            <a:extLst>
-              <a:ext uri="{FF2B5EF4-FFF2-40B4-BE49-F238E27FC236}">
-                <a16:creationId xmlns:a16="http://schemas.microsoft.com/office/drawing/2014/main" id="{8E3FEC22-483E-474D-B11B-331B7FBA5D77}"/>
-              </a:ext>
-            </a:extLst>
-          </p:cNvPr>
-          <p:cNvSpPr>
-            <a:spLocks noGrp="1"/>
-          </p:cNvSpPr>
-          <p:nvPr>
-            <p:ph type="title"/>
-          </p:nvPr>
-        </p:nvSpPr>
-        <p:spPr/>
-        <p:txBody>
-          <a:bodyPr/>
-          <a:lstStyle/>
-          <a:p>
-            <a:r>
-              <a:rPr lang="en-US" dirty="0"/>
-              <a:t>O que é </a:t>
-            </a:r>
-            <a:r>
-              <a:rPr lang="en-US" dirty="0" err="1"/>
-              <a:t>Computação</a:t>
-            </a:r>
-            <a:r>
-              <a:rPr lang="en-US" dirty="0"/>
-              <a:t> </a:t>
-            </a:r>
-            <a:r>
-              <a:rPr lang="en-US" dirty="0" err="1"/>
-              <a:t>em</a:t>
-            </a:r>
-            <a:r>
-              <a:rPr lang="en-US" dirty="0"/>
-              <a:t> </a:t>
-            </a:r>
-            <a:r>
-              <a:rPr lang="en-US" dirty="0" err="1"/>
-              <a:t>Nuvem</a:t>
-            </a:r>
-            <a:endParaRPr lang="en-US" dirty="0"/>
-          </a:p>
-        </p:txBody>
-      </p:sp>
-      <p:sp>
-        <p:nvSpPr>
-          <p:cNvPr id="5" name="Content Placeholder 4">
-            <a:extLst>
-              <a:ext uri="{FF2B5EF4-FFF2-40B4-BE49-F238E27FC236}">
-                <a16:creationId xmlns:a16="http://schemas.microsoft.com/office/drawing/2014/main" id="{FC12F862-2325-47C0-9036-110452A579F6}"/>
-              </a:ext>
-            </a:extLst>
-          </p:cNvPr>
-          <p:cNvSpPr>
-            <a:spLocks noGrp="1"/>
-          </p:cNvSpPr>
-          <p:nvPr>
-            <p:ph sz="quarter" idx="10"/>
-          </p:nvPr>
-        </p:nvSpPr>
-        <p:spPr/>
-        <p:txBody>
-          <a:bodyPr/>
-          <a:lstStyle/>
-          <a:p>
-            <a:r>
-              <a:rPr lang="en-US" dirty="0"/>
-              <a:t>NIST</a:t>
-            </a:r>
-          </a:p>
-        </p:txBody>
-      </p:sp>
-    </p:spTree>
-    <p:extLst>
-      <p:ext uri="{BB962C8B-B14F-4D97-AF65-F5344CB8AC3E}">
-        <p14:creationId xmlns:p14="http://schemas.microsoft.com/office/powerpoint/2010/main" val="4284891684"/>
-      </p:ext>
-    </p:extLst>
-  </p:cSld>
-  <p:clrMapOvr>
-    <a:masterClrMapping/>
-  </p:clrMapOvr>
-</p:sld>
-</file>
-
-<file path=ppt/slides/slide11.xml><?xml version="1.0" encoding="utf-8"?>
-<p:sld xmlns:a="http://schemas.openxmlformats.org/drawingml/2006/main" xmlns:r="http://schemas.openxmlformats.org/officeDocument/2006/relationships" xmlns:p="http://schemas.openxmlformats.org/presentationml/2006/main">
-  <p:cSld>
-    <p:spTree>
-      <p:nvGrpSpPr>
-        <p:cNvPr id="1" name=""/>
-        <p:cNvGrpSpPr/>
-        <p:nvPr/>
-      </p:nvGrpSpPr>
-      <p:grpSpPr>
-        <a:xfrm>
-          <a:off x="0" y="0"/>
-          <a:ext cx="0" cy="0"/>
-          <a:chOff x="0" y="0"/>
-          <a:chExt cx="0" cy="0"/>
-        </a:xfrm>
-      </p:grpSpPr>
-      <p:sp>
-        <p:nvSpPr>
           <p:cNvPr id="5" name="Text Placeholder 4"/>
           <p:cNvSpPr>
             <a:spLocks noGrp="1"/>
@@ -11964,7 +11953,7 @@
 </p:sld>
 </file>
 
-<file path=ppt/slides/slide12.xml><?xml version="1.0" encoding="utf-8"?>
+<file path=ppt/slides/slide11.xml><?xml version="1.0" encoding="utf-8"?>
 <p:sld xmlns:a="http://schemas.openxmlformats.org/drawingml/2006/main" xmlns:r="http://schemas.openxmlformats.org/officeDocument/2006/relationships" xmlns:p="http://schemas.openxmlformats.org/presentationml/2006/main">
   <p:cSld>
     <p:spTree>
@@ -12062,7 +12051,427 @@
 </p:sld>
 </file>
 
+<file path=ppt/slides/slide12.xml><?xml version="1.0" encoding="utf-8"?>
+<p:sld xmlns:a="http://schemas.openxmlformats.org/drawingml/2006/main" xmlns:r="http://schemas.openxmlformats.org/officeDocument/2006/relationships" xmlns:p="http://schemas.openxmlformats.org/presentationml/2006/main">
+  <p:cSld>
+    <p:spTree>
+      <p:nvGrpSpPr>
+        <p:cNvPr id="1" name=""/>
+        <p:cNvGrpSpPr/>
+        <p:nvPr/>
+      </p:nvGrpSpPr>
+      <p:grpSpPr>
+        <a:xfrm>
+          <a:off x="0" y="0"/>
+          <a:ext cx="0" cy="0"/>
+          <a:chOff x="0" y="0"/>
+          <a:chExt cx="0" cy="0"/>
+        </a:xfrm>
+      </p:grpSpPr>
+      <p:sp>
+        <p:nvSpPr>
+          <p:cNvPr id="4" name="Title 3">
+            <a:extLst>
+              <a:ext uri="{FF2B5EF4-FFF2-40B4-BE49-F238E27FC236}">
+                <a16:creationId xmlns:a16="http://schemas.microsoft.com/office/drawing/2014/main" id="{00BA9A5C-158A-4F1F-8ACD-E8AB15B5AE75}"/>
+              </a:ext>
+            </a:extLst>
+          </p:cNvPr>
+          <p:cNvSpPr>
+            <a:spLocks noGrp="1"/>
+          </p:cNvSpPr>
+          <p:nvPr>
+            <p:ph type="title"/>
+          </p:nvPr>
+        </p:nvSpPr>
+        <p:spPr/>
+        <p:txBody>
+          <a:bodyPr/>
+          <a:lstStyle/>
+          <a:p>
+            <a:r>
+              <a:rPr lang="pt-BR" dirty="0"/>
+              <a:t>Auto atendimento e sob demanda</a:t>
+            </a:r>
+            <a:endParaRPr lang="en-US" dirty="0"/>
+          </a:p>
+        </p:txBody>
+      </p:sp>
+      <p:sp>
+        <p:nvSpPr>
+          <p:cNvPr id="5" name="Content Placeholder 4">
+            <a:extLst>
+              <a:ext uri="{FF2B5EF4-FFF2-40B4-BE49-F238E27FC236}">
+                <a16:creationId xmlns:a16="http://schemas.microsoft.com/office/drawing/2014/main" id="{4B0C47BD-176E-41D9-ABF2-FF216CEA81C0}"/>
+              </a:ext>
+            </a:extLst>
+          </p:cNvPr>
+          <p:cNvSpPr>
+            <a:spLocks noGrp="1"/>
+          </p:cNvSpPr>
+          <p:nvPr>
+            <p:ph sz="quarter" idx="10"/>
+          </p:nvPr>
+        </p:nvSpPr>
+        <p:spPr/>
+        <p:txBody>
+          <a:bodyPr/>
+          <a:lstStyle/>
+          <a:p>
+            <a:endParaRPr lang="en-US"/>
+          </a:p>
+        </p:txBody>
+      </p:sp>
+    </p:spTree>
+    <p:extLst>
+      <p:ext uri="{BB962C8B-B14F-4D97-AF65-F5344CB8AC3E}">
+        <p14:creationId xmlns:p14="http://schemas.microsoft.com/office/powerpoint/2010/main" val="1582857096"/>
+      </p:ext>
+    </p:extLst>
+  </p:cSld>
+  <p:clrMapOvr>
+    <a:masterClrMapping/>
+  </p:clrMapOvr>
+</p:sld>
+</file>
+
 <file path=ppt/slides/slide13.xml><?xml version="1.0" encoding="utf-8"?>
+<p:sld xmlns:a="http://schemas.openxmlformats.org/drawingml/2006/main" xmlns:r="http://schemas.openxmlformats.org/officeDocument/2006/relationships" xmlns:p="http://schemas.openxmlformats.org/presentationml/2006/main">
+  <p:cSld>
+    <p:spTree>
+      <p:nvGrpSpPr>
+        <p:cNvPr id="1" name=""/>
+        <p:cNvGrpSpPr/>
+        <p:nvPr/>
+      </p:nvGrpSpPr>
+      <p:grpSpPr>
+        <a:xfrm>
+          <a:off x="0" y="0"/>
+          <a:ext cx="0" cy="0"/>
+          <a:chOff x="0" y="0"/>
+          <a:chExt cx="0" cy="0"/>
+        </a:xfrm>
+      </p:grpSpPr>
+      <p:sp>
+        <p:nvSpPr>
+          <p:cNvPr id="4" name="Title 3">
+            <a:extLst>
+              <a:ext uri="{FF2B5EF4-FFF2-40B4-BE49-F238E27FC236}">
+                <a16:creationId xmlns:a16="http://schemas.microsoft.com/office/drawing/2014/main" id="{00BA9A5C-158A-4F1F-8ACD-E8AB15B5AE75}"/>
+              </a:ext>
+            </a:extLst>
+          </p:cNvPr>
+          <p:cNvSpPr>
+            <a:spLocks noGrp="1"/>
+          </p:cNvSpPr>
+          <p:nvPr>
+            <p:ph type="title"/>
+          </p:nvPr>
+        </p:nvSpPr>
+        <p:spPr/>
+        <p:txBody>
+          <a:bodyPr/>
+          <a:lstStyle/>
+          <a:p>
+            <a:r>
+              <a:rPr lang="pt-BR" dirty="0"/>
+              <a:t>Acesso através da Internet</a:t>
+            </a:r>
+            <a:endParaRPr lang="en-US" dirty="0"/>
+          </a:p>
+        </p:txBody>
+      </p:sp>
+      <p:sp>
+        <p:nvSpPr>
+          <p:cNvPr id="5" name="Content Placeholder 4">
+            <a:extLst>
+              <a:ext uri="{FF2B5EF4-FFF2-40B4-BE49-F238E27FC236}">
+                <a16:creationId xmlns:a16="http://schemas.microsoft.com/office/drawing/2014/main" id="{4B0C47BD-176E-41D9-ABF2-FF216CEA81C0}"/>
+              </a:ext>
+            </a:extLst>
+          </p:cNvPr>
+          <p:cNvSpPr>
+            <a:spLocks noGrp="1"/>
+          </p:cNvSpPr>
+          <p:nvPr>
+            <p:ph sz="quarter" idx="10"/>
+          </p:nvPr>
+        </p:nvSpPr>
+        <p:spPr/>
+        <p:txBody>
+          <a:bodyPr/>
+          <a:lstStyle/>
+          <a:p>
+            <a:endParaRPr lang="en-US"/>
+          </a:p>
+        </p:txBody>
+      </p:sp>
+    </p:spTree>
+    <p:extLst>
+      <p:ext uri="{BB962C8B-B14F-4D97-AF65-F5344CB8AC3E}">
+        <p14:creationId xmlns:p14="http://schemas.microsoft.com/office/powerpoint/2010/main" val="1095386681"/>
+      </p:ext>
+    </p:extLst>
+  </p:cSld>
+  <p:clrMapOvr>
+    <a:masterClrMapping/>
+  </p:clrMapOvr>
+</p:sld>
+</file>
+
+<file path=ppt/slides/slide14.xml><?xml version="1.0" encoding="utf-8"?>
+<p:sld xmlns:a="http://schemas.openxmlformats.org/drawingml/2006/main" xmlns:r="http://schemas.openxmlformats.org/officeDocument/2006/relationships" xmlns:p="http://schemas.openxmlformats.org/presentationml/2006/main">
+  <p:cSld>
+    <p:spTree>
+      <p:nvGrpSpPr>
+        <p:cNvPr id="1" name=""/>
+        <p:cNvGrpSpPr/>
+        <p:nvPr/>
+      </p:nvGrpSpPr>
+      <p:grpSpPr>
+        <a:xfrm>
+          <a:off x="0" y="0"/>
+          <a:ext cx="0" cy="0"/>
+          <a:chOff x="0" y="0"/>
+          <a:chExt cx="0" cy="0"/>
+        </a:xfrm>
+      </p:grpSpPr>
+      <p:sp>
+        <p:nvSpPr>
+          <p:cNvPr id="4" name="Title 3">
+            <a:extLst>
+              <a:ext uri="{FF2B5EF4-FFF2-40B4-BE49-F238E27FC236}">
+                <a16:creationId xmlns:a16="http://schemas.microsoft.com/office/drawing/2014/main" id="{00BA9A5C-158A-4F1F-8ACD-E8AB15B5AE75}"/>
+              </a:ext>
+            </a:extLst>
+          </p:cNvPr>
+          <p:cNvSpPr>
+            <a:spLocks noGrp="1"/>
+          </p:cNvSpPr>
+          <p:nvPr>
+            <p:ph type="title"/>
+          </p:nvPr>
+        </p:nvSpPr>
+        <p:spPr/>
+        <p:txBody>
+          <a:bodyPr/>
+          <a:lstStyle/>
+          <a:p>
+            <a:r>
+              <a:rPr lang="pt-BR" dirty="0"/>
+              <a:t>Pool de recursos</a:t>
+            </a:r>
+            <a:endParaRPr lang="en-US" dirty="0"/>
+          </a:p>
+        </p:txBody>
+      </p:sp>
+      <p:sp>
+        <p:nvSpPr>
+          <p:cNvPr id="5" name="Content Placeholder 4">
+            <a:extLst>
+              <a:ext uri="{FF2B5EF4-FFF2-40B4-BE49-F238E27FC236}">
+                <a16:creationId xmlns:a16="http://schemas.microsoft.com/office/drawing/2014/main" id="{4B0C47BD-176E-41D9-ABF2-FF216CEA81C0}"/>
+              </a:ext>
+            </a:extLst>
+          </p:cNvPr>
+          <p:cNvSpPr>
+            <a:spLocks noGrp="1"/>
+          </p:cNvSpPr>
+          <p:nvPr>
+            <p:ph sz="quarter" idx="10"/>
+          </p:nvPr>
+        </p:nvSpPr>
+        <p:spPr/>
+        <p:txBody>
+          <a:bodyPr/>
+          <a:lstStyle/>
+          <a:p>
+            <a:endParaRPr lang="en-US"/>
+          </a:p>
+        </p:txBody>
+      </p:sp>
+    </p:spTree>
+    <p:extLst>
+      <p:ext uri="{BB962C8B-B14F-4D97-AF65-F5344CB8AC3E}">
+        <p14:creationId xmlns:p14="http://schemas.microsoft.com/office/powerpoint/2010/main" val="3590152874"/>
+      </p:ext>
+    </p:extLst>
+  </p:cSld>
+  <p:clrMapOvr>
+    <a:masterClrMapping/>
+  </p:clrMapOvr>
+</p:sld>
+</file>
+
+<file path=ppt/slides/slide15.xml><?xml version="1.0" encoding="utf-8"?>
+<p:sld xmlns:a="http://schemas.openxmlformats.org/drawingml/2006/main" xmlns:r="http://schemas.openxmlformats.org/officeDocument/2006/relationships" xmlns:p="http://schemas.openxmlformats.org/presentationml/2006/main">
+  <p:cSld>
+    <p:spTree>
+      <p:nvGrpSpPr>
+        <p:cNvPr id="1" name=""/>
+        <p:cNvGrpSpPr/>
+        <p:nvPr/>
+      </p:nvGrpSpPr>
+      <p:grpSpPr>
+        <a:xfrm>
+          <a:off x="0" y="0"/>
+          <a:ext cx="0" cy="0"/>
+          <a:chOff x="0" y="0"/>
+          <a:chExt cx="0" cy="0"/>
+        </a:xfrm>
+      </p:grpSpPr>
+      <p:sp>
+        <p:nvSpPr>
+          <p:cNvPr id="4" name="Title 3">
+            <a:extLst>
+              <a:ext uri="{FF2B5EF4-FFF2-40B4-BE49-F238E27FC236}">
+                <a16:creationId xmlns:a16="http://schemas.microsoft.com/office/drawing/2014/main" id="{00BA9A5C-158A-4F1F-8ACD-E8AB15B5AE75}"/>
+              </a:ext>
+            </a:extLst>
+          </p:cNvPr>
+          <p:cNvSpPr>
+            <a:spLocks noGrp="1"/>
+          </p:cNvSpPr>
+          <p:nvPr>
+            <p:ph type="title"/>
+          </p:nvPr>
+        </p:nvSpPr>
+        <p:spPr/>
+        <p:txBody>
+          <a:bodyPr/>
+          <a:lstStyle/>
+          <a:p>
+            <a:r>
+              <a:rPr lang="pt-BR" dirty="0"/>
+              <a:t>Elasticidade rápida</a:t>
+            </a:r>
+            <a:endParaRPr lang="en-US" dirty="0"/>
+          </a:p>
+        </p:txBody>
+      </p:sp>
+      <p:sp>
+        <p:nvSpPr>
+          <p:cNvPr id="5" name="Content Placeholder 4">
+            <a:extLst>
+              <a:ext uri="{FF2B5EF4-FFF2-40B4-BE49-F238E27FC236}">
+                <a16:creationId xmlns:a16="http://schemas.microsoft.com/office/drawing/2014/main" id="{4B0C47BD-176E-41D9-ABF2-FF216CEA81C0}"/>
+              </a:ext>
+            </a:extLst>
+          </p:cNvPr>
+          <p:cNvSpPr>
+            <a:spLocks noGrp="1"/>
+          </p:cNvSpPr>
+          <p:nvPr>
+            <p:ph sz="quarter" idx="10"/>
+          </p:nvPr>
+        </p:nvSpPr>
+        <p:spPr/>
+        <p:txBody>
+          <a:bodyPr/>
+          <a:lstStyle/>
+          <a:p>
+            <a:endParaRPr lang="en-US"/>
+          </a:p>
+        </p:txBody>
+      </p:sp>
+    </p:spTree>
+    <p:extLst>
+      <p:ext uri="{BB962C8B-B14F-4D97-AF65-F5344CB8AC3E}">
+        <p14:creationId xmlns:p14="http://schemas.microsoft.com/office/powerpoint/2010/main" val="3920890223"/>
+      </p:ext>
+    </p:extLst>
+  </p:cSld>
+  <p:clrMapOvr>
+    <a:masterClrMapping/>
+  </p:clrMapOvr>
+</p:sld>
+</file>
+
+<file path=ppt/slides/slide16.xml><?xml version="1.0" encoding="utf-8"?>
+<p:sld xmlns:a="http://schemas.openxmlformats.org/drawingml/2006/main" xmlns:r="http://schemas.openxmlformats.org/officeDocument/2006/relationships" xmlns:p="http://schemas.openxmlformats.org/presentationml/2006/main">
+  <p:cSld>
+    <p:spTree>
+      <p:nvGrpSpPr>
+        <p:cNvPr id="1" name=""/>
+        <p:cNvGrpSpPr/>
+        <p:nvPr/>
+      </p:nvGrpSpPr>
+      <p:grpSpPr>
+        <a:xfrm>
+          <a:off x="0" y="0"/>
+          <a:ext cx="0" cy="0"/>
+          <a:chOff x="0" y="0"/>
+          <a:chExt cx="0" cy="0"/>
+        </a:xfrm>
+      </p:grpSpPr>
+      <p:sp>
+        <p:nvSpPr>
+          <p:cNvPr id="4" name="Title 3">
+            <a:extLst>
+              <a:ext uri="{FF2B5EF4-FFF2-40B4-BE49-F238E27FC236}">
+                <a16:creationId xmlns:a16="http://schemas.microsoft.com/office/drawing/2014/main" id="{00BA9A5C-158A-4F1F-8ACD-E8AB15B5AE75}"/>
+              </a:ext>
+            </a:extLst>
+          </p:cNvPr>
+          <p:cNvSpPr>
+            <a:spLocks noGrp="1"/>
+          </p:cNvSpPr>
+          <p:nvPr>
+            <p:ph type="title"/>
+          </p:nvPr>
+        </p:nvSpPr>
+        <p:spPr/>
+        <p:txBody>
+          <a:bodyPr/>
+          <a:lstStyle/>
+          <a:p>
+            <a:r>
+              <a:rPr lang="pt-BR" dirty="0"/>
+              <a:t>Measure service</a:t>
+            </a:r>
+            <a:endParaRPr lang="en-US" dirty="0"/>
+          </a:p>
+        </p:txBody>
+      </p:sp>
+      <p:sp>
+        <p:nvSpPr>
+          <p:cNvPr id="5" name="Content Placeholder 4">
+            <a:extLst>
+              <a:ext uri="{FF2B5EF4-FFF2-40B4-BE49-F238E27FC236}">
+                <a16:creationId xmlns:a16="http://schemas.microsoft.com/office/drawing/2014/main" id="{4B0C47BD-176E-41D9-ABF2-FF216CEA81C0}"/>
+              </a:ext>
+            </a:extLst>
+          </p:cNvPr>
+          <p:cNvSpPr>
+            <a:spLocks noGrp="1"/>
+          </p:cNvSpPr>
+          <p:nvPr>
+            <p:ph sz="quarter" idx="10"/>
+          </p:nvPr>
+        </p:nvSpPr>
+        <p:spPr/>
+        <p:txBody>
+          <a:bodyPr/>
+          <a:lstStyle/>
+          <a:p>
+            <a:endParaRPr lang="en-US"/>
+          </a:p>
+        </p:txBody>
+      </p:sp>
+    </p:spTree>
+    <p:extLst>
+      <p:ext uri="{BB962C8B-B14F-4D97-AF65-F5344CB8AC3E}">
+        <p14:creationId xmlns:p14="http://schemas.microsoft.com/office/powerpoint/2010/main" val="82507215"/>
+      </p:ext>
+    </p:extLst>
+  </p:cSld>
+  <p:clrMapOvr>
+    <a:masterClrMapping/>
+  </p:clrMapOvr>
+</p:sld>
+</file>
+
+<file path=ppt/slides/slide17.xml><?xml version="1.0" encoding="utf-8"?>
 <p:sld xmlns:a="http://schemas.openxmlformats.org/drawingml/2006/main" xmlns:r="http://schemas.openxmlformats.org/officeDocument/2006/relationships" xmlns:p="http://schemas.openxmlformats.org/presentationml/2006/main">
   <p:cSld>
     <p:spTree>
@@ -12168,7 +12577,7 @@
 </p:sld>
 </file>
 
-<file path=ppt/slides/slide14.xml><?xml version="1.0" encoding="utf-8"?>
+<file path=ppt/slides/slide18.xml><?xml version="1.0" encoding="utf-8"?>
 <p:sld xmlns:a="http://schemas.openxmlformats.org/drawingml/2006/main" xmlns:r="http://schemas.openxmlformats.org/officeDocument/2006/relationships" xmlns:p="http://schemas.openxmlformats.org/presentationml/2006/main">
   <p:cSld>
     <p:spTree>
@@ -17164,7 +17573,7 @@
 </p:sld>
 </file>
 
-<file path=ppt/slides/slide15.xml><?xml version="1.0" encoding="utf-8"?>
+<file path=ppt/slides/slide19.xml><?xml version="1.0" encoding="utf-8"?>
 <p:sld xmlns:a="http://schemas.openxmlformats.org/drawingml/2006/main" xmlns:r="http://schemas.openxmlformats.org/officeDocument/2006/relationships" xmlns:p="http://schemas.openxmlformats.org/presentationml/2006/main">
   <p:cSld>
     <p:spTree>
@@ -17270,7 +17679,174 @@
 </p:sld>
 </file>
 
-<file path=ppt/slides/slide16.xml><?xml version="1.0" encoding="utf-8"?>
+<file path=ppt/slides/slide2.xml><?xml version="1.0" encoding="utf-8"?>
+<p:sld xmlns:a="http://schemas.openxmlformats.org/drawingml/2006/main" xmlns:r="http://schemas.openxmlformats.org/officeDocument/2006/relationships" xmlns:p="http://schemas.openxmlformats.org/presentationml/2006/main">
+  <p:cSld>
+    <p:spTree>
+      <p:nvGrpSpPr>
+        <p:cNvPr id="1" name=""/>
+        <p:cNvGrpSpPr/>
+        <p:nvPr/>
+      </p:nvGrpSpPr>
+      <p:grpSpPr>
+        <a:xfrm>
+          <a:off x="0" y="0"/>
+          <a:ext cx="0" cy="0"/>
+          <a:chOff x="0" y="0"/>
+          <a:chExt cx="0" cy="0"/>
+        </a:xfrm>
+      </p:grpSpPr>
+      <p:sp>
+        <p:nvSpPr>
+          <p:cNvPr id="3" name="Title 2"/>
+          <p:cNvSpPr>
+            <a:spLocks noGrp="1"/>
+          </p:cNvSpPr>
+          <p:nvPr>
+            <p:ph type="title"/>
+          </p:nvPr>
+        </p:nvSpPr>
+        <p:spPr/>
+        <p:txBody>
+          <a:bodyPr/>
+          <a:lstStyle/>
+          <a:p>
+            <a:r>
+              <a:rPr lang="en-US" dirty="0"/>
+              <a:t>Agenda</a:t>
+            </a:r>
+          </a:p>
+        </p:txBody>
+      </p:sp>
+      <p:sp>
+        <p:nvSpPr>
+          <p:cNvPr id="4" name="Content Placeholder 3"/>
+          <p:cNvSpPr>
+            <a:spLocks noGrp="1"/>
+          </p:cNvSpPr>
+          <p:nvPr>
+            <p:ph sz="quarter" idx="10"/>
+          </p:nvPr>
+        </p:nvSpPr>
+        <p:spPr/>
+        <p:txBody>
+          <a:bodyPr/>
+          <a:lstStyle/>
+          <a:p>
+            <a:r>
+              <a:rPr lang="en-US" dirty="0" err="1"/>
+              <a:t>Introdução</a:t>
+            </a:r>
+            <a:endParaRPr lang="en-US" dirty="0"/>
+          </a:p>
+          <a:p>
+            <a:pPr lvl="1"/>
+            <a:r>
+              <a:rPr lang="en-US" dirty="0" err="1"/>
+              <a:t>Evolução</a:t>
+            </a:r>
+            <a:r>
+              <a:rPr lang="en-US" dirty="0"/>
+              <a:t> </a:t>
+            </a:r>
+            <a:r>
+              <a:rPr lang="en-US" dirty="0" err="1"/>
+              <a:t>Computacional</a:t>
+            </a:r>
+            <a:endParaRPr lang="en-US" dirty="0"/>
+          </a:p>
+          <a:p>
+            <a:r>
+              <a:rPr lang="en-US" dirty="0"/>
+              <a:t>O que é </a:t>
+            </a:r>
+            <a:r>
+              <a:rPr lang="en-US" dirty="0" err="1"/>
+              <a:t>Computação</a:t>
+            </a:r>
+            <a:r>
+              <a:rPr lang="en-US" dirty="0"/>
+              <a:t> em </a:t>
+            </a:r>
+            <a:r>
+              <a:rPr lang="en-US" dirty="0" err="1"/>
+              <a:t>Nuvem</a:t>
+            </a:r>
+            <a:r>
+              <a:rPr lang="en-US" dirty="0"/>
+              <a:t>?</a:t>
+            </a:r>
+          </a:p>
+          <a:p>
+            <a:pPr lvl="1"/>
+            <a:r>
+              <a:rPr lang="en-US" dirty="0" err="1"/>
+              <a:t>Características</a:t>
+            </a:r>
+            <a:r>
+              <a:rPr lang="en-US" dirty="0"/>
+              <a:t> </a:t>
+            </a:r>
+            <a:r>
+              <a:rPr lang="en-US" dirty="0" err="1"/>
+              <a:t>Essenciais</a:t>
+            </a:r>
+            <a:r>
+              <a:rPr lang="en-US" dirty="0"/>
+              <a:t> que </a:t>
+            </a:r>
+            <a:r>
+              <a:rPr lang="en-US" dirty="0" err="1"/>
+              <a:t>definem</a:t>
+            </a:r>
+            <a:r>
+              <a:rPr lang="en-US" dirty="0"/>
+              <a:t> a </a:t>
+            </a:r>
+            <a:r>
+              <a:rPr lang="en-US" dirty="0" err="1"/>
+              <a:t>Nuvem</a:t>
+            </a:r>
+            <a:endParaRPr lang="en-US" dirty="0"/>
+          </a:p>
+          <a:p>
+            <a:pPr lvl="1"/>
+            <a:r>
+              <a:rPr lang="en-US" dirty="0" err="1"/>
+              <a:t>Modelos</a:t>
+            </a:r>
+            <a:r>
+              <a:rPr lang="en-US" dirty="0"/>
+              <a:t> de Serviços</a:t>
+            </a:r>
+          </a:p>
+          <a:p>
+            <a:pPr lvl="1"/>
+            <a:r>
+              <a:rPr lang="en-US" dirty="0" err="1"/>
+              <a:t>Modelos</a:t>
+            </a:r>
+            <a:r>
+              <a:rPr lang="en-US" dirty="0"/>
+              <a:t> de Deployment</a:t>
+            </a:r>
+          </a:p>
+        </p:txBody>
+      </p:sp>
+    </p:spTree>
+    <p:extLst>
+      <p:ext uri="{BB962C8B-B14F-4D97-AF65-F5344CB8AC3E}">
+        <p14:creationId xmlns:p14="http://schemas.microsoft.com/office/powerpoint/2010/main" val="2122538783"/>
+      </p:ext>
+    </p:extLst>
+  </p:cSld>
+  <p:clrMapOvr>
+    <a:masterClrMapping/>
+  </p:clrMapOvr>
+</p:sld>
+</file>
+
+<file path=ppt/slides/slide20.xml><?xml version="1.0" encoding="utf-8"?>
 <p:sld xmlns:a="http://schemas.openxmlformats.org/drawingml/2006/main" xmlns:r="http://schemas.openxmlformats.org/officeDocument/2006/relationships" xmlns:p="http://schemas.openxmlformats.org/presentationml/2006/main">
   <p:cSld>
     <p:spTree>
@@ -17428,7 +18004,7 @@
 </p:sld>
 </file>
 
-<file path=ppt/slides/slide2.xml><?xml version="1.0" encoding="utf-8"?>
+<file path=ppt/slides/slide21.xml><?xml version="1.0" encoding="utf-8"?>
 <p:sld xmlns:a="http://schemas.openxmlformats.org/drawingml/2006/main" xmlns:r="http://schemas.openxmlformats.org/officeDocument/2006/relationships" xmlns:p="http://schemas.openxmlformats.org/presentationml/2006/main">
   <p:cSld>
     <p:spTree>
@@ -17447,7 +18023,13 @@
       </p:grpSpPr>
       <p:sp>
         <p:nvSpPr>
-          <p:cNvPr id="3" name="Title 2"/>
+          <p:cNvPr id="2" name="Title 1">
+            <a:extLst>
+              <a:ext uri="{FF2B5EF4-FFF2-40B4-BE49-F238E27FC236}">
+                <a16:creationId xmlns:a16="http://schemas.microsoft.com/office/drawing/2014/main" id="{6F86C7C0-9A61-4377-B87C-B1D84E6762C5}"/>
+              </a:ext>
+            </a:extLst>
+          </p:cNvPr>
           <p:cNvSpPr>
             <a:spLocks noGrp="1"/>
           </p:cNvSpPr>
@@ -17461,15 +18043,22 @@
           <a:lstStyle/>
           <a:p>
             <a:r>
-              <a:rPr lang="en-US" dirty="0"/>
-              <a:t>Agenda</a:t>
-            </a:r>
+              <a:rPr lang="pt-BR" dirty="0"/>
+              <a:t>Private Cloud</a:t>
+            </a:r>
+            <a:endParaRPr lang="en-US" dirty="0"/>
           </a:p>
         </p:txBody>
       </p:sp>
       <p:sp>
         <p:nvSpPr>
-          <p:cNvPr id="4" name="Content Placeholder 3"/>
+          <p:cNvPr id="3" name="Content Placeholder 2">
+            <a:extLst>
+              <a:ext uri="{FF2B5EF4-FFF2-40B4-BE49-F238E27FC236}">
+                <a16:creationId xmlns:a16="http://schemas.microsoft.com/office/drawing/2014/main" id="{CCE8DB74-4AD1-4AB7-AB65-A874041A7A1F}"/>
+              </a:ext>
+            </a:extLst>
+          </p:cNvPr>
           <p:cNvSpPr>
             <a:spLocks noGrp="1"/>
           </p:cNvSpPr>
@@ -17482,114 +18071,98 @@
           <a:bodyPr/>
           <a:lstStyle/>
           <a:p>
-            <a:r>
-              <a:rPr lang="en-US" dirty="0" err="1"/>
-              <a:t>Introdução</a:t>
-            </a:r>
-            <a:endParaRPr lang="en-US" dirty="0"/>
-          </a:p>
-          <a:p>
-            <a:r>
-              <a:rPr lang="en-US" dirty="0" err="1"/>
-              <a:t>Evolução</a:t>
-            </a:r>
-            <a:r>
-              <a:rPr lang="en-US" dirty="0"/>
-              <a:t> </a:t>
-            </a:r>
-            <a:r>
-              <a:rPr lang="en-US" dirty="0" err="1"/>
-              <a:t>Computacional</a:t>
-            </a:r>
-            <a:endParaRPr lang="en-US" dirty="0"/>
-          </a:p>
-          <a:p>
-            <a:r>
-              <a:rPr lang="en-US" dirty="0"/>
-              <a:t>O que é </a:t>
-            </a:r>
-            <a:r>
-              <a:rPr lang="en-US" dirty="0" err="1"/>
-              <a:t>Computação</a:t>
-            </a:r>
-            <a:r>
-              <a:rPr lang="en-US" dirty="0"/>
-              <a:t> </a:t>
-            </a:r>
-            <a:r>
-              <a:rPr lang="en-US" dirty="0" err="1"/>
-              <a:t>em</a:t>
-            </a:r>
-            <a:r>
-              <a:rPr lang="en-US" dirty="0"/>
-              <a:t> </a:t>
-            </a:r>
-            <a:r>
-              <a:rPr lang="en-US" dirty="0" err="1"/>
-              <a:t>Nuvem</a:t>
-            </a:r>
-            <a:r>
-              <a:rPr lang="en-US" dirty="0"/>
-              <a:t>?</a:t>
-            </a:r>
-          </a:p>
-          <a:p>
-            <a:r>
-              <a:rPr lang="en-US" dirty="0" err="1"/>
-              <a:t>Características</a:t>
-            </a:r>
-            <a:r>
-              <a:rPr lang="en-US" dirty="0"/>
-              <a:t> </a:t>
-            </a:r>
-            <a:r>
-              <a:rPr lang="en-US" dirty="0" err="1"/>
-              <a:t>Essenciais</a:t>
-            </a:r>
-            <a:r>
-              <a:rPr lang="en-US" dirty="0"/>
-              <a:t> que </a:t>
-            </a:r>
-            <a:r>
-              <a:rPr lang="en-US" dirty="0" err="1"/>
-              <a:t>definem</a:t>
-            </a:r>
-            <a:r>
-              <a:rPr lang="en-US" dirty="0"/>
-              <a:t> a </a:t>
-            </a:r>
-            <a:r>
-              <a:rPr lang="en-US" dirty="0" err="1"/>
-              <a:t>Nuvem</a:t>
-            </a:r>
-            <a:endParaRPr lang="en-US" dirty="0"/>
-          </a:p>
-          <a:p>
-            <a:r>
-              <a:rPr lang="en-US" dirty="0" err="1"/>
-              <a:t>Modelos</a:t>
-            </a:r>
-            <a:r>
-              <a:rPr lang="en-US" dirty="0"/>
-              <a:t> de Serviços</a:t>
-            </a:r>
-          </a:p>
-          <a:p>
-            <a:r>
-              <a:rPr lang="en-US" dirty="0" err="1"/>
-              <a:t>Modelos</a:t>
-            </a:r>
-            <a:r>
-              <a:rPr lang="en-US" dirty="0"/>
-              <a:t> de Deployment</a:t>
-            </a:r>
+            <a:endParaRPr lang="en-US"/>
           </a:p>
         </p:txBody>
       </p:sp>
     </p:spTree>
     <p:extLst>
       <p:ext uri="{BB962C8B-B14F-4D97-AF65-F5344CB8AC3E}">
-        <p14:creationId xmlns:p14="http://schemas.microsoft.com/office/powerpoint/2010/main" val="2122538783"/>
+        <p14:creationId xmlns:p14="http://schemas.microsoft.com/office/powerpoint/2010/main" val="3258966573"/>
+      </p:ext>
+    </p:extLst>
+  </p:cSld>
+  <p:clrMapOvr>
+    <a:masterClrMapping/>
+  </p:clrMapOvr>
+</p:sld>
+</file>
+
+<file path=ppt/slides/slide22.xml><?xml version="1.0" encoding="utf-8"?>
+<p:sld xmlns:a="http://schemas.openxmlformats.org/drawingml/2006/main" xmlns:r="http://schemas.openxmlformats.org/officeDocument/2006/relationships" xmlns:p="http://schemas.openxmlformats.org/presentationml/2006/main">
+  <p:cSld>
+    <p:spTree>
+      <p:nvGrpSpPr>
+        <p:cNvPr id="1" name=""/>
+        <p:cNvGrpSpPr/>
+        <p:nvPr/>
+      </p:nvGrpSpPr>
+      <p:grpSpPr>
+        <a:xfrm>
+          <a:off x="0" y="0"/>
+          <a:ext cx="0" cy="0"/>
+          <a:chOff x="0" y="0"/>
+          <a:chExt cx="0" cy="0"/>
+        </a:xfrm>
+      </p:grpSpPr>
+      <p:sp>
+        <p:nvSpPr>
+          <p:cNvPr id="2" name="Title 1">
+            <a:extLst>
+              <a:ext uri="{FF2B5EF4-FFF2-40B4-BE49-F238E27FC236}">
+                <a16:creationId xmlns:a16="http://schemas.microsoft.com/office/drawing/2014/main" id="{0B5BAE76-409E-4421-9F52-AC4ABCB36BB4}"/>
+              </a:ext>
+            </a:extLst>
+          </p:cNvPr>
+          <p:cNvSpPr>
+            <a:spLocks noGrp="1"/>
+          </p:cNvSpPr>
+          <p:nvPr>
+            <p:ph type="title"/>
+          </p:nvPr>
+        </p:nvSpPr>
+        <p:spPr/>
+        <p:txBody>
+          <a:bodyPr/>
+          <a:lstStyle/>
+          <a:p>
+            <a:r>
+              <a:rPr lang="pt-BR" dirty="0"/>
+              <a:t>Public Cloud</a:t>
+            </a:r>
+            <a:endParaRPr lang="en-US" dirty="0"/>
+          </a:p>
+        </p:txBody>
+      </p:sp>
+      <p:sp>
+        <p:nvSpPr>
+          <p:cNvPr id="3" name="Content Placeholder 2">
+            <a:extLst>
+              <a:ext uri="{FF2B5EF4-FFF2-40B4-BE49-F238E27FC236}">
+                <a16:creationId xmlns:a16="http://schemas.microsoft.com/office/drawing/2014/main" id="{EAD8D7A7-FA54-4198-A629-57EF0AD5B2AF}"/>
+              </a:ext>
+            </a:extLst>
+          </p:cNvPr>
+          <p:cNvSpPr>
+            <a:spLocks noGrp="1"/>
+          </p:cNvSpPr>
+          <p:nvPr>
+            <p:ph sz="quarter" idx="10"/>
+          </p:nvPr>
+        </p:nvSpPr>
+        <p:spPr/>
+        <p:txBody>
+          <a:bodyPr/>
+          <a:lstStyle/>
+          <a:p>
+            <a:endParaRPr lang="en-US"/>
+          </a:p>
+        </p:txBody>
+      </p:sp>
+    </p:spTree>
+    <p:extLst>
+      <p:ext uri="{BB962C8B-B14F-4D97-AF65-F5344CB8AC3E}">
+        <p14:creationId xmlns:p14="http://schemas.microsoft.com/office/powerpoint/2010/main" val="43106669"/>
       </p:ext>
     </p:extLst>
   </p:cSld>
@@ -17722,291 +18295,6 @@
 </file>
 
 <file path=ppt/slides/slide4.xml><?xml version="1.0" encoding="utf-8"?>
-<p:sld xmlns:a="http://schemas.openxmlformats.org/drawingml/2006/main" xmlns:r="http://schemas.openxmlformats.org/officeDocument/2006/relationships" xmlns:p="http://schemas.openxmlformats.org/presentationml/2006/main">
-  <p:cSld>
-    <p:spTree>
-      <p:nvGrpSpPr>
-        <p:cNvPr id="1" name=""/>
-        <p:cNvGrpSpPr/>
-        <p:nvPr/>
-      </p:nvGrpSpPr>
-      <p:grpSpPr>
-        <a:xfrm>
-          <a:off x="0" y="0"/>
-          <a:ext cx="0" cy="0"/>
-          <a:chOff x="0" y="0"/>
-          <a:chExt cx="0" cy="0"/>
-        </a:xfrm>
-      </p:grpSpPr>
-      <p:sp>
-        <p:nvSpPr>
-          <p:cNvPr id="4" name="Title 3"/>
-          <p:cNvSpPr>
-            <a:spLocks noGrp="1"/>
-          </p:cNvSpPr>
-          <p:nvPr>
-            <p:ph type="title"/>
-          </p:nvPr>
-        </p:nvSpPr>
-        <p:spPr/>
-        <p:txBody>
-          <a:bodyPr>
-            <a:normAutofit fontScale="90000"/>
-          </a:bodyPr>
-          <a:lstStyle/>
-          <a:p>
-            <a:r>
-              <a:rPr lang="en-US" dirty="0" err="1"/>
-              <a:t>Constantes</a:t>
-            </a:r>
-            <a:r>
-              <a:rPr lang="en-US" dirty="0"/>
-              <a:t> </a:t>
-            </a:r>
-            <a:r>
-              <a:rPr lang="en-US" dirty="0" err="1"/>
-              <a:t>independente</a:t>
-            </a:r>
-            <a:r>
-              <a:rPr lang="en-US" dirty="0"/>
-              <a:t> das </a:t>
-            </a:r>
-            <a:r>
-              <a:rPr lang="en-US" dirty="0" err="1"/>
-              <a:t>Tendências</a:t>
-            </a:r>
-            <a:r>
-              <a:rPr lang="en-US" dirty="0"/>
-              <a:t> </a:t>
-            </a:r>
-            <a:r>
-              <a:rPr lang="en-US" dirty="0" err="1"/>
-              <a:t>Tecnológicas</a:t>
-            </a:r>
-            <a:r>
-              <a:rPr lang="en-US" dirty="0"/>
-              <a:t> dos </a:t>
-            </a:r>
-            <a:r>
-              <a:rPr lang="en-US" dirty="0" err="1"/>
-              <a:t>últimos</a:t>
-            </a:r>
-            <a:r>
-              <a:rPr lang="en-US" dirty="0"/>
-              <a:t> </a:t>
-            </a:r>
-            <a:r>
-              <a:rPr lang="en-US" dirty="0" err="1"/>
-              <a:t>anos</a:t>
-            </a:r>
-            <a:endParaRPr lang="en-US" dirty="0"/>
-          </a:p>
-        </p:txBody>
-      </p:sp>
-      <p:sp>
-        <p:nvSpPr>
-          <p:cNvPr id="5" name="Content Placeholder 4"/>
-          <p:cNvSpPr>
-            <a:spLocks noGrp="1"/>
-          </p:cNvSpPr>
-          <p:nvPr>
-            <p:ph sz="quarter" idx="10"/>
-          </p:nvPr>
-        </p:nvSpPr>
-        <p:spPr/>
-        <p:txBody>
-          <a:bodyPr/>
-          <a:lstStyle/>
-          <a:p>
-            <a:r>
-              <a:rPr lang="pt-BR" dirty="0"/>
-              <a:t>Estamos no centro de uma transformação</a:t>
-            </a:r>
-          </a:p>
-          <a:p>
-            <a:pPr lvl="1"/>
-            <a:r>
-              <a:rPr lang="pt-BR" dirty="0"/>
-              <a:t>Mainframe</a:t>
-            </a:r>
-          </a:p>
-          <a:p>
-            <a:pPr lvl="1"/>
-            <a:r>
-              <a:rPr lang="pt-BR" dirty="0"/>
-              <a:t>Client-Server</a:t>
-            </a:r>
-          </a:p>
-          <a:p>
-            <a:pPr lvl="1"/>
-            <a:r>
-              <a:rPr lang="pt-BR" dirty="0"/>
-              <a:t>SOA</a:t>
-            </a:r>
-          </a:p>
-          <a:p>
-            <a:pPr lvl="1"/>
-            <a:r>
-              <a:rPr lang="pt-BR" dirty="0"/>
-              <a:t>Internet</a:t>
-            </a:r>
-          </a:p>
-          <a:p>
-            <a:r>
-              <a:rPr lang="pt-BR" dirty="0"/>
-              <a:t>Disrupção Tecnologica</a:t>
-            </a:r>
-          </a:p>
-          <a:p>
-            <a:r>
-              <a:rPr lang="pt-BR" dirty="0"/>
-              <a:t>Disrupção dos Negócios</a:t>
-            </a:r>
-          </a:p>
-          <a:p>
-            <a:r>
-              <a:rPr lang="en-US" dirty="0"/>
-              <a:t>Software</a:t>
-            </a:r>
-          </a:p>
-          <a:p>
-            <a:r>
-              <a:rPr lang="en-US" dirty="0" err="1"/>
-              <a:t>Infraestrutura</a:t>
-            </a:r>
-            <a:endParaRPr lang="en-US" dirty="0"/>
-          </a:p>
-          <a:p>
-            <a:pPr lvl="1"/>
-            <a:endParaRPr lang="en-US" dirty="0"/>
-          </a:p>
-        </p:txBody>
-      </p:sp>
-    </p:spTree>
-    <p:extLst>
-      <p:ext uri="{BB962C8B-B14F-4D97-AF65-F5344CB8AC3E}">
-        <p14:creationId xmlns:p14="http://schemas.microsoft.com/office/powerpoint/2010/main" val="1946340493"/>
-      </p:ext>
-    </p:extLst>
-  </p:cSld>
-  <p:clrMapOvr>
-    <a:masterClrMapping/>
-  </p:clrMapOvr>
-</p:sld>
-</file>
-
-<file path=ppt/slides/slide5.xml><?xml version="1.0" encoding="utf-8"?>
-<p:sld xmlns:a="http://schemas.openxmlformats.org/drawingml/2006/main" xmlns:r="http://schemas.openxmlformats.org/officeDocument/2006/relationships" xmlns:p="http://schemas.openxmlformats.org/presentationml/2006/main">
-  <p:cSld>
-    <p:spTree>
-      <p:nvGrpSpPr>
-        <p:cNvPr id="1" name=""/>
-        <p:cNvGrpSpPr/>
-        <p:nvPr/>
-      </p:nvGrpSpPr>
-      <p:grpSpPr>
-        <a:xfrm>
-          <a:off x="0" y="0"/>
-          <a:ext cx="0" cy="0"/>
-          <a:chOff x="0" y="0"/>
-          <a:chExt cx="0" cy="0"/>
-        </a:xfrm>
-      </p:grpSpPr>
-      <p:sp>
-        <p:nvSpPr>
-          <p:cNvPr id="5" name="Text Placeholder 4"/>
-          <p:cNvSpPr>
-            <a:spLocks noGrp="1"/>
-          </p:cNvSpPr>
-          <p:nvPr>
-            <p:ph type="body" sz="quarter" idx="10"/>
-          </p:nvPr>
-        </p:nvSpPr>
-        <p:spPr/>
-        <p:txBody>
-          <a:bodyPr/>
-          <a:lstStyle/>
-          <a:p>
-            <a:r>
-              <a:rPr lang="en-US" dirty="0" err="1"/>
-              <a:t>Evolução</a:t>
-            </a:r>
-            <a:r>
-              <a:rPr lang="en-US" dirty="0"/>
-              <a:t> </a:t>
-            </a:r>
-            <a:r>
-              <a:rPr lang="en-US" dirty="0" err="1"/>
-              <a:t>Computacional</a:t>
-            </a:r>
-            <a:endParaRPr lang="en-US" dirty="0"/>
-          </a:p>
-        </p:txBody>
-      </p:sp>
-      <p:sp>
-        <p:nvSpPr>
-          <p:cNvPr id="4" name="Subtitle 3"/>
-          <p:cNvSpPr>
-            <a:spLocks noGrp="1"/>
-          </p:cNvSpPr>
-          <p:nvPr>
-            <p:ph type="subTitle" idx="1"/>
-          </p:nvPr>
-        </p:nvSpPr>
-        <p:spPr/>
-        <p:txBody>
-          <a:bodyPr/>
-          <a:lstStyle/>
-          <a:p>
-            <a:endParaRPr lang="en-US"/>
-          </a:p>
-        </p:txBody>
-      </p:sp>
-      <p:pic>
-        <p:nvPicPr>
-          <p:cNvPr id="6" name="Picture 5"/>
-          <p:cNvPicPr>
-            <a:picLocks noChangeAspect="1"/>
-          </p:cNvPicPr>
-          <p:nvPr/>
-        </p:nvPicPr>
-        <p:blipFill>
-          <a:blip r:embed="rId2">
-            <a:biLevel thresh="25000"/>
-            <a:extLst>
-              <a:ext uri="{28A0092B-C50C-407E-A947-70E740481C1C}">
-                <a14:useLocalDpi xmlns:a14="http://schemas.microsoft.com/office/drawing/2010/main" val="0"/>
-              </a:ext>
-            </a:extLst>
-          </a:blip>
-          <a:stretch>
-            <a:fillRect/>
-          </a:stretch>
-        </p:blipFill>
-        <p:spPr>
-          <a:xfrm>
-            <a:off x="9241646" y="2970413"/>
-            <a:ext cx="2477512" cy="2477512"/>
-          </a:xfrm>
-          <a:prstGeom prst="rect">
-            <a:avLst/>
-          </a:prstGeom>
-        </p:spPr>
-      </p:pic>
-    </p:spTree>
-    <p:extLst>
-      <p:ext uri="{BB962C8B-B14F-4D97-AF65-F5344CB8AC3E}">
-        <p14:creationId xmlns:p14="http://schemas.microsoft.com/office/powerpoint/2010/main" val="3558263030"/>
-      </p:ext>
-    </p:extLst>
-  </p:cSld>
-  <p:clrMapOvr>
-    <a:masterClrMapping/>
-  </p:clrMapOvr>
-</p:sld>
-</file>
-
-<file path=ppt/slides/slide6.xml><?xml version="1.0" encoding="utf-8"?>
 <p:sld xmlns:a="http://schemas.openxmlformats.org/drawingml/2006/main" xmlns:r="http://schemas.openxmlformats.org/officeDocument/2006/relationships" xmlns:p="http://schemas.openxmlformats.org/presentationml/2006/main">
   <p:cSld>
     <p:spTree>
@@ -18261,7 +18549,195 @@
 </p:sld>
 </file>
 
-<file path=ppt/slides/slide7.xml><?xml version="1.0" encoding="utf-8"?>
+<file path=ppt/slides/slide5.xml><?xml version="1.0" encoding="utf-8"?>
+<p:sld xmlns:a="http://schemas.openxmlformats.org/drawingml/2006/main" xmlns:r="http://schemas.openxmlformats.org/officeDocument/2006/relationships" xmlns:p="http://schemas.openxmlformats.org/presentationml/2006/main">
+  <p:cSld>
+    <p:spTree>
+      <p:nvGrpSpPr>
+        <p:cNvPr id="1" name=""/>
+        <p:cNvGrpSpPr/>
+        <p:nvPr/>
+      </p:nvGrpSpPr>
+      <p:grpSpPr>
+        <a:xfrm>
+          <a:off x="0" y="0"/>
+          <a:ext cx="0" cy="0"/>
+          <a:chOff x="0" y="0"/>
+          <a:chExt cx="0" cy="0"/>
+        </a:xfrm>
+      </p:grpSpPr>
+      <p:sp>
+        <p:nvSpPr>
+          <p:cNvPr id="4" name="Title 3"/>
+          <p:cNvSpPr>
+            <a:spLocks noGrp="1"/>
+          </p:cNvSpPr>
+          <p:nvPr>
+            <p:ph type="title"/>
+          </p:nvPr>
+        </p:nvSpPr>
+        <p:spPr/>
+        <p:txBody>
+          <a:bodyPr>
+            <a:normAutofit fontScale="90000"/>
+          </a:bodyPr>
+          <a:lstStyle/>
+          <a:p>
+            <a:r>
+              <a:rPr lang="en-US" dirty="0" err="1"/>
+              <a:t>Constantes</a:t>
+            </a:r>
+            <a:r>
+              <a:rPr lang="en-US" dirty="0"/>
+              <a:t> </a:t>
+            </a:r>
+            <a:r>
+              <a:rPr lang="en-US" dirty="0" err="1"/>
+              <a:t>independente</a:t>
+            </a:r>
+            <a:r>
+              <a:rPr lang="en-US" dirty="0"/>
+              <a:t> das </a:t>
+            </a:r>
+            <a:r>
+              <a:rPr lang="en-US" dirty="0" err="1"/>
+              <a:t>Tendências</a:t>
+            </a:r>
+            <a:r>
+              <a:rPr lang="en-US" dirty="0"/>
+              <a:t> </a:t>
+            </a:r>
+            <a:r>
+              <a:rPr lang="en-US" dirty="0" err="1"/>
+              <a:t>Tecnológicas</a:t>
+            </a:r>
+            <a:r>
+              <a:rPr lang="en-US" dirty="0"/>
+              <a:t> dos </a:t>
+            </a:r>
+            <a:r>
+              <a:rPr lang="en-US" dirty="0" err="1"/>
+              <a:t>últimos</a:t>
+            </a:r>
+            <a:r>
+              <a:rPr lang="en-US" dirty="0"/>
+              <a:t> </a:t>
+            </a:r>
+            <a:r>
+              <a:rPr lang="en-US" dirty="0" err="1"/>
+              <a:t>anos</a:t>
+            </a:r>
+            <a:endParaRPr lang="en-US" dirty="0"/>
+          </a:p>
+        </p:txBody>
+      </p:sp>
+      <p:sp>
+        <p:nvSpPr>
+          <p:cNvPr id="5" name="Content Placeholder 4"/>
+          <p:cNvSpPr>
+            <a:spLocks noGrp="1"/>
+          </p:cNvSpPr>
+          <p:nvPr>
+            <p:ph sz="quarter" idx="10"/>
+          </p:nvPr>
+        </p:nvSpPr>
+        <p:spPr/>
+        <p:txBody>
+          <a:bodyPr/>
+          <a:lstStyle/>
+          <a:p>
+            <a:r>
+              <a:rPr lang="pt-BR" dirty="0"/>
+              <a:t>Estamos no centro de uma transformação</a:t>
+            </a:r>
+          </a:p>
+          <a:p>
+            <a:pPr lvl="1"/>
+            <a:r>
+              <a:rPr lang="pt-BR" dirty="0"/>
+              <a:t>Mainframe</a:t>
+            </a:r>
+          </a:p>
+          <a:p>
+            <a:pPr lvl="1"/>
+            <a:r>
+              <a:rPr lang="pt-BR" dirty="0"/>
+              <a:t>Client-Server</a:t>
+            </a:r>
+          </a:p>
+          <a:p>
+            <a:pPr lvl="1"/>
+            <a:r>
+              <a:rPr lang="pt-BR" dirty="0"/>
+              <a:t>SOA</a:t>
+            </a:r>
+          </a:p>
+          <a:p>
+            <a:pPr lvl="1"/>
+            <a:r>
+              <a:rPr lang="pt-BR" dirty="0"/>
+              <a:t>Internet</a:t>
+            </a:r>
+          </a:p>
+          <a:p>
+            <a:r>
+              <a:rPr lang="pt-BR" dirty="0"/>
+              <a:t>Disrupção Tecnologica</a:t>
+            </a:r>
+          </a:p>
+          <a:p>
+            <a:pPr lvl="1"/>
+            <a:r>
+              <a:rPr lang="pt-BR" dirty="0"/>
+              <a:t>Produtividade</a:t>
+            </a:r>
+          </a:p>
+          <a:p>
+            <a:r>
+              <a:rPr lang="pt-BR" dirty="0"/>
+              <a:t>Disrupção dos Negócios</a:t>
+            </a:r>
+          </a:p>
+          <a:p>
+            <a:pPr lvl="1"/>
+            <a:r>
+              <a:rPr lang="pt-BR" dirty="0"/>
+              <a:t>Agilidade</a:t>
+            </a:r>
+          </a:p>
+          <a:p>
+            <a:r>
+              <a:rPr lang="en-US" dirty="0"/>
+              <a:t>Software</a:t>
+            </a:r>
+          </a:p>
+          <a:p>
+            <a:r>
+              <a:rPr lang="en-US" dirty="0" err="1"/>
+              <a:t>Infraestrutura</a:t>
+            </a:r>
+            <a:endParaRPr lang="en-US" dirty="0"/>
+          </a:p>
+          <a:p>
+            <a:pPr lvl="1"/>
+            <a:endParaRPr lang="en-US" dirty="0"/>
+          </a:p>
+        </p:txBody>
+      </p:sp>
+    </p:spTree>
+    <p:extLst>
+      <p:ext uri="{BB962C8B-B14F-4D97-AF65-F5344CB8AC3E}">
+        <p14:creationId xmlns:p14="http://schemas.microsoft.com/office/powerpoint/2010/main" val="1946340493"/>
+      </p:ext>
+    </p:extLst>
+  </p:cSld>
+  <p:clrMapOvr>
+    <a:masterClrMapping/>
+  </p:clrMapOvr>
+</p:sld>
+</file>
+
+<file path=ppt/slides/slide6.xml><?xml version="1.0" encoding="utf-8"?>
 <p:sld xmlns:a="http://schemas.openxmlformats.org/drawingml/2006/main" xmlns:r="http://schemas.openxmlformats.org/officeDocument/2006/relationships" xmlns:p="http://schemas.openxmlformats.org/presentationml/2006/main">
   <p:cSld>
     <p:spTree>
@@ -18384,6 +18860,902 @@
 </p:sld>
 </file>
 
+<file path=ppt/slides/slide7.xml><?xml version="1.0" encoding="utf-8"?>
+<p:sld xmlns:a="http://schemas.openxmlformats.org/drawingml/2006/main" xmlns:r="http://schemas.openxmlformats.org/officeDocument/2006/relationships" xmlns:p="http://schemas.openxmlformats.org/presentationml/2006/main">
+  <p:cSld>
+    <p:spTree>
+      <p:nvGrpSpPr>
+        <p:cNvPr id="1" name=""/>
+        <p:cNvGrpSpPr/>
+        <p:nvPr/>
+      </p:nvGrpSpPr>
+      <p:grpSpPr>
+        <a:xfrm>
+          <a:off x="0" y="0"/>
+          <a:ext cx="0" cy="0"/>
+          <a:chOff x="0" y="0"/>
+          <a:chExt cx="0" cy="0"/>
+        </a:xfrm>
+      </p:grpSpPr>
+      <p:sp>
+        <p:nvSpPr>
+          <p:cNvPr id="4" name="Title 3">
+            <a:extLst>
+              <a:ext uri="{FF2B5EF4-FFF2-40B4-BE49-F238E27FC236}">
+                <a16:creationId xmlns:a16="http://schemas.microsoft.com/office/drawing/2014/main" id="{8E3FEC22-483E-474D-B11B-331B7FBA5D77}"/>
+              </a:ext>
+            </a:extLst>
+          </p:cNvPr>
+          <p:cNvSpPr>
+            <a:spLocks noGrp="1"/>
+          </p:cNvSpPr>
+          <p:nvPr>
+            <p:ph type="title"/>
+          </p:nvPr>
+        </p:nvSpPr>
+        <p:spPr/>
+        <p:txBody>
+          <a:bodyPr/>
+          <a:lstStyle/>
+          <a:p>
+            <a:r>
+              <a:rPr lang="en-US" dirty="0" err="1"/>
+              <a:t>Maior</a:t>
+            </a:r>
+            <a:r>
+              <a:rPr lang="en-US" dirty="0"/>
+              <a:t> </a:t>
+            </a:r>
+            <a:r>
+              <a:rPr lang="en-US" dirty="0" err="1"/>
+              <a:t>evolução</a:t>
+            </a:r>
+            <a:r>
+              <a:rPr lang="en-US" dirty="0"/>
+              <a:t> </a:t>
+            </a:r>
+            <a:r>
+              <a:rPr lang="en-US" dirty="0" err="1"/>
+              <a:t>na</a:t>
+            </a:r>
+            <a:r>
+              <a:rPr lang="en-US" dirty="0"/>
+              <a:t> </a:t>
+            </a:r>
+            <a:r>
+              <a:rPr lang="en-US" dirty="0" err="1"/>
+              <a:t>computação</a:t>
+            </a:r>
+            <a:endParaRPr lang="en-US" dirty="0"/>
+          </a:p>
+        </p:txBody>
+      </p:sp>
+      <p:sp>
+        <p:nvSpPr>
+          <p:cNvPr id="5" name="Content Placeholder 4">
+            <a:extLst>
+              <a:ext uri="{FF2B5EF4-FFF2-40B4-BE49-F238E27FC236}">
+                <a16:creationId xmlns:a16="http://schemas.microsoft.com/office/drawing/2014/main" id="{FC12F862-2325-47C0-9036-110452A579F6}"/>
+              </a:ext>
+            </a:extLst>
+          </p:cNvPr>
+          <p:cNvSpPr>
+            <a:spLocks noGrp="1"/>
+          </p:cNvSpPr>
+          <p:nvPr>
+            <p:ph sz="quarter" idx="10"/>
+          </p:nvPr>
+        </p:nvSpPr>
+        <p:spPr/>
+        <p:txBody>
+          <a:bodyPr/>
+          <a:lstStyle/>
+          <a:p>
+            <a:r>
+              <a:rPr lang="en-US" dirty="0" err="1"/>
+              <a:t>Maior</a:t>
+            </a:r>
+            <a:r>
+              <a:rPr lang="en-US" dirty="0"/>
+              <a:t> </a:t>
+            </a:r>
+            <a:r>
+              <a:rPr lang="en-US" dirty="0" err="1"/>
+              <a:t>evolução</a:t>
+            </a:r>
+            <a:r>
+              <a:rPr lang="en-US" dirty="0"/>
+              <a:t> </a:t>
+            </a:r>
+            <a:r>
+              <a:rPr lang="en-US" dirty="0" err="1"/>
+              <a:t>em</a:t>
+            </a:r>
+            <a:r>
+              <a:rPr lang="en-US" dirty="0"/>
+              <a:t> </a:t>
+            </a:r>
+            <a:r>
+              <a:rPr lang="en-US" dirty="0" err="1"/>
+              <a:t>computação</a:t>
+            </a:r>
+            <a:r>
+              <a:rPr lang="en-US" dirty="0"/>
+              <a:t>;</a:t>
+            </a:r>
+          </a:p>
+          <a:p>
+            <a:pPr lvl="1"/>
+            <a:r>
+              <a:rPr lang="en-US" dirty="0" err="1"/>
+              <a:t>Objetivo</a:t>
+            </a:r>
+            <a:r>
+              <a:rPr lang="en-US" dirty="0"/>
+              <a:t> </a:t>
+            </a:r>
+            <a:r>
+              <a:rPr lang="en-US" dirty="0" err="1"/>
+              <a:t>comum</a:t>
+            </a:r>
+            <a:r>
+              <a:rPr lang="en-US" dirty="0"/>
+              <a:t> de </a:t>
+            </a:r>
+            <a:r>
+              <a:rPr lang="en-US" dirty="0" err="1"/>
+              <a:t>todos</a:t>
+            </a:r>
+            <a:r>
+              <a:rPr lang="en-US" dirty="0"/>
+              <a:t> </a:t>
+            </a:r>
+            <a:r>
+              <a:rPr lang="en-US" dirty="0" err="1"/>
+              <a:t>os</a:t>
+            </a:r>
+            <a:r>
+              <a:rPr lang="en-US" dirty="0"/>
+              <a:t> </a:t>
+            </a:r>
+            <a:r>
+              <a:rPr lang="en-US" dirty="0" err="1"/>
+              <a:t>modelos</a:t>
+            </a:r>
+            <a:r>
+              <a:rPr lang="en-US" dirty="0"/>
+              <a:t> </a:t>
+            </a:r>
+            <a:r>
+              <a:rPr lang="en-US" dirty="0" err="1"/>
+              <a:t>computacionais</a:t>
+            </a:r>
+            <a:r>
+              <a:rPr lang="en-US" dirty="0"/>
+              <a:t> </a:t>
+            </a:r>
+            <a:r>
+              <a:rPr lang="en-US" dirty="0" err="1"/>
+              <a:t>anteriores</a:t>
+            </a:r>
+            <a:endParaRPr lang="en-US" dirty="0"/>
+          </a:p>
+          <a:p>
+            <a:pPr lvl="1"/>
+            <a:r>
+              <a:rPr lang="en-US" dirty="0" err="1"/>
+              <a:t>Contextualizar</a:t>
+            </a:r>
+            <a:r>
+              <a:rPr lang="en-US" dirty="0"/>
+              <a:t> o </a:t>
+            </a:r>
+            <a:r>
+              <a:rPr lang="en-US" dirty="0" err="1"/>
+              <a:t>crescimento</a:t>
+            </a:r>
+            <a:r>
+              <a:rPr lang="en-US" dirty="0"/>
+              <a:t> antes do </a:t>
+            </a:r>
+            <a:r>
+              <a:rPr lang="en-US" dirty="0" err="1"/>
+              <a:t>problema</a:t>
+            </a:r>
+            <a:endParaRPr lang="en-US" dirty="0"/>
+          </a:p>
+          <a:p>
+            <a:pPr lvl="1"/>
+            <a:r>
+              <a:rPr lang="en-US" dirty="0" err="1"/>
+              <a:t>Complexidade</a:t>
+            </a:r>
+            <a:r>
+              <a:rPr lang="en-US" dirty="0"/>
+              <a:t> dos Datacenters</a:t>
+            </a:r>
+          </a:p>
+          <a:p>
+            <a:pPr lvl="2"/>
+            <a:r>
+              <a:rPr lang="en-US" dirty="0"/>
+              <a:t>Com </a:t>
+            </a:r>
+            <a:r>
+              <a:rPr lang="en-US" dirty="0" err="1"/>
+              <a:t>cada</a:t>
+            </a:r>
+            <a:r>
+              <a:rPr lang="en-US" dirty="0"/>
+              <a:t> </a:t>
+            </a:r>
+            <a:r>
+              <a:rPr lang="en-US" dirty="0" err="1"/>
+              <a:t>uma</a:t>
+            </a:r>
+            <a:r>
+              <a:rPr lang="en-US" dirty="0"/>
+              <a:t> das </a:t>
+            </a:r>
+            <a:r>
+              <a:rPr lang="en-US" dirty="0" err="1"/>
+              <a:t>transições</a:t>
+            </a:r>
+            <a:r>
+              <a:rPr lang="en-US" dirty="0"/>
+              <a:t> de </a:t>
+            </a:r>
+            <a:r>
+              <a:rPr lang="en-US" dirty="0" err="1"/>
+              <a:t>estilos</a:t>
+            </a:r>
+            <a:r>
+              <a:rPr lang="en-US" dirty="0"/>
+              <a:t> </a:t>
+            </a:r>
+            <a:r>
+              <a:rPr lang="en-US" dirty="0" err="1"/>
+              <a:t>computacionais</a:t>
+            </a:r>
+            <a:r>
+              <a:rPr lang="en-US" dirty="0"/>
+              <a:t> </a:t>
+            </a:r>
+            <a:r>
+              <a:rPr lang="en-US" dirty="0" err="1"/>
+              <a:t>mencionadas</a:t>
+            </a:r>
+            <a:r>
+              <a:rPr lang="en-US" dirty="0"/>
+              <a:t>, </a:t>
+            </a:r>
+            <a:r>
+              <a:rPr lang="en-US" dirty="0" err="1"/>
+              <a:t>vieram</a:t>
+            </a:r>
+            <a:r>
+              <a:rPr lang="en-US" dirty="0"/>
+              <a:t> </a:t>
+            </a:r>
+            <a:r>
+              <a:rPr lang="en-US" dirty="0" err="1"/>
+              <a:t>também</a:t>
+            </a:r>
+            <a:r>
+              <a:rPr lang="en-US" dirty="0"/>
+              <a:t> </a:t>
+            </a:r>
+            <a:r>
+              <a:rPr lang="en-US" dirty="0" err="1"/>
+              <a:t>suas</a:t>
+            </a:r>
+            <a:r>
+              <a:rPr lang="en-US" dirty="0"/>
+              <a:t> </a:t>
+            </a:r>
+            <a:r>
+              <a:rPr lang="en-US" dirty="0" err="1"/>
+              <a:t>complexidades</a:t>
+            </a:r>
+            <a:r>
+              <a:rPr lang="en-US" dirty="0"/>
+              <a:t> </a:t>
+            </a:r>
+            <a:r>
+              <a:rPr lang="en-US" dirty="0" err="1"/>
+              <a:t>inerentes</a:t>
+            </a:r>
+            <a:r>
+              <a:rPr lang="en-US" dirty="0"/>
+              <a:t>;</a:t>
+            </a:r>
+          </a:p>
+          <a:p>
+            <a:pPr lvl="2"/>
+            <a:r>
+              <a:rPr lang="en-US" dirty="0" err="1"/>
+              <a:t>Esse</a:t>
+            </a:r>
+            <a:r>
+              <a:rPr lang="en-US" dirty="0"/>
+              <a:t> </a:t>
+            </a:r>
+            <a:r>
+              <a:rPr lang="en-US" dirty="0" err="1"/>
+              <a:t>crescimento</a:t>
+            </a:r>
+            <a:r>
+              <a:rPr lang="en-US" dirty="0"/>
+              <a:t> </a:t>
+            </a:r>
+            <a:r>
+              <a:rPr lang="en-US" dirty="0" err="1"/>
+              <a:t>computacional</a:t>
+            </a:r>
+            <a:r>
+              <a:rPr lang="en-US" dirty="0"/>
+              <a:t> é o que </a:t>
+            </a:r>
+            <a:r>
+              <a:rPr lang="en-US" dirty="0" err="1"/>
+              <a:t>permitiu</a:t>
+            </a:r>
+            <a:r>
+              <a:rPr lang="en-US" dirty="0"/>
+              <a:t> o </a:t>
+            </a:r>
+            <a:r>
+              <a:rPr lang="en-US" dirty="0" err="1"/>
+              <a:t>grande</a:t>
+            </a:r>
+            <a:r>
+              <a:rPr lang="en-US" dirty="0"/>
+              <a:t> volume de </a:t>
+            </a:r>
+            <a:r>
+              <a:rPr lang="en-US" dirty="0" err="1"/>
+              <a:t>acesso</a:t>
+            </a:r>
+            <a:r>
+              <a:rPr lang="en-US" dirty="0"/>
+              <a:t> as </a:t>
+            </a:r>
+            <a:r>
+              <a:rPr lang="en-US" dirty="0" err="1"/>
+              <a:t>soluções</a:t>
+            </a:r>
+            <a:r>
+              <a:rPr lang="en-US" dirty="0"/>
+              <a:t> que </a:t>
+            </a:r>
+            <a:r>
+              <a:rPr lang="en-US" dirty="0" err="1"/>
+              <a:t>temos</a:t>
+            </a:r>
+            <a:r>
+              <a:rPr lang="en-US" dirty="0"/>
+              <a:t> </a:t>
+            </a:r>
+            <a:r>
+              <a:rPr lang="en-US" dirty="0" err="1"/>
+              <a:t>hoje</a:t>
+            </a:r>
+            <a:r>
+              <a:rPr lang="en-US" dirty="0"/>
+              <a:t>. Mas </a:t>
+            </a:r>
+            <a:r>
+              <a:rPr lang="en-US" dirty="0" err="1"/>
+              <a:t>esse</a:t>
+            </a:r>
+            <a:r>
+              <a:rPr lang="en-US" dirty="0"/>
+              <a:t> </a:t>
+            </a:r>
+            <a:r>
+              <a:rPr lang="en-US" dirty="0" err="1"/>
+              <a:t>crescimento</a:t>
+            </a:r>
+            <a:r>
+              <a:rPr lang="en-US" dirty="0"/>
+              <a:t> </a:t>
+            </a:r>
+            <a:r>
+              <a:rPr lang="en-US" dirty="0" err="1"/>
+              <a:t>teve</a:t>
+            </a:r>
+            <a:r>
+              <a:rPr lang="en-US" dirty="0"/>
+              <a:t> um </a:t>
+            </a:r>
+            <a:r>
+              <a:rPr lang="en-US" dirty="0" err="1"/>
+              <a:t>custo</a:t>
+            </a:r>
+            <a:r>
+              <a:rPr lang="en-US" dirty="0"/>
+              <a:t>.</a:t>
+            </a:r>
+          </a:p>
+          <a:p>
+            <a:pPr lvl="3"/>
+            <a:r>
+              <a:rPr lang="en-US" dirty="0" err="1"/>
+              <a:t>Computação</a:t>
+            </a:r>
+            <a:r>
+              <a:rPr lang="en-US" dirty="0"/>
+              <a:t> </a:t>
+            </a:r>
+            <a:r>
+              <a:rPr lang="en-US" dirty="0" err="1"/>
+              <a:t>em</a:t>
+            </a:r>
+            <a:r>
+              <a:rPr lang="en-US" dirty="0"/>
+              <a:t> </a:t>
+            </a:r>
+            <a:r>
+              <a:rPr lang="en-US" dirty="0" err="1"/>
+              <a:t>Nuvem</a:t>
+            </a:r>
+            <a:r>
+              <a:rPr lang="en-US" dirty="0"/>
+              <a:t> </a:t>
+            </a:r>
+            <a:r>
+              <a:rPr lang="en-US" dirty="0" err="1"/>
+              <a:t>Não</a:t>
+            </a:r>
+            <a:r>
+              <a:rPr lang="en-US" dirty="0"/>
+              <a:t> </a:t>
+            </a:r>
+            <a:r>
+              <a:rPr lang="en-US" dirty="0" err="1"/>
+              <a:t>veio</a:t>
+            </a:r>
+            <a:r>
+              <a:rPr lang="en-US" dirty="0"/>
+              <a:t> </a:t>
+            </a:r>
+            <a:r>
+              <a:rPr lang="en-US" dirty="0" err="1"/>
+              <a:t>Sozinha</a:t>
+            </a:r>
+            <a:r>
+              <a:rPr lang="en-US" dirty="0"/>
+              <a:t> </a:t>
+            </a:r>
+          </a:p>
+          <a:p>
+            <a:pPr lvl="4"/>
+            <a:r>
+              <a:rPr lang="en-US" dirty="0" err="1"/>
+              <a:t>Evoluções</a:t>
+            </a:r>
+            <a:r>
+              <a:rPr lang="en-US" dirty="0"/>
+              <a:t> </a:t>
+            </a:r>
+            <a:r>
+              <a:rPr lang="en-US" dirty="0" err="1"/>
+              <a:t>em</a:t>
+            </a:r>
+            <a:r>
+              <a:rPr lang="en-US" dirty="0"/>
+              <a:t> </a:t>
+            </a:r>
+            <a:r>
+              <a:rPr lang="en-US" dirty="0" err="1"/>
+              <a:t>todos</a:t>
+            </a:r>
+            <a:r>
+              <a:rPr lang="en-US" dirty="0"/>
+              <a:t> </a:t>
+            </a:r>
+            <a:r>
+              <a:rPr lang="en-US" dirty="0" err="1"/>
+              <a:t>os</a:t>
+            </a:r>
+            <a:r>
+              <a:rPr lang="en-US" dirty="0"/>
+              <a:t> </a:t>
+            </a:r>
+            <a:r>
+              <a:rPr lang="en-US" dirty="0" err="1"/>
+              <a:t>aspectos</a:t>
+            </a:r>
+            <a:r>
+              <a:rPr lang="en-US" dirty="0"/>
+              <a:t> </a:t>
+            </a:r>
+            <a:r>
+              <a:rPr lang="en-US" dirty="0" err="1"/>
+              <a:t>computacionais</a:t>
+            </a:r>
+            <a:r>
+              <a:rPr lang="en-US" dirty="0"/>
+              <a:t> e stacks que </a:t>
+            </a:r>
+            <a:r>
+              <a:rPr lang="en-US" dirty="0" err="1"/>
+              <a:t>compõem</a:t>
+            </a:r>
+            <a:r>
+              <a:rPr lang="en-US" dirty="0"/>
+              <a:t> um </a:t>
+            </a:r>
+            <a:r>
+              <a:rPr lang="en-US" dirty="0" err="1"/>
+              <a:t>computador</a:t>
+            </a:r>
+            <a:r>
+              <a:rPr lang="en-US" dirty="0"/>
+              <a:t>, </a:t>
+            </a:r>
+            <a:r>
+              <a:rPr lang="en-US" dirty="0" err="1"/>
+              <a:t>servidor</a:t>
+            </a:r>
+            <a:r>
+              <a:rPr lang="en-US" dirty="0"/>
+              <a:t> </a:t>
+            </a:r>
+            <a:r>
+              <a:rPr lang="en-US" dirty="0" err="1"/>
+              <a:t>ou</a:t>
+            </a:r>
+            <a:r>
+              <a:rPr lang="en-US" dirty="0"/>
+              <a:t> </a:t>
+            </a:r>
+            <a:r>
+              <a:rPr lang="en-US" dirty="0" err="1"/>
+              <a:t>mesmo</a:t>
+            </a:r>
+            <a:r>
+              <a:rPr lang="en-US" dirty="0"/>
+              <a:t> um datacenter </a:t>
+            </a:r>
+            <a:r>
+              <a:rPr lang="en-US" dirty="0" err="1"/>
+              <a:t>inteiro</a:t>
+            </a:r>
+            <a:r>
+              <a:rPr lang="en-US" dirty="0"/>
+              <a:t> </a:t>
+            </a:r>
+            <a:r>
+              <a:rPr lang="en-US" dirty="0" err="1"/>
+              <a:t>como</a:t>
+            </a:r>
+            <a:r>
+              <a:rPr lang="en-US" dirty="0"/>
+              <a:t>: </a:t>
+            </a:r>
+            <a:r>
+              <a:rPr lang="en-US" b="1" dirty="0" err="1"/>
+              <a:t>Computação</a:t>
+            </a:r>
+            <a:r>
+              <a:rPr lang="en-US" b="1" dirty="0"/>
+              <a:t> (</a:t>
+            </a:r>
+            <a:r>
+              <a:rPr lang="en-US" b="1" dirty="0" err="1"/>
+              <a:t>processadores</a:t>
+            </a:r>
+            <a:r>
+              <a:rPr lang="en-US" b="1" dirty="0"/>
+              <a:t>),</a:t>
+            </a:r>
+            <a:r>
+              <a:rPr lang="en-US" dirty="0"/>
+              <a:t> </a:t>
+            </a:r>
+            <a:r>
+              <a:rPr lang="en-US" b="1" dirty="0"/>
+              <a:t>Rede, Storage, </a:t>
+            </a:r>
+            <a:r>
+              <a:rPr lang="en-US" b="1" dirty="0" err="1"/>
+              <a:t>Servidores</a:t>
+            </a:r>
+            <a:r>
+              <a:rPr lang="en-US" b="1" dirty="0"/>
+              <a:t>, </a:t>
+            </a:r>
+            <a:r>
+              <a:rPr lang="en-US" b="1" dirty="0" err="1"/>
+              <a:t>Virtualização</a:t>
+            </a:r>
+            <a:r>
+              <a:rPr lang="en-US" b="1" dirty="0"/>
+              <a:t>, SO (</a:t>
+            </a:r>
+            <a:r>
+              <a:rPr lang="en-US" b="1" dirty="0" err="1"/>
+              <a:t>Escala</a:t>
+            </a:r>
+            <a:r>
+              <a:rPr lang="en-US" b="1" dirty="0"/>
+              <a:t> de DC-Hardware), </a:t>
+            </a:r>
+            <a:r>
+              <a:rPr lang="en-US" b="1" dirty="0" err="1"/>
+              <a:t>Gestão</a:t>
+            </a:r>
+            <a:r>
+              <a:rPr lang="en-US" b="1" dirty="0"/>
+              <a:t> (</a:t>
+            </a:r>
+            <a:r>
+              <a:rPr lang="en-US" b="1" dirty="0" err="1"/>
+              <a:t>Controlado</a:t>
+            </a:r>
+            <a:r>
+              <a:rPr lang="en-US" b="1" dirty="0"/>
+              <a:t> </a:t>
+            </a:r>
+            <a:r>
+              <a:rPr lang="en-US" b="1" dirty="0" err="1"/>
+              <a:t>por</a:t>
+            </a:r>
+            <a:r>
+              <a:rPr lang="en-US" b="1" dirty="0"/>
+              <a:t> software) etc</a:t>
+            </a:r>
+            <a:r>
+              <a:rPr lang="en-US" dirty="0"/>
+              <a:t>.</a:t>
+            </a:r>
+          </a:p>
+          <a:p>
+            <a:pPr lvl="2"/>
+            <a:r>
+              <a:rPr lang="en-US" dirty="0" err="1"/>
+              <a:t>Os</a:t>
+            </a:r>
+            <a:r>
+              <a:rPr lang="en-US" dirty="0"/>
+              <a:t> datacenters das </a:t>
+            </a:r>
+            <a:r>
+              <a:rPr lang="en-US" dirty="0" err="1"/>
+              <a:t>empresas</a:t>
+            </a:r>
+            <a:r>
+              <a:rPr lang="en-US" dirty="0"/>
+              <a:t> </a:t>
+            </a:r>
+            <a:r>
+              <a:rPr lang="en-US" dirty="0" err="1"/>
+              <a:t>atingiram</a:t>
+            </a:r>
+            <a:r>
+              <a:rPr lang="en-US" dirty="0"/>
+              <a:t> </a:t>
+            </a:r>
+            <a:r>
+              <a:rPr lang="en-US" dirty="0" err="1"/>
+              <a:t>seu</a:t>
+            </a:r>
+            <a:r>
+              <a:rPr lang="en-US" dirty="0"/>
+              <a:t> </a:t>
+            </a:r>
+            <a:r>
+              <a:rPr lang="en-US" dirty="0" err="1"/>
+              <a:t>potencial</a:t>
+            </a:r>
+            <a:r>
+              <a:rPr lang="en-US" dirty="0"/>
+              <a:t> </a:t>
+            </a:r>
+            <a:r>
+              <a:rPr lang="en-US" dirty="0" err="1"/>
+              <a:t>máximo</a:t>
+            </a:r>
+            <a:r>
+              <a:rPr lang="en-US" dirty="0"/>
+              <a:t> e </a:t>
+            </a:r>
+            <a:r>
+              <a:rPr lang="en-US" dirty="0" err="1"/>
+              <a:t>crescer</a:t>
+            </a:r>
+            <a:r>
+              <a:rPr lang="en-US" dirty="0"/>
+              <a:t> </a:t>
+            </a:r>
+            <a:r>
+              <a:rPr lang="en-US" dirty="0" err="1"/>
+              <a:t>além</a:t>
+            </a:r>
+            <a:r>
+              <a:rPr lang="en-US" dirty="0"/>
+              <a:t> </a:t>
+            </a:r>
+            <a:r>
+              <a:rPr lang="en-US" dirty="0" err="1"/>
+              <a:t>disso</a:t>
+            </a:r>
+            <a:r>
+              <a:rPr lang="en-US" dirty="0"/>
+              <a:t>, </a:t>
+            </a:r>
+            <a:r>
+              <a:rPr lang="en-US" dirty="0" err="1"/>
+              <a:t>atendendo</a:t>
+            </a:r>
+            <a:r>
+              <a:rPr lang="en-US" dirty="0"/>
+              <a:t> as </a:t>
+            </a:r>
+            <a:r>
+              <a:rPr lang="en-US" dirty="0" err="1"/>
+              <a:t>demandas</a:t>
+            </a:r>
+            <a:r>
+              <a:rPr lang="en-US" dirty="0"/>
+              <a:t> de </a:t>
+            </a:r>
+            <a:r>
+              <a:rPr lang="en-US" dirty="0" err="1"/>
+              <a:t>negócios</a:t>
+            </a:r>
+            <a:r>
+              <a:rPr lang="en-US" dirty="0"/>
+              <a:t> </a:t>
+            </a:r>
+            <a:r>
+              <a:rPr lang="en-US" dirty="0" err="1"/>
+              <a:t>na</a:t>
+            </a:r>
+            <a:r>
+              <a:rPr lang="en-US" dirty="0"/>
+              <a:t> era da Internet, </a:t>
+            </a:r>
+            <a:r>
+              <a:rPr lang="en-US" dirty="0" err="1"/>
+              <a:t>requer</a:t>
+            </a:r>
+            <a:r>
+              <a:rPr lang="en-US" dirty="0"/>
+              <a:t> </a:t>
+            </a:r>
+            <a:r>
+              <a:rPr lang="en-US" dirty="0" err="1"/>
+              <a:t>uma</a:t>
+            </a:r>
+            <a:r>
+              <a:rPr lang="en-US" dirty="0"/>
+              <a:t> </a:t>
+            </a:r>
+            <a:r>
+              <a:rPr lang="en-US" dirty="0" err="1"/>
+              <a:t>ruptura</a:t>
+            </a:r>
+            <a:r>
+              <a:rPr lang="en-US" dirty="0"/>
+              <a:t> no </a:t>
+            </a:r>
+            <a:r>
+              <a:rPr lang="en-US" dirty="0" err="1"/>
+              <a:t>modelo</a:t>
+            </a:r>
+            <a:r>
+              <a:rPr lang="en-US" dirty="0"/>
+              <a:t> </a:t>
+            </a:r>
+            <a:r>
+              <a:rPr lang="en-US" dirty="0" err="1"/>
+              <a:t>atual</a:t>
+            </a:r>
+            <a:r>
+              <a:rPr lang="en-US" dirty="0"/>
+              <a:t> de </a:t>
+            </a:r>
+            <a:r>
+              <a:rPr lang="en-US" dirty="0" err="1"/>
+              <a:t>computação</a:t>
+            </a:r>
+            <a:r>
+              <a:rPr lang="en-US" dirty="0"/>
+              <a:t>. </a:t>
+            </a:r>
+            <a:r>
+              <a:rPr lang="en-US" dirty="0" err="1"/>
+              <a:t>Ruptura</a:t>
+            </a:r>
+            <a:r>
+              <a:rPr lang="en-US" dirty="0"/>
+              <a:t> </a:t>
+            </a:r>
+            <a:r>
+              <a:rPr lang="en-US" dirty="0" err="1"/>
+              <a:t>essa</a:t>
+            </a:r>
+            <a:r>
+              <a:rPr lang="en-US" dirty="0"/>
+              <a:t>, </a:t>
+            </a:r>
+            <a:r>
+              <a:rPr lang="en-US" dirty="0" err="1"/>
+              <a:t>chamada</a:t>
+            </a:r>
+            <a:r>
+              <a:rPr lang="en-US" dirty="0"/>
+              <a:t> </a:t>
+            </a:r>
+            <a:r>
+              <a:rPr lang="en-US" dirty="0" err="1"/>
+              <a:t>pelo</a:t>
+            </a:r>
+            <a:r>
+              <a:rPr lang="en-US" dirty="0"/>
+              <a:t> Mercado de </a:t>
+            </a:r>
+            <a:r>
+              <a:rPr lang="en-US" dirty="0" err="1"/>
+              <a:t>Computação</a:t>
+            </a:r>
+            <a:r>
+              <a:rPr lang="en-US" dirty="0"/>
+              <a:t> </a:t>
+            </a:r>
+            <a:r>
+              <a:rPr lang="en-US" dirty="0" err="1"/>
+              <a:t>em</a:t>
+            </a:r>
+            <a:r>
+              <a:rPr lang="en-US" dirty="0"/>
+              <a:t> </a:t>
+            </a:r>
+            <a:r>
+              <a:rPr lang="en-US" dirty="0" err="1"/>
+              <a:t>Nuvem</a:t>
+            </a:r>
+            <a:r>
+              <a:rPr lang="en-US" dirty="0"/>
+              <a:t>.</a:t>
+            </a:r>
+          </a:p>
+          <a:p>
+            <a:pPr lvl="1"/>
+            <a:r>
+              <a:rPr lang="en-US" dirty="0"/>
+              <a:t>Estrada para a </a:t>
+            </a:r>
+            <a:r>
+              <a:rPr lang="en-US" dirty="0" err="1"/>
+              <a:t>Transformação</a:t>
+            </a:r>
+            <a:r>
+              <a:rPr lang="en-US" dirty="0"/>
+              <a:t> Digital</a:t>
+            </a:r>
+          </a:p>
+          <a:p>
+            <a:pPr lvl="2"/>
+            <a:endParaRPr lang="en-US" dirty="0"/>
+          </a:p>
+        </p:txBody>
+      </p:sp>
+    </p:spTree>
+    <p:extLst>
+      <p:ext uri="{BB962C8B-B14F-4D97-AF65-F5344CB8AC3E}">
+        <p14:creationId xmlns:p14="http://schemas.microsoft.com/office/powerpoint/2010/main" val="2717185107"/>
+      </p:ext>
+    </p:extLst>
+  </p:cSld>
+  <p:clrMapOvr>
+    <a:masterClrMapping/>
+  </p:clrMapOvr>
+</p:sld>
+</file>
+
 <file path=ppt/slides/slide8.xml><?xml version="1.0" encoding="utf-8"?>
 <p:sld xmlns:a="http://schemas.openxmlformats.org/drawingml/2006/main" xmlns:r="http://schemas.openxmlformats.org/officeDocument/2006/relationships" xmlns:p="http://schemas.openxmlformats.org/presentationml/2006/main">
   <p:cSld>
@@ -18423,8 +19795,12 @@
           <a:lstStyle/>
           <a:p>
             <a:r>
+              <a:rPr lang="en-US" dirty="0"/>
+              <a:t>O que é </a:t>
+            </a:r>
+            <a:r>
               <a:rPr lang="en-US" dirty="0" err="1"/>
-              <a:t>Maior</a:t>
+              <a:t>Computação</a:t>
             </a:r>
             <a:r>
               <a:rPr lang="en-US" dirty="0"/>
@@ -18432,7 +19808,7 @@
             </a:r>
             <a:r>
               <a:rPr lang="en-US" dirty="0" err="1"/>
-              <a:t>evolução</a:t>
+              <a:t>em</a:t>
             </a:r>
             <a:r>
               <a:rPr lang="en-US" dirty="0"/>
@@ -18440,15 +19816,7 @@
             </a:r>
             <a:r>
               <a:rPr lang="en-US" dirty="0" err="1"/>
-              <a:t>na</a:t>
-            </a:r>
-            <a:r>
-              <a:rPr lang="en-US" dirty="0"/>
-              <a:t> </a:t>
-            </a:r>
-            <a:r>
-              <a:rPr lang="en-US" dirty="0" err="1"/>
-              <a:t>computação</a:t>
+              <a:t>Nuvem</a:t>
             </a:r>
             <a:endParaRPr lang="en-US" dirty="0"/>
           </a:p>
@@ -18476,8 +19844,12 @@
           <a:lstStyle/>
           <a:p>
             <a:r>
+              <a:rPr lang="en-US" dirty="0"/>
+              <a:t>Novo </a:t>
+            </a:r>
+            <a:r>
               <a:rPr lang="en-US" dirty="0" err="1"/>
-              <a:t>Maior</a:t>
+              <a:t>Paradigma</a:t>
             </a:r>
             <a:r>
               <a:rPr lang="en-US" dirty="0"/>
@@ -18485,7 +19857,98 @@
             </a:r>
             <a:r>
               <a:rPr lang="en-US" dirty="0" err="1"/>
-              <a:t>evolução</a:t>
+              <a:t>Computacional</a:t>
+            </a:r>
+            <a:endParaRPr lang="en-US" dirty="0"/>
+          </a:p>
+          <a:p>
+            <a:pPr lvl="2"/>
+            <a:r>
+              <a:rPr lang="en-US" dirty="0" err="1"/>
+              <a:t>Características</a:t>
+            </a:r>
+            <a:r>
+              <a:rPr lang="en-US" dirty="0"/>
+              <a:t>;</a:t>
+            </a:r>
+          </a:p>
+          <a:p>
+            <a:pPr lvl="2"/>
+            <a:r>
+              <a:rPr lang="en-US" dirty="0" err="1"/>
+              <a:t>Principios</a:t>
+            </a:r>
+            <a:r>
+              <a:rPr lang="en-US" dirty="0"/>
+              <a:t>;</a:t>
+            </a:r>
+          </a:p>
+          <a:p>
+            <a:pPr lvl="2"/>
+            <a:r>
+              <a:rPr lang="en-US" dirty="0" err="1"/>
+              <a:t>Paradigmas</a:t>
+            </a:r>
+            <a:r>
+              <a:rPr lang="en-US" dirty="0"/>
+              <a:t>;</a:t>
+            </a:r>
+          </a:p>
+          <a:p>
+            <a:pPr lvl="2"/>
+            <a:r>
+              <a:rPr lang="en-US" dirty="0" err="1"/>
+              <a:t>Modelos</a:t>
+            </a:r>
+            <a:r>
+              <a:rPr lang="en-US" dirty="0"/>
+              <a:t>;</a:t>
+            </a:r>
+          </a:p>
+          <a:p>
+            <a:r>
+              <a:rPr lang="en-US" dirty="0"/>
+              <a:t>Thomas </a:t>
+            </a:r>
+            <a:r>
+              <a:rPr lang="en-US" dirty="0" err="1"/>
+              <a:t>Erl</a:t>
+            </a:r>
+            <a:endParaRPr lang="en-US" dirty="0"/>
+          </a:p>
+          <a:p>
+            <a:pPr lvl="1"/>
+            <a:r>
+              <a:rPr lang="en-US" dirty="0"/>
+              <a:t>“Cloud Computing é um paradigm de design que </a:t>
+            </a:r>
+            <a:r>
+              <a:rPr lang="en-US" dirty="0" err="1"/>
+              <a:t>abrange</a:t>
+            </a:r>
+            <a:r>
+              <a:rPr lang="en-US" dirty="0"/>
+              <a:t> um conjunto </a:t>
+            </a:r>
+            <a:r>
+              <a:rPr lang="en-US" dirty="0" err="1"/>
+              <a:t>especifico</a:t>
+            </a:r>
+            <a:r>
+              <a:rPr lang="en-US" dirty="0"/>
+              <a:t> de </a:t>
+            </a:r>
+            <a:r>
+              <a:rPr lang="en-US" dirty="0" err="1"/>
+              <a:t>princípios</a:t>
+            </a:r>
+            <a:r>
+              <a:rPr lang="en-US" dirty="0"/>
+              <a:t> de design. A </a:t>
+            </a:r>
+            <a:r>
+              <a:rPr lang="en-US" dirty="0" err="1"/>
+              <a:t>aplicação</a:t>
             </a:r>
             <a:r>
               <a:rPr lang="en-US" dirty="0"/>
@@ -18493,7 +19956,7 @@
             </a:r>
             <a:r>
               <a:rPr lang="en-US" dirty="0" err="1"/>
-              <a:t>em</a:t>
+              <a:t>desses</a:t>
             </a:r>
             <a:r>
               <a:rPr lang="en-US" dirty="0"/>
@@ -18501,18 +19964,7 @@
             </a:r>
             <a:r>
               <a:rPr lang="en-US" dirty="0" err="1"/>
-              <a:t>computação</a:t>
-            </a:r>
-            <a:r>
-              <a:rPr lang="en-US" dirty="0"/>
-              <a:t>;</a:t>
-            </a:r>
-          </a:p>
-          <a:p>
-            <a:pPr lvl="1"/>
-            <a:r>
-              <a:rPr lang="en-US" dirty="0" err="1"/>
-              <a:t>Objetivo</a:t>
+              <a:t>princípios</a:t>
             </a:r>
             <a:r>
               <a:rPr lang="en-US" dirty="0"/>
@@ -18520,15 +19972,15 @@
             </a:r>
             <a:r>
               <a:rPr lang="en-US" dirty="0" err="1"/>
-              <a:t>comum</a:t>
+              <a:t>ao</a:t>
             </a:r>
             <a:r>
               <a:rPr lang="en-US" dirty="0"/>
-              <a:t> de </a:t>
+              <a:t> design da </a:t>
             </a:r>
             <a:r>
               <a:rPr lang="en-US" dirty="0" err="1"/>
-              <a:t>todos</a:t>
+              <a:t>lógica</a:t>
             </a:r>
             <a:r>
               <a:rPr lang="en-US" dirty="0"/>
@@ -18536,7 +19988,7 @@
             </a:r>
             <a:r>
               <a:rPr lang="en-US" dirty="0" err="1"/>
-              <a:t>os</a:t>
+              <a:t>resulta</a:t>
             </a:r>
             <a:r>
               <a:rPr lang="en-US" dirty="0"/>
@@ -18544,7 +19996,7 @@
             </a:r>
             <a:r>
               <a:rPr lang="en-US" dirty="0" err="1"/>
-              <a:t>modelos</a:t>
+              <a:t>em</a:t>
             </a:r>
             <a:r>
               <a:rPr lang="en-US" dirty="0"/>
@@ -18552,7 +20004,7 @@
             </a:r>
             <a:r>
               <a:rPr lang="en-US" dirty="0" err="1"/>
-              <a:t>computacionais</a:t>
+              <a:t>uma</a:t>
             </a:r>
             <a:r>
               <a:rPr lang="en-US" dirty="0"/>
@@ -18560,54 +20012,7 @@
             </a:r>
             <a:r>
               <a:rPr lang="en-US" dirty="0" err="1"/>
-              <a:t>anteriores</a:t>
-            </a:r>
-            <a:endParaRPr lang="en-US" dirty="0"/>
-          </a:p>
-          <a:p>
-            <a:pPr lvl="1"/>
-            <a:r>
-              <a:rPr lang="en-US" dirty="0" err="1"/>
-              <a:t>Contextualizar</a:t>
-            </a:r>
-            <a:r>
-              <a:rPr lang="en-US" dirty="0"/>
-              <a:t> o </a:t>
-            </a:r>
-            <a:r>
-              <a:rPr lang="en-US" dirty="0" err="1"/>
-              <a:t>crescimento</a:t>
-            </a:r>
-            <a:r>
-              <a:rPr lang="en-US" dirty="0"/>
-              <a:t> antes do </a:t>
-            </a:r>
-            <a:r>
-              <a:rPr lang="en-US" dirty="0" err="1"/>
-              <a:t>problema</a:t>
-            </a:r>
-            <a:endParaRPr lang="en-US" dirty="0"/>
-          </a:p>
-          <a:p>
-            <a:pPr lvl="1"/>
-            <a:r>
-              <a:rPr lang="en-US" dirty="0" err="1"/>
-              <a:t>Complexidade</a:t>
-            </a:r>
-            <a:r>
-              <a:rPr lang="en-US" dirty="0"/>
-              <a:t> dos Datacenters</a:t>
-            </a:r>
-          </a:p>
-          <a:p>
-            <a:pPr lvl="2"/>
-            <a:r>
-              <a:rPr lang="en-US" dirty="0"/>
-              <a:t>Com </a:t>
-            </a:r>
-            <a:r>
-              <a:rPr lang="en-US" dirty="0" err="1"/>
-              <a:t>cada</a:t>
+              <a:t>lógica</a:t>
             </a:r>
             <a:r>
               <a:rPr lang="en-US" dirty="0"/>
@@ -18615,650 +20020,19 @@
             </a:r>
             <a:r>
               <a:rPr lang="en-US" dirty="0" err="1"/>
-              <a:t>uma</a:t>
+              <a:t>orientada</a:t>
             </a:r>
             <a:r>
               <a:rPr lang="en-US" dirty="0"/>
-              <a:t> das </a:t>
+              <a:t> a </a:t>
             </a:r>
             <a:r>
               <a:rPr lang="en-US" dirty="0" err="1"/>
-              <a:t>transições</a:t>
+              <a:t>serviços</a:t>
             </a:r>
             <a:r>
               <a:rPr lang="en-US" dirty="0"/>
-              <a:t> de </a:t>
-            </a:r>
-            <a:r>
-              <a:rPr lang="en-US" dirty="0" err="1"/>
-              <a:t>estilos</a:t>
-            </a:r>
-            <a:r>
-              <a:rPr lang="en-US" dirty="0"/>
-              <a:t> </a:t>
-            </a:r>
-            <a:r>
-              <a:rPr lang="en-US" dirty="0" err="1"/>
-              <a:t>computacionais</a:t>
-            </a:r>
-            <a:r>
-              <a:rPr lang="en-US" dirty="0"/>
-              <a:t> </a:t>
-            </a:r>
-            <a:r>
-              <a:rPr lang="en-US" dirty="0" err="1"/>
-              <a:t>mencionadas</a:t>
-            </a:r>
-            <a:r>
-              <a:rPr lang="en-US" dirty="0"/>
-              <a:t>, </a:t>
-            </a:r>
-            <a:r>
-              <a:rPr lang="en-US" dirty="0" err="1"/>
-              <a:t>vieram</a:t>
-            </a:r>
-            <a:r>
-              <a:rPr lang="en-US" dirty="0"/>
-              <a:t> </a:t>
-            </a:r>
-            <a:r>
-              <a:rPr lang="en-US" dirty="0" err="1"/>
-              <a:t>também</a:t>
-            </a:r>
-            <a:r>
-              <a:rPr lang="en-US" dirty="0"/>
-              <a:t> </a:t>
-            </a:r>
-            <a:r>
-              <a:rPr lang="en-US" dirty="0" err="1"/>
-              <a:t>suas</a:t>
-            </a:r>
-            <a:r>
-              <a:rPr lang="en-US" dirty="0"/>
-              <a:t> </a:t>
-            </a:r>
-            <a:r>
-              <a:rPr lang="en-US" dirty="0" err="1"/>
-              <a:t>complexidades</a:t>
-            </a:r>
-            <a:r>
-              <a:rPr lang="en-US" dirty="0"/>
-              <a:t> </a:t>
-            </a:r>
-            <a:r>
-              <a:rPr lang="en-US" dirty="0" err="1"/>
-              <a:t>inerentes</a:t>
-            </a:r>
-            <a:r>
-              <a:rPr lang="en-US" dirty="0"/>
-              <a:t>;</a:t>
-            </a:r>
-          </a:p>
-          <a:p>
-            <a:pPr lvl="2"/>
-            <a:r>
-              <a:rPr lang="en-US" dirty="0" err="1"/>
-              <a:t>Esse</a:t>
-            </a:r>
-            <a:r>
-              <a:rPr lang="en-US" dirty="0"/>
-              <a:t> </a:t>
-            </a:r>
-            <a:r>
-              <a:rPr lang="en-US" dirty="0" err="1"/>
-              <a:t>crescimento</a:t>
-            </a:r>
-            <a:r>
-              <a:rPr lang="en-US" dirty="0"/>
-              <a:t> </a:t>
-            </a:r>
-            <a:r>
-              <a:rPr lang="en-US" dirty="0" err="1"/>
-              <a:t>computacional</a:t>
-            </a:r>
-            <a:r>
-              <a:rPr lang="en-US" dirty="0"/>
-              <a:t> é o que </a:t>
-            </a:r>
-            <a:r>
-              <a:rPr lang="en-US" dirty="0" err="1"/>
-              <a:t>permitiu</a:t>
-            </a:r>
-            <a:r>
-              <a:rPr lang="en-US" dirty="0"/>
-              <a:t> o </a:t>
-            </a:r>
-            <a:r>
-              <a:rPr lang="en-US" dirty="0" err="1"/>
-              <a:t>grande</a:t>
-            </a:r>
-            <a:r>
-              <a:rPr lang="en-US" dirty="0"/>
-              <a:t> volume de </a:t>
-            </a:r>
-            <a:r>
-              <a:rPr lang="en-US" dirty="0" err="1"/>
-              <a:t>acesso</a:t>
-            </a:r>
-            <a:r>
-              <a:rPr lang="en-US" dirty="0"/>
-              <a:t> as </a:t>
-            </a:r>
-            <a:r>
-              <a:rPr lang="en-US" dirty="0" err="1"/>
-              <a:t>soluções</a:t>
-            </a:r>
-            <a:r>
-              <a:rPr lang="en-US" dirty="0"/>
-              <a:t> que </a:t>
-            </a:r>
-            <a:r>
-              <a:rPr lang="en-US" dirty="0" err="1"/>
-              <a:t>temos</a:t>
-            </a:r>
-            <a:r>
-              <a:rPr lang="en-US" dirty="0"/>
-              <a:t> </a:t>
-            </a:r>
-            <a:r>
-              <a:rPr lang="en-US" dirty="0" err="1"/>
-              <a:t>hoje</a:t>
-            </a:r>
-            <a:r>
-              <a:rPr lang="en-US" dirty="0"/>
-              <a:t>. Mas </a:t>
-            </a:r>
-            <a:r>
-              <a:rPr lang="en-US" dirty="0" err="1"/>
-              <a:t>esse</a:t>
-            </a:r>
-            <a:r>
-              <a:rPr lang="en-US" dirty="0"/>
-              <a:t> </a:t>
-            </a:r>
-            <a:r>
-              <a:rPr lang="en-US" dirty="0" err="1"/>
-              <a:t>crescimento</a:t>
-            </a:r>
-            <a:r>
-              <a:rPr lang="en-US" dirty="0"/>
-              <a:t> </a:t>
-            </a:r>
-            <a:r>
-              <a:rPr lang="en-US" dirty="0" err="1"/>
-              <a:t>teve</a:t>
-            </a:r>
-            <a:r>
-              <a:rPr lang="en-US" dirty="0"/>
-              <a:t> um </a:t>
-            </a:r>
-            <a:r>
-              <a:rPr lang="en-US" dirty="0" err="1"/>
-              <a:t>custo</a:t>
-            </a:r>
-            <a:r>
-              <a:rPr lang="en-US" dirty="0"/>
-              <a:t>.</a:t>
-            </a:r>
-          </a:p>
-          <a:p>
-            <a:pPr lvl="3"/>
-            <a:r>
-              <a:rPr lang="en-US" dirty="0" err="1"/>
-              <a:t>Computação</a:t>
-            </a:r>
-            <a:r>
-              <a:rPr lang="en-US" dirty="0"/>
-              <a:t> </a:t>
-            </a:r>
-            <a:r>
-              <a:rPr lang="en-US" dirty="0" err="1"/>
-              <a:t>em</a:t>
-            </a:r>
-            <a:r>
-              <a:rPr lang="en-US" dirty="0"/>
-              <a:t> </a:t>
-            </a:r>
-            <a:r>
-              <a:rPr lang="en-US" dirty="0" err="1"/>
-              <a:t>Nuvem</a:t>
-            </a:r>
-            <a:r>
-              <a:rPr lang="en-US" dirty="0"/>
-              <a:t> </a:t>
-            </a:r>
-            <a:r>
-              <a:rPr lang="en-US" dirty="0" err="1"/>
-              <a:t>Não</a:t>
-            </a:r>
-            <a:r>
-              <a:rPr lang="en-US" dirty="0"/>
-              <a:t> </a:t>
-            </a:r>
-            <a:r>
-              <a:rPr lang="en-US" dirty="0" err="1"/>
-              <a:t>veio</a:t>
-            </a:r>
-            <a:r>
-              <a:rPr lang="en-US" dirty="0"/>
-              <a:t> </a:t>
-            </a:r>
-            <a:r>
-              <a:rPr lang="en-US" dirty="0" err="1"/>
-              <a:t>Sozinha</a:t>
-            </a:r>
-            <a:r>
-              <a:rPr lang="en-US" dirty="0"/>
-              <a:t> </a:t>
-            </a:r>
-          </a:p>
-          <a:p>
-            <a:pPr lvl="4"/>
-            <a:r>
-              <a:rPr lang="en-US" dirty="0" err="1"/>
-              <a:t>Evoluções</a:t>
-            </a:r>
-            <a:r>
-              <a:rPr lang="en-US" dirty="0"/>
-              <a:t> </a:t>
-            </a:r>
-            <a:r>
-              <a:rPr lang="en-US" dirty="0" err="1"/>
-              <a:t>em</a:t>
-            </a:r>
-            <a:r>
-              <a:rPr lang="en-US" dirty="0"/>
-              <a:t> </a:t>
-            </a:r>
-            <a:r>
-              <a:rPr lang="en-US" dirty="0" err="1"/>
-              <a:t>todos</a:t>
-            </a:r>
-            <a:r>
-              <a:rPr lang="en-US" dirty="0"/>
-              <a:t> </a:t>
-            </a:r>
-            <a:r>
-              <a:rPr lang="en-US" dirty="0" err="1"/>
-              <a:t>os</a:t>
-            </a:r>
-            <a:r>
-              <a:rPr lang="en-US" dirty="0"/>
-              <a:t> </a:t>
-            </a:r>
-            <a:r>
-              <a:rPr lang="en-US" dirty="0" err="1"/>
-              <a:t>aspectos</a:t>
-            </a:r>
-            <a:r>
-              <a:rPr lang="en-US" dirty="0"/>
-              <a:t> </a:t>
-            </a:r>
-            <a:r>
-              <a:rPr lang="en-US" dirty="0" err="1"/>
-              <a:t>computacionais</a:t>
-            </a:r>
-            <a:r>
-              <a:rPr lang="en-US" dirty="0"/>
-              <a:t> e stacks que </a:t>
-            </a:r>
-            <a:r>
-              <a:rPr lang="en-US" dirty="0" err="1"/>
-              <a:t>compõem</a:t>
-            </a:r>
-            <a:r>
-              <a:rPr lang="en-US" dirty="0"/>
-              <a:t> um </a:t>
-            </a:r>
-            <a:r>
-              <a:rPr lang="en-US" dirty="0" err="1"/>
-              <a:t>computador</a:t>
-            </a:r>
-            <a:r>
-              <a:rPr lang="en-US" dirty="0"/>
-              <a:t>, </a:t>
-            </a:r>
-            <a:r>
-              <a:rPr lang="en-US" dirty="0" err="1"/>
-              <a:t>servidor</a:t>
-            </a:r>
-            <a:r>
-              <a:rPr lang="en-US" dirty="0"/>
-              <a:t> </a:t>
-            </a:r>
-            <a:r>
-              <a:rPr lang="en-US" dirty="0" err="1"/>
-              <a:t>ou</a:t>
-            </a:r>
-            <a:r>
-              <a:rPr lang="en-US" dirty="0"/>
-              <a:t> </a:t>
-            </a:r>
-            <a:r>
-              <a:rPr lang="en-US" dirty="0" err="1"/>
-              <a:t>mesmo</a:t>
-            </a:r>
-            <a:r>
-              <a:rPr lang="en-US" dirty="0"/>
-              <a:t> um datacenter </a:t>
-            </a:r>
-            <a:r>
-              <a:rPr lang="en-US" dirty="0" err="1"/>
-              <a:t>inteiro</a:t>
-            </a:r>
-            <a:r>
-              <a:rPr lang="en-US" dirty="0"/>
-              <a:t> </a:t>
-            </a:r>
-            <a:r>
-              <a:rPr lang="en-US" dirty="0" err="1"/>
-              <a:t>como</a:t>
-            </a:r>
-            <a:r>
-              <a:rPr lang="en-US" dirty="0"/>
-              <a:t>: </a:t>
-            </a:r>
-            <a:r>
-              <a:rPr lang="en-US" b="1" dirty="0" err="1"/>
-              <a:t>Computação</a:t>
-            </a:r>
-            <a:r>
-              <a:rPr lang="en-US" b="1" dirty="0"/>
-              <a:t> (</a:t>
-            </a:r>
-            <a:r>
-              <a:rPr lang="en-US" b="1" dirty="0" err="1"/>
-              <a:t>processadores</a:t>
-            </a:r>
-            <a:r>
-              <a:rPr lang="en-US" b="1" dirty="0"/>
-              <a:t>),</a:t>
-            </a:r>
-            <a:r>
-              <a:rPr lang="en-US" dirty="0"/>
-              <a:t> </a:t>
-            </a:r>
-            <a:r>
-              <a:rPr lang="en-US" b="1" dirty="0"/>
-              <a:t>Rede, Storage, </a:t>
-            </a:r>
-            <a:r>
-              <a:rPr lang="en-US" b="1" dirty="0" err="1"/>
-              <a:t>Servidores</a:t>
-            </a:r>
-            <a:r>
-              <a:rPr lang="en-US" b="1" dirty="0"/>
-              <a:t>, </a:t>
-            </a:r>
-            <a:r>
-              <a:rPr lang="en-US" b="1" dirty="0" err="1"/>
-              <a:t>Virtualização</a:t>
-            </a:r>
-            <a:r>
-              <a:rPr lang="en-US" b="1" dirty="0"/>
-              <a:t>, SO (</a:t>
-            </a:r>
-            <a:r>
-              <a:rPr lang="en-US" b="1" dirty="0" err="1"/>
-              <a:t>Escala</a:t>
-            </a:r>
-            <a:r>
-              <a:rPr lang="en-US" b="1" dirty="0"/>
-              <a:t> de DC-Hardware), </a:t>
-            </a:r>
-            <a:r>
-              <a:rPr lang="en-US" b="1" dirty="0" err="1"/>
-              <a:t>Gestão</a:t>
-            </a:r>
-            <a:r>
-              <a:rPr lang="en-US" b="1" dirty="0"/>
-              <a:t> (</a:t>
-            </a:r>
-            <a:r>
-              <a:rPr lang="en-US" b="1" dirty="0" err="1"/>
-              <a:t>Controlado</a:t>
-            </a:r>
-            <a:r>
-              <a:rPr lang="en-US" b="1" dirty="0"/>
-              <a:t> </a:t>
-            </a:r>
-            <a:r>
-              <a:rPr lang="en-US" b="1" dirty="0" err="1"/>
-              <a:t>por</a:t>
-            </a:r>
-            <a:r>
-              <a:rPr lang="en-US" b="1" dirty="0"/>
-              <a:t> software) etc</a:t>
-            </a:r>
-            <a:r>
-              <a:rPr lang="en-US" dirty="0"/>
-              <a:t>.</a:t>
-            </a:r>
-          </a:p>
-          <a:p>
-            <a:pPr lvl="2"/>
-            <a:r>
-              <a:rPr lang="en-US" dirty="0" err="1"/>
-              <a:t>Os</a:t>
-            </a:r>
-            <a:r>
-              <a:rPr lang="en-US" dirty="0"/>
-              <a:t> datacenters das </a:t>
-            </a:r>
-            <a:r>
-              <a:rPr lang="en-US" dirty="0" err="1"/>
-              <a:t>empresas</a:t>
-            </a:r>
-            <a:r>
-              <a:rPr lang="en-US" dirty="0"/>
-              <a:t> </a:t>
-            </a:r>
-            <a:r>
-              <a:rPr lang="en-US" dirty="0" err="1"/>
-              <a:t>atingiram</a:t>
-            </a:r>
-            <a:r>
-              <a:rPr lang="en-US" dirty="0"/>
-              <a:t> </a:t>
-            </a:r>
-            <a:r>
-              <a:rPr lang="en-US" dirty="0" err="1"/>
-              <a:t>seu</a:t>
-            </a:r>
-            <a:r>
-              <a:rPr lang="en-US" dirty="0"/>
-              <a:t> </a:t>
-            </a:r>
-            <a:r>
-              <a:rPr lang="en-US" dirty="0" err="1"/>
-              <a:t>potencial</a:t>
-            </a:r>
-            <a:r>
-              <a:rPr lang="en-US" dirty="0"/>
-              <a:t> </a:t>
-            </a:r>
-            <a:r>
-              <a:rPr lang="en-US" dirty="0" err="1"/>
-              <a:t>máximo</a:t>
-            </a:r>
-            <a:r>
-              <a:rPr lang="en-US" dirty="0"/>
-              <a:t> e </a:t>
-            </a:r>
-            <a:r>
-              <a:rPr lang="en-US" dirty="0" err="1"/>
-              <a:t>crescer</a:t>
-            </a:r>
-            <a:r>
-              <a:rPr lang="en-US" dirty="0"/>
-              <a:t> </a:t>
-            </a:r>
-            <a:r>
-              <a:rPr lang="en-US" dirty="0" err="1"/>
-              <a:t>além</a:t>
-            </a:r>
-            <a:r>
-              <a:rPr lang="en-US" dirty="0"/>
-              <a:t> </a:t>
-            </a:r>
-            <a:r>
-              <a:rPr lang="en-US" dirty="0" err="1"/>
-              <a:t>disso</a:t>
-            </a:r>
-            <a:r>
-              <a:rPr lang="en-US" dirty="0"/>
-              <a:t>, </a:t>
-            </a:r>
-            <a:r>
-              <a:rPr lang="en-US" dirty="0" err="1"/>
-              <a:t>atendendo</a:t>
-            </a:r>
-            <a:r>
-              <a:rPr lang="en-US" dirty="0"/>
-              <a:t> as </a:t>
-            </a:r>
-            <a:r>
-              <a:rPr lang="en-US" dirty="0" err="1"/>
-              <a:t>demandas</a:t>
-            </a:r>
-            <a:r>
-              <a:rPr lang="en-US" dirty="0"/>
-              <a:t> de </a:t>
-            </a:r>
-            <a:r>
-              <a:rPr lang="en-US" dirty="0" err="1"/>
-              <a:t>negócios</a:t>
-            </a:r>
-            <a:r>
-              <a:rPr lang="en-US" dirty="0"/>
-              <a:t> </a:t>
-            </a:r>
-            <a:r>
-              <a:rPr lang="en-US" dirty="0" err="1"/>
-              <a:t>na</a:t>
-            </a:r>
-            <a:r>
-              <a:rPr lang="en-US" dirty="0"/>
-              <a:t> era da Internet, </a:t>
-            </a:r>
-            <a:r>
-              <a:rPr lang="en-US" dirty="0" err="1"/>
-              <a:t>requer</a:t>
-            </a:r>
-            <a:r>
-              <a:rPr lang="en-US" dirty="0"/>
-              <a:t> </a:t>
-            </a:r>
-            <a:r>
-              <a:rPr lang="en-US" dirty="0" err="1"/>
-              <a:t>uma</a:t>
-            </a:r>
-            <a:r>
-              <a:rPr lang="en-US" dirty="0"/>
-              <a:t> </a:t>
-            </a:r>
-            <a:r>
-              <a:rPr lang="en-US" dirty="0" err="1"/>
-              <a:t>ruptura</a:t>
-            </a:r>
-            <a:r>
-              <a:rPr lang="en-US" dirty="0"/>
-              <a:t> no </a:t>
-            </a:r>
-            <a:r>
-              <a:rPr lang="en-US" dirty="0" err="1"/>
-              <a:t>modelo</a:t>
-            </a:r>
-            <a:r>
-              <a:rPr lang="en-US" dirty="0"/>
-              <a:t> </a:t>
-            </a:r>
-            <a:r>
-              <a:rPr lang="en-US" dirty="0" err="1"/>
-              <a:t>atual</a:t>
-            </a:r>
-            <a:r>
-              <a:rPr lang="en-US" dirty="0"/>
-              <a:t> de </a:t>
-            </a:r>
-            <a:r>
-              <a:rPr lang="en-US" dirty="0" err="1"/>
-              <a:t>computação</a:t>
-            </a:r>
-            <a:r>
-              <a:rPr lang="en-US" dirty="0"/>
-              <a:t>. </a:t>
-            </a:r>
-            <a:r>
-              <a:rPr lang="en-US" dirty="0" err="1"/>
-              <a:t>Ruptura</a:t>
-            </a:r>
-            <a:r>
-              <a:rPr lang="en-US" dirty="0"/>
-              <a:t> </a:t>
-            </a:r>
-            <a:r>
-              <a:rPr lang="en-US" dirty="0" err="1"/>
-              <a:t>essa</a:t>
-            </a:r>
-            <a:r>
-              <a:rPr lang="en-US" dirty="0"/>
-              <a:t>, </a:t>
-            </a:r>
-            <a:r>
-              <a:rPr lang="en-US" dirty="0" err="1"/>
-              <a:t>chamada</a:t>
-            </a:r>
-            <a:r>
-              <a:rPr lang="en-US" dirty="0"/>
-              <a:t> </a:t>
-            </a:r>
-            <a:r>
-              <a:rPr lang="en-US" dirty="0" err="1"/>
-              <a:t>pelo</a:t>
-            </a:r>
-            <a:r>
-              <a:rPr lang="en-US" dirty="0"/>
-              <a:t> Mercado de </a:t>
-            </a:r>
-            <a:r>
-              <a:rPr lang="en-US" dirty="0" err="1"/>
-              <a:t>Computação</a:t>
-            </a:r>
-            <a:r>
-              <a:rPr lang="en-US" dirty="0"/>
-              <a:t> </a:t>
-            </a:r>
-            <a:r>
-              <a:rPr lang="en-US" dirty="0" err="1"/>
-              <a:t>em</a:t>
-            </a:r>
-            <a:r>
-              <a:rPr lang="en-US" dirty="0"/>
-              <a:t> </a:t>
-            </a:r>
-            <a:r>
-              <a:rPr lang="en-US" dirty="0" err="1"/>
-              <a:t>Nuvem</a:t>
-            </a:r>
-            <a:r>
-              <a:rPr lang="en-US" dirty="0"/>
-              <a:t>.</a:t>
-            </a:r>
-          </a:p>
-          <a:p>
-            <a:pPr lvl="1"/>
-            <a:r>
-              <a:rPr lang="en-US" dirty="0"/>
-              <a:t>Estrada para a </a:t>
-            </a:r>
-            <a:r>
-              <a:rPr lang="en-US" dirty="0" err="1"/>
-              <a:t>Transformação</a:t>
-            </a:r>
-            <a:r>
-              <a:rPr lang="en-US" dirty="0"/>
-              <a:t> Digital</a:t>
+              <a:t>. “</a:t>
             </a:r>
           </a:p>
           <a:p>
@@ -19270,7 +20044,7 @@
     </p:spTree>
     <p:extLst>
       <p:ext uri="{BB962C8B-B14F-4D97-AF65-F5344CB8AC3E}">
-        <p14:creationId xmlns:p14="http://schemas.microsoft.com/office/powerpoint/2010/main" val="2717185107"/>
+        <p14:creationId xmlns:p14="http://schemas.microsoft.com/office/powerpoint/2010/main" val="3486515999"/>
       </p:ext>
     </p:extLst>
   </p:cSld>
@@ -19369,206 +20143,15 @@
           <a:p>
             <a:r>
               <a:rPr lang="en-US" dirty="0"/>
-              <a:t>Novo </a:t>
-            </a:r>
-            <a:r>
-              <a:rPr lang="en-US" dirty="0" err="1"/>
-              <a:t>Paradigma</a:t>
-            </a:r>
-            <a:r>
-              <a:rPr lang="en-US" dirty="0"/>
-              <a:t> </a:t>
-            </a:r>
-            <a:r>
-              <a:rPr lang="en-US" dirty="0" err="1"/>
-              <a:t>Computacional</a:t>
-            </a:r>
-            <a:endParaRPr lang="en-US" dirty="0"/>
-          </a:p>
-          <a:p>
-            <a:pPr lvl="2"/>
-            <a:r>
-              <a:rPr lang="en-US" dirty="0" err="1"/>
-              <a:t>Características</a:t>
-            </a:r>
-            <a:r>
-              <a:rPr lang="en-US" dirty="0"/>
-              <a:t>;</a:t>
-            </a:r>
-          </a:p>
-          <a:p>
-            <a:pPr lvl="2"/>
-            <a:r>
-              <a:rPr lang="en-US" dirty="0" err="1"/>
-              <a:t>Principios</a:t>
-            </a:r>
-            <a:r>
-              <a:rPr lang="en-US" dirty="0"/>
-              <a:t>;</a:t>
-            </a:r>
-          </a:p>
-          <a:p>
-            <a:pPr lvl="2"/>
-            <a:r>
-              <a:rPr lang="en-US" dirty="0" err="1"/>
-              <a:t>Paradigmas</a:t>
-            </a:r>
-            <a:r>
-              <a:rPr lang="en-US" dirty="0"/>
-              <a:t>;</a:t>
-            </a:r>
-          </a:p>
-          <a:p>
-            <a:pPr lvl="2"/>
-            <a:r>
-              <a:rPr lang="en-US" dirty="0" err="1"/>
-              <a:t>Modelos</a:t>
-            </a:r>
-            <a:r>
-              <a:rPr lang="en-US" dirty="0"/>
-              <a:t>;</a:t>
-            </a:r>
-          </a:p>
-          <a:p>
-            <a:r>
-              <a:rPr lang="en-US" dirty="0"/>
-              <a:t>Thomas </a:t>
-            </a:r>
-            <a:r>
-              <a:rPr lang="en-US" dirty="0" err="1"/>
-              <a:t>Erl</a:t>
-            </a:r>
-            <a:endParaRPr lang="en-US" dirty="0"/>
-          </a:p>
-          <a:p>
-            <a:pPr lvl="1"/>
-            <a:r>
-              <a:rPr lang="en-US" dirty="0"/>
-              <a:t>“Cloud Computing é um paradigm de design que </a:t>
-            </a:r>
-            <a:r>
-              <a:rPr lang="en-US" dirty="0" err="1"/>
-              <a:t>abrange</a:t>
-            </a:r>
-            <a:r>
-              <a:rPr lang="en-US" dirty="0"/>
-              <a:t> um conjunto </a:t>
-            </a:r>
-            <a:r>
-              <a:rPr lang="en-US" dirty="0" err="1"/>
-              <a:t>especifico</a:t>
-            </a:r>
-            <a:r>
-              <a:rPr lang="en-US" dirty="0"/>
-              <a:t> de </a:t>
-            </a:r>
-            <a:r>
-              <a:rPr lang="en-US" dirty="0" err="1"/>
-              <a:t>princípios</a:t>
-            </a:r>
-            <a:r>
-              <a:rPr lang="en-US" dirty="0"/>
-              <a:t> de design. A </a:t>
-            </a:r>
-            <a:r>
-              <a:rPr lang="en-US" dirty="0" err="1"/>
-              <a:t>aplicação</a:t>
-            </a:r>
-            <a:r>
-              <a:rPr lang="en-US" dirty="0"/>
-              <a:t> </a:t>
-            </a:r>
-            <a:r>
-              <a:rPr lang="en-US" dirty="0" err="1"/>
-              <a:t>desses</a:t>
-            </a:r>
-            <a:r>
-              <a:rPr lang="en-US" dirty="0"/>
-              <a:t> </a:t>
-            </a:r>
-            <a:r>
-              <a:rPr lang="en-US" dirty="0" err="1"/>
-              <a:t>princípios</a:t>
-            </a:r>
-            <a:r>
-              <a:rPr lang="en-US" dirty="0"/>
-              <a:t> </a:t>
-            </a:r>
-            <a:r>
-              <a:rPr lang="en-US" dirty="0" err="1"/>
-              <a:t>ao</a:t>
-            </a:r>
-            <a:r>
-              <a:rPr lang="en-US" dirty="0"/>
-              <a:t> design da </a:t>
-            </a:r>
-            <a:r>
-              <a:rPr lang="en-US" dirty="0" err="1"/>
-              <a:t>lógica</a:t>
-            </a:r>
-            <a:r>
-              <a:rPr lang="en-US" dirty="0"/>
-              <a:t> </a:t>
-            </a:r>
-            <a:r>
-              <a:rPr lang="en-US" dirty="0" err="1"/>
-              <a:t>resulta</a:t>
-            </a:r>
-            <a:r>
-              <a:rPr lang="en-US" dirty="0"/>
-              <a:t> </a:t>
-            </a:r>
-            <a:r>
-              <a:rPr lang="en-US" dirty="0" err="1"/>
-              <a:t>em</a:t>
-            </a:r>
-            <a:r>
-              <a:rPr lang="en-US" dirty="0"/>
-              <a:t> </a:t>
-            </a:r>
-            <a:r>
-              <a:rPr lang="en-US" dirty="0" err="1"/>
-              <a:t>uma</a:t>
-            </a:r>
-            <a:r>
-              <a:rPr lang="en-US" dirty="0"/>
-              <a:t> </a:t>
-            </a:r>
-            <a:r>
-              <a:rPr lang="en-US" dirty="0" err="1"/>
-              <a:t>lógica</a:t>
-            </a:r>
-            <a:r>
-              <a:rPr lang="en-US" dirty="0"/>
-              <a:t> </a:t>
-            </a:r>
-            <a:r>
-              <a:rPr lang="en-US" dirty="0" err="1"/>
-              <a:t>orientada</a:t>
-            </a:r>
-            <a:r>
-              <a:rPr lang="en-US" dirty="0"/>
-              <a:t> a </a:t>
-            </a:r>
-            <a:r>
-              <a:rPr lang="en-US" dirty="0" err="1"/>
-              <a:t>serviços</a:t>
-            </a:r>
-            <a:r>
-              <a:rPr lang="en-US" dirty="0"/>
-              <a:t>. “</a:t>
-            </a:r>
-          </a:p>
-          <a:p>
-            <a:pPr lvl="2"/>
-            <a:endParaRPr lang="en-US" dirty="0"/>
+              <a:t>NIST</a:t>
+            </a:r>
           </a:p>
         </p:txBody>
       </p:sp>
     </p:spTree>
     <p:extLst>
       <p:ext uri="{BB962C8B-B14F-4D97-AF65-F5344CB8AC3E}">
-        <p14:creationId xmlns:p14="http://schemas.microsoft.com/office/powerpoint/2010/main" val="3486515999"/>
+        <p14:creationId xmlns:p14="http://schemas.microsoft.com/office/powerpoint/2010/main" val="4284891684"/>
       </p:ext>
     </p:extLst>
   </p:cSld>

</xml_diff>